<commit_message>
Add Answer command sequence diagram - did not include storage component
</commit_message>
<xml_diff>
--- a/docs/diagrams/TestSessionSequenceDiagram.pptx
+++ b/docs/diagrams/TestSessionSequenceDiagram.pptx
@@ -5,11 +5,12 @@
     <p:sldMasterId id="2147483648" r:id="rId1"/>
   </p:sldMasterIdLst>
   <p:notesMasterIdLst>
-    <p:notesMasterId r:id="rId4"/>
+    <p:notesMasterId r:id="rId5"/>
   </p:notesMasterIdLst>
   <p:sldIdLst>
     <p:sldId id="267" r:id="rId2"/>
-    <p:sldId id="270" r:id="rId3"/>
+    <p:sldId id="271" r:id="rId3"/>
+    <p:sldId id="270" r:id="rId4"/>
   </p:sldIdLst>
   <p:sldSz cx="9144000" cy="6858000" type="screen4x3"/>
   <p:notesSz cx="6858000" cy="9144000"/>
@@ -546,7 +547,7 @@
           <a:p>
             <a:fld id="{5A7AB025-77E3-4BD1-A2FD-B3183DBA47A3}" type="slidenum">
               <a:rPr lang="en-US" smtClean="0"/>
-              <a:t>2</a:t>
+              <a:t>3</a:t>
             </a:fld>
             <a:endParaRPr lang="en-US"/>
           </a:p>
@@ -5615,11 +5616,7 @@
           </a:lstStyle>
           <a:p>
             <a:r>
-              <a:rPr lang="en-US" dirty="0">
-                <a:solidFill>
-                  <a:srgbClr val="7030A0"/>
-                </a:solidFill>
-              </a:rPr>
+              <a:rPr lang="en-US" dirty="0"/>
               <a:t>c</a:t>
             </a:r>
           </a:p>
@@ -6594,6 +6591,3109 @@
 </file>
 
 <file path=ppt/slides/slide2.xml><?xml version="1.0" encoding="utf-8"?>
+<p:sld xmlns:a="http://schemas.openxmlformats.org/drawingml/2006/main" xmlns:r="http://schemas.openxmlformats.org/officeDocument/2006/relationships" xmlns:p="http://schemas.openxmlformats.org/presentationml/2006/main">
+  <p:cSld>
+    <p:spTree>
+      <p:nvGrpSpPr>
+        <p:cNvPr id="1" name=""/>
+        <p:cNvGrpSpPr/>
+        <p:nvPr/>
+      </p:nvGrpSpPr>
+      <p:grpSpPr>
+        <a:xfrm>
+          <a:off x="0" y="0"/>
+          <a:ext cx="0" cy="0"/>
+          <a:chOff x="0" y="0"/>
+          <a:chExt cx="0" cy="0"/>
+        </a:xfrm>
+      </p:grpSpPr>
+      <p:sp>
+        <p:nvSpPr>
+          <p:cNvPr id="56" name="Rectangle 65"/>
+          <p:cNvSpPr/>
+          <p:nvPr/>
+        </p:nvSpPr>
+        <p:spPr>
+          <a:xfrm>
+            <a:off x="8065858" y="118893"/>
+            <a:ext cx="3903825" cy="6550361"/>
+          </a:xfrm>
+          <a:prstGeom prst="roundRect">
+            <a:avLst>
+              <a:gd name="adj" fmla="val 3484"/>
+            </a:avLst>
+          </a:prstGeom>
+          <a:solidFill>
+            <a:schemeClr val="accent4">
+              <a:lumMod val="20000"/>
+              <a:lumOff val="80000"/>
+            </a:schemeClr>
+          </a:solidFill>
+          <a:ln w="19050">
+            <a:noFill/>
+          </a:ln>
+          <a:effectLst/>
+        </p:spPr>
+        <p:style>
+          <a:lnRef idx="1">
+            <a:schemeClr val="accent2"/>
+          </a:lnRef>
+          <a:fillRef idx="2">
+            <a:schemeClr val="accent2"/>
+          </a:fillRef>
+          <a:effectRef idx="1">
+            <a:schemeClr val="accent2"/>
+          </a:effectRef>
+          <a:fontRef idx="minor">
+            <a:schemeClr val="dk1"/>
+          </a:fontRef>
+        </p:style>
+        <p:txBody>
+          <a:bodyPr rtlCol="0" anchor="t"/>
+          <a:lstStyle/>
+          <a:p>
+            <a:r>
+              <a:rPr lang="en-US" sz="1200" b="1" dirty="0">
+                <a:solidFill>
+                  <a:srgbClr val="7030A0"/>
+                </a:solidFill>
+              </a:rPr>
+              <a:t>Model</a:t>
+            </a:r>
+            <a:endParaRPr lang="en-SG" sz="1200" b="1" dirty="0">
+              <a:solidFill>
+                <a:srgbClr val="7030A0"/>
+              </a:solidFill>
+            </a:endParaRPr>
+          </a:p>
+        </p:txBody>
+      </p:sp>
+      <p:cxnSp>
+        <p:nvCxnSpPr>
+          <p:cNvPr id="89" name="Straight Connector 88">
+            <a:extLst>
+              <a:ext uri="{FF2B5EF4-FFF2-40B4-BE49-F238E27FC236}">
+                <a16:creationId xmlns:a16="http://schemas.microsoft.com/office/drawing/2014/main" id="{E4E1C8CA-49DF-45D8-80A5-D5C8282EE927}"/>
+              </a:ext>
+            </a:extLst>
+          </p:cNvPr>
+          <p:cNvCxnSpPr>
+            <a:cxnSpLocks/>
+          </p:cNvCxnSpPr>
+          <p:nvPr/>
+        </p:nvCxnSpPr>
+        <p:spPr>
+          <a:xfrm>
+            <a:off x="10972800" y="4724400"/>
+            <a:ext cx="0" cy="1311372"/>
+          </a:xfrm>
+          <a:prstGeom prst="line">
+            <a:avLst/>
+          </a:prstGeom>
+          <a:ln w="19050">
+            <a:solidFill>
+              <a:srgbClr val="7030A0"/>
+            </a:solidFill>
+            <a:prstDash val="sysDash"/>
+          </a:ln>
+          <a:effectLst/>
+        </p:spPr>
+        <p:style>
+          <a:lnRef idx="1">
+            <a:schemeClr val="accent1"/>
+          </a:lnRef>
+          <a:fillRef idx="2">
+            <a:schemeClr val="accent1"/>
+          </a:fillRef>
+          <a:effectRef idx="1">
+            <a:schemeClr val="accent1"/>
+          </a:effectRef>
+          <a:fontRef idx="minor">
+            <a:schemeClr val="dk1"/>
+          </a:fontRef>
+        </p:style>
+      </p:cxnSp>
+      <p:sp>
+        <p:nvSpPr>
+          <p:cNvPr id="81" name="Rectangle 65"/>
+          <p:cNvSpPr/>
+          <p:nvPr/>
+        </p:nvSpPr>
+        <p:spPr>
+          <a:xfrm>
+            <a:off x="-48286" y="76200"/>
+            <a:ext cx="7957756" cy="6602483"/>
+          </a:xfrm>
+          <a:prstGeom prst="roundRect">
+            <a:avLst>
+              <a:gd name="adj" fmla="val 3484"/>
+            </a:avLst>
+          </a:prstGeom>
+          <a:solidFill>
+            <a:schemeClr val="accent1">
+              <a:lumMod val="20000"/>
+              <a:lumOff val="80000"/>
+            </a:schemeClr>
+          </a:solidFill>
+          <a:ln w="19050">
+            <a:noFill/>
+          </a:ln>
+          <a:effectLst/>
+        </p:spPr>
+        <p:style>
+          <a:lnRef idx="1">
+            <a:schemeClr val="accent2"/>
+          </a:lnRef>
+          <a:fillRef idx="2">
+            <a:schemeClr val="accent2"/>
+          </a:fillRef>
+          <a:effectRef idx="1">
+            <a:schemeClr val="accent2"/>
+          </a:effectRef>
+          <a:fontRef idx="minor">
+            <a:schemeClr val="dk1"/>
+          </a:fontRef>
+        </p:style>
+        <p:txBody>
+          <a:bodyPr rtlCol="0" anchor="t"/>
+          <a:lstStyle/>
+          <a:p>
+            <a:r>
+              <a:rPr lang="en-US" sz="1200" b="1" dirty="0">
+                <a:solidFill>
+                  <a:srgbClr val="0070C0"/>
+                </a:solidFill>
+              </a:rPr>
+              <a:t>Logic</a:t>
+            </a:r>
+            <a:endParaRPr lang="en-SG" sz="1200" b="1" dirty="0">
+              <a:solidFill>
+                <a:srgbClr val="0070C0"/>
+              </a:solidFill>
+            </a:endParaRPr>
+          </a:p>
+        </p:txBody>
+      </p:sp>
+      <p:sp>
+        <p:nvSpPr>
+          <p:cNvPr id="2" name="Rectangle 62"/>
+          <p:cNvSpPr/>
+          <p:nvPr/>
+        </p:nvSpPr>
+        <p:spPr>
+          <a:xfrm>
+            <a:off x="508429" y="543946"/>
+            <a:ext cx="1455629" cy="346760"/>
+          </a:xfrm>
+          <a:prstGeom prst="rect">
+            <a:avLst/>
+          </a:prstGeom>
+          <a:solidFill>
+            <a:srgbClr val="0070C0"/>
+          </a:solidFill>
+          <a:ln w="19050">
+            <a:solidFill>
+              <a:srgbClr val="0070C0"/>
+            </a:solidFill>
+          </a:ln>
+          <a:effectLst/>
+        </p:spPr>
+        <p:style>
+          <a:lnRef idx="1">
+            <a:schemeClr val="accent2"/>
+          </a:lnRef>
+          <a:fillRef idx="2">
+            <a:schemeClr val="accent2"/>
+          </a:fillRef>
+          <a:effectRef idx="1">
+            <a:schemeClr val="accent2"/>
+          </a:effectRef>
+          <a:fontRef idx="minor">
+            <a:schemeClr val="dk1"/>
+          </a:fontRef>
+        </p:style>
+        <p:txBody>
+          <a:bodyPr rtlCol="0" anchor="ctr"/>
+          <a:lstStyle/>
+          <a:p>
+            <a:pPr algn="ctr"/>
+            <a:r>
+              <a:rPr lang="en-US" sz="1600" dirty="0">
+                <a:solidFill>
+                  <a:schemeClr val="bg1"/>
+                </a:solidFill>
+              </a:rPr>
+              <a:t>:</a:t>
+            </a:r>
+            <a:r>
+              <a:rPr lang="en-US" sz="1600" dirty="0" err="1">
+                <a:solidFill>
+                  <a:schemeClr val="bg1"/>
+                </a:solidFill>
+              </a:rPr>
+              <a:t>LogicManager</a:t>
+            </a:r>
+            <a:endParaRPr lang="en-SG" sz="1600" dirty="0">
+              <a:solidFill>
+                <a:schemeClr val="bg1"/>
+              </a:solidFill>
+            </a:endParaRPr>
+          </a:p>
+        </p:txBody>
+      </p:sp>
+      <p:cxnSp>
+        <p:nvCxnSpPr>
+          <p:cNvPr id="5" name="Straight Connector 4"/>
+          <p:cNvCxnSpPr>
+            <a:cxnSpLocks/>
+          </p:cNvCxnSpPr>
+          <p:nvPr/>
+        </p:nvCxnSpPr>
+        <p:spPr>
+          <a:xfrm>
+            <a:off x="1236243" y="907617"/>
+            <a:ext cx="0" cy="5761638"/>
+          </a:xfrm>
+          <a:prstGeom prst="line">
+            <a:avLst/>
+          </a:prstGeom>
+          <a:ln w="19050">
+            <a:solidFill>
+              <a:srgbClr val="0070C0"/>
+            </a:solidFill>
+            <a:prstDash val="sysDash"/>
+          </a:ln>
+          <a:effectLst/>
+        </p:spPr>
+        <p:style>
+          <a:lnRef idx="1">
+            <a:schemeClr val="accent1"/>
+          </a:lnRef>
+          <a:fillRef idx="2">
+            <a:schemeClr val="accent1"/>
+          </a:fillRef>
+          <a:effectRef idx="1">
+            <a:schemeClr val="accent1"/>
+          </a:effectRef>
+          <a:fontRef idx="minor">
+            <a:schemeClr val="dk1"/>
+          </a:fontRef>
+        </p:style>
+      </p:cxnSp>
+      <p:sp>
+        <p:nvSpPr>
+          <p:cNvPr id="6" name="Rectangle 5"/>
+          <p:cNvSpPr/>
+          <p:nvPr/>
+        </p:nvSpPr>
+        <p:spPr>
+          <a:xfrm>
+            <a:off x="1162149" y="1258311"/>
+            <a:ext cx="155474" cy="5164076"/>
+          </a:xfrm>
+          <a:prstGeom prst="rect">
+            <a:avLst/>
+          </a:prstGeom>
+          <a:solidFill>
+            <a:srgbClr val="0070C0"/>
+          </a:solidFill>
+          <a:ln>
+            <a:solidFill>
+              <a:srgbClr val="0070C0"/>
+            </a:solidFill>
+          </a:ln>
+          <a:effectLst/>
+        </p:spPr>
+        <p:style>
+          <a:lnRef idx="1">
+            <a:schemeClr val="accent3"/>
+          </a:lnRef>
+          <a:fillRef idx="2">
+            <a:schemeClr val="accent3"/>
+          </a:fillRef>
+          <a:effectRef idx="1">
+            <a:schemeClr val="accent3"/>
+          </a:effectRef>
+          <a:fontRef idx="minor">
+            <a:schemeClr val="dk1"/>
+          </a:fontRef>
+        </p:style>
+        <p:txBody>
+          <a:bodyPr rtlCol="0" anchor="ctr"/>
+          <a:lstStyle/>
+          <a:p>
+            <a:pPr algn="ctr"/>
+            <a:endParaRPr lang="en-SG" sz="1400"/>
+          </a:p>
+        </p:txBody>
+      </p:sp>
+      <p:sp>
+        <p:nvSpPr>
+          <p:cNvPr id="16" name="Rectangle 62"/>
+          <p:cNvSpPr/>
+          <p:nvPr/>
+        </p:nvSpPr>
+        <p:spPr>
+          <a:xfrm>
+            <a:off x="3062472" y="423022"/>
+            <a:ext cx="1219200" cy="467684"/>
+          </a:xfrm>
+          <a:prstGeom prst="rect">
+            <a:avLst/>
+          </a:prstGeom>
+          <a:solidFill>
+            <a:srgbClr val="0070C0"/>
+          </a:solidFill>
+          <a:ln w="19050">
+            <a:solidFill>
+              <a:srgbClr val="0070C0"/>
+            </a:solidFill>
+          </a:ln>
+          <a:effectLst/>
+        </p:spPr>
+        <p:style>
+          <a:lnRef idx="1">
+            <a:schemeClr val="accent2"/>
+          </a:lnRef>
+          <a:fillRef idx="2">
+            <a:schemeClr val="accent2"/>
+          </a:fillRef>
+          <a:effectRef idx="1">
+            <a:schemeClr val="accent2"/>
+          </a:effectRef>
+          <a:fontRef idx="minor">
+            <a:schemeClr val="dk1"/>
+          </a:fontRef>
+        </p:style>
+        <p:txBody>
+          <a:bodyPr rtlCol="0" anchor="ctr"/>
+          <a:lstStyle/>
+          <a:p>
+            <a:pPr algn="ctr"/>
+            <a:r>
+              <a:rPr lang="en-US" sz="1600" dirty="0">
+                <a:solidFill>
+                  <a:schemeClr val="bg1"/>
+                </a:solidFill>
+              </a:rPr>
+              <a:t>:Command</a:t>
+            </a:r>
+          </a:p>
+          <a:p>
+            <a:pPr algn="ctr"/>
+            <a:r>
+              <a:rPr lang="en-US" sz="1600" dirty="0">
+                <a:solidFill>
+                  <a:schemeClr val="bg1"/>
+                </a:solidFill>
+              </a:rPr>
+              <a:t>Parser</a:t>
+            </a:r>
+            <a:endParaRPr lang="en-SG" sz="1600" dirty="0">
+              <a:solidFill>
+                <a:schemeClr val="bg1"/>
+              </a:solidFill>
+            </a:endParaRPr>
+          </a:p>
+        </p:txBody>
+      </p:sp>
+      <p:cxnSp>
+        <p:nvCxnSpPr>
+          <p:cNvPr id="17" name="Straight Connector 16"/>
+          <p:cNvCxnSpPr>
+            <a:cxnSpLocks/>
+          </p:cNvCxnSpPr>
+          <p:nvPr/>
+        </p:nvCxnSpPr>
+        <p:spPr>
+          <a:xfrm>
+            <a:off x="3675871" y="907617"/>
+            <a:ext cx="0" cy="1482984"/>
+          </a:xfrm>
+          <a:prstGeom prst="line">
+            <a:avLst/>
+          </a:prstGeom>
+          <a:ln w="19050">
+            <a:solidFill>
+              <a:srgbClr val="0070C0"/>
+            </a:solidFill>
+            <a:prstDash val="sysDash"/>
+          </a:ln>
+          <a:effectLst/>
+        </p:spPr>
+        <p:style>
+          <a:lnRef idx="1">
+            <a:schemeClr val="accent1"/>
+          </a:lnRef>
+          <a:fillRef idx="2">
+            <a:schemeClr val="accent1"/>
+          </a:fillRef>
+          <a:effectRef idx="1">
+            <a:schemeClr val="accent1"/>
+          </a:effectRef>
+          <a:fontRef idx="minor">
+            <a:schemeClr val="dk1"/>
+          </a:fontRef>
+        </p:style>
+      </p:cxnSp>
+      <p:sp>
+        <p:nvSpPr>
+          <p:cNvPr id="18" name="Rectangle 17"/>
+          <p:cNvSpPr/>
+          <p:nvPr/>
+        </p:nvSpPr>
+        <p:spPr>
+          <a:xfrm>
+            <a:off x="3603864" y="1365810"/>
+            <a:ext cx="154408" cy="767790"/>
+          </a:xfrm>
+          <a:prstGeom prst="rect">
+            <a:avLst/>
+          </a:prstGeom>
+          <a:solidFill>
+            <a:srgbClr val="0070C0"/>
+          </a:solidFill>
+          <a:ln>
+            <a:solidFill>
+              <a:srgbClr val="0070C0"/>
+            </a:solidFill>
+          </a:ln>
+          <a:effectLst/>
+        </p:spPr>
+        <p:style>
+          <a:lnRef idx="1">
+            <a:schemeClr val="accent3"/>
+          </a:lnRef>
+          <a:fillRef idx="2">
+            <a:schemeClr val="accent3"/>
+          </a:fillRef>
+          <a:effectRef idx="1">
+            <a:schemeClr val="accent3"/>
+          </a:effectRef>
+          <a:fontRef idx="minor">
+            <a:schemeClr val="dk1"/>
+          </a:fontRef>
+        </p:style>
+        <p:txBody>
+          <a:bodyPr rtlCol="0" anchor="ctr"/>
+          <a:lstStyle/>
+          <a:p>
+            <a:pPr algn="ctr"/>
+            <a:endParaRPr lang="en-SG" sz="1400">
+              <a:solidFill>
+                <a:schemeClr val="dk1"/>
+              </a:solidFill>
+            </a:endParaRPr>
+          </a:p>
+        </p:txBody>
+      </p:sp>
+      <p:cxnSp>
+        <p:nvCxnSpPr>
+          <p:cNvPr id="20" name="Straight Connector 19"/>
+          <p:cNvCxnSpPr>
+            <a:cxnSpLocks/>
+            <a:endCxn id="4" idx="0"/>
+          </p:cNvCxnSpPr>
+          <p:nvPr/>
+        </p:nvCxnSpPr>
+        <p:spPr>
+          <a:xfrm flipH="1">
+            <a:off x="4659642" y="1772372"/>
+            <a:ext cx="8570" cy="4635273"/>
+          </a:xfrm>
+          <a:prstGeom prst="line">
+            <a:avLst/>
+          </a:prstGeom>
+          <a:ln w="19050">
+            <a:solidFill>
+              <a:srgbClr val="0070C0"/>
+            </a:solidFill>
+            <a:prstDash val="sysDash"/>
+          </a:ln>
+          <a:effectLst/>
+        </p:spPr>
+        <p:style>
+          <a:lnRef idx="1">
+            <a:schemeClr val="accent1"/>
+          </a:lnRef>
+          <a:fillRef idx="2">
+            <a:schemeClr val="accent1"/>
+          </a:fillRef>
+          <a:effectRef idx="1">
+            <a:schemeClr val="accent1"/>
+          </a:effectRef>
+          <a:fontRef idx="minor">
+            <a:schemeClr val="dk1"/>
+          </a:fontRef>
+        </p:style>
+      </p:cxnSp>
+      <p:sp>
+        <p:nvSpPr>
+          <p:cNvPr id="21" name="Rectangle 20"/>
+          <p:cNvSpPr/>
+          <p:nvPr/>
+        </p:nvSpPr>
+        <p:spPr>
+          <a:xfrm>
+            <a:off x="4588479" y="1613640"/>
+            <a:ext cx="152400" cy="276003"/>
+          </a:xfrm>
+          <a:prstGeom prst="rect">
+            <a:avLst/>
+          </a:prstGeom>
+          <a:solidFill>
+            <a:srgbClr val="0070C0"/>
+          </a:solidFill>
+          <a:ln>
+            <a:solidFill>
+              <a:srgbClr val="0070C0"/>
+            </a:solidFill>
+          </a:ln>
+          <a:effectLst/>
+        </p:spPr>
+        <p:style>
+          <a:lnRef idx="1">
+            <a:schemeClr val="accent3"/>
+          </a:lnRef>
+          <a:fillRef idx="2">
+            <a:schemeClr val="accent3"/>
+          </a:fillRef>
+          <a:effectRef idx="1">
+            <a:schemeClr val="accent3"/>
+          </a:effectRef>
+          <a:fontRef idx="minor">
+            <a:schemeClr val="dk1"/>
+          </a:fontRef>
+        </p:style>
+        <p:txBody>
+          <a:bodyPr rtlCol="0" anchor="ctr"/>
+          <a:lstStyle/>
+          <a:p>
+            <a:pPr algn="ctr"/>
+            <a:endParaRPr lang="en-SG" sz="1400"/>
+          </a:p>
+        </p:txBody>
+      </p:sp>
+      <p:cxnSp>
+        <p:nvCxnSpPr>
+          <p:cNvPr id="23" name="Straight Arrow Connector 22"/>
+          <p:cNvCxnSpPr>
+            <a:cxnSpLocks/>
+          </p:cNvCxnSpPr>
+          <p:nvPr/>
+        </p:nvCxnSpPr>
+        <p:spPr>
+          <a:xfrm>
+            <a:off x="-170977" y="1261999"/>
+            <a:ext cx="1335212" cy="0"/>
+          </a:xfrm>
+          <a:prstGeom prst="straightConnector1">
+            <a:avLst/>
+          </a:prstGeom>
+          <a:ln w="19050">
+            <a:solidFill>
+              <a:srgbClr val="00B050"/>
+            </a:solidFill>
+            <a:tailEnd type="arrow"/>
+          </a:ln>
+        </p:spPr>
+        <p:style>
+          <a:lnRef idx="1">
+            <a:schemeClr val="accent1"/>
+          </a:lnRef>
+          <a:fillRef idx="0">
+            <a:schemeClr val="accent1"/>
+          </a:fillRef>
+          <a:effectRef idx="0">
+            <a:schemeClr val="accent1"/>
+          </a:effectRef>
+          <a:fontRef idx="minor">
+            <a:schemeClr val="tx1"/>
+          </a:fontRef>
+        </p:style>
+      </p:cxnSp>
+      <p:sp>
+        <p:nvSpPr>
+          <p:cNvPr id="26" name="TextBox 25"/>
+          <p:cNvSpPr txBox="1"/>
+          <p:nvPr/>
+        </p:nvSpPr>
+        <p:spPr>
+          <a:xfrm>
+            <a:off x="-388933" y="1029970"/>
+            <a:ext cx="1488062" cy="215444"/>
+          </a:xfrm>
+          <a:prstGeom prst="rect">
+            <a:avLst/>
+          </a:prstGeom>
+          <a:noFill/>
+        </p:spPr>
+        <p:txBody>
+          <a:bodyPr wrap="square" lIns="0" tIns="0" rIns="0" bIns="0" rtlCol="0">
+            <a:spAutoFit/>
+          </a:bodyPr>
+          <a:lstStyle/>
+          <a:p>
+            <a:pPr algn="r"/>
+            <a:r>
+              <a:rPr lang="en-US" sz="1400" dirty="0">
+                <a:solidFill>
+                  <a:srgbClr val="0070C0"/>
+                </a:solidFill>
+              </a:rPr>
+              <a:t>execute(“</a:t>
+            </a:r>
+            <a:r>
+              <a:rPr lang="en-US" sz="1400" dirty="0" err="1">
+                <a:solidFill>
+                  <a:srgbClr val="0070C0"/>
+                </a:solidFill>
+              </a:rPr>
+              <a:t>ans</a:t>
+            </a:r>
+            <a:r>
+              <a:rPr lang="en-US" sz="1400" dirty="0">
+                <a:solidFill>
+                  <a:srgbClr val="0070C0"/>
+                </a:solidFill>
+              </a:rPr>
+              <a:t> four”)</a:t>
+            </a:r>
+          </a:p>
+        </p:txBody>
+      </p:sp>
+      <p:cxnSp>
+        <p:nvCxnSpPr>
+          <p:cNvPr id="28" name="Straight Arrow Connector 27"/>
+          <p:cNvCxnSpPr>
+            <a:cxnSpLocks/>
+            <a:endCxn id="19" idx="1"/>
+          </p:cNvCxnSpPr>
+          <p:nvPr/>
+        </p:nvCxnSpPr>
+        <p:spPr>
+          <a:xfrm>
+            <a:off x="3769441" y="1491037"/>
+            <a:ext cx="345359" cy="0"/>
+          </a:xfrm>
+          <a:prstGeom prst="straightConnector1">
+            <a:avLst/>
+          </a:prstGeom>
+          <a:ln w="19050">
+            <a:solidFill>
+              <a:srgbClr val="0070C0"/>
+            </a:solidFill>
+            <a:tailEnd type="arrow"/>
+          </a:ln>
+        </p:spPr>
+        <p:style>
+          <a:lnRef idx="1">
+            <a:schemeClr val="accent1"/>
+          </a:lnRef>
+          <a:fillRef idx="0">
+            <a:schemeClr val="accent1"/>
+          </a:fillRef>
+          <a:effectRef idx="0">
+            <a:schemeClr val="accent1"/>
+          </a:effectRef>
+          <a:fontRef idx="minor">
+            <a:schemeClr val="tx1"/>
+          </a:fontRef>
+        </p:style>
+      </p:cxnSp>
+      <p:sp>
+        <p:nvSpPr>
+          <p:cNvPr id="29" name="TextBox 28"/>
+          <p:cNvSpPr txBox="1"/>
+          <p:nvPr/>
+        </p:nvSpPr>
+        <p:spPr>
+          <a:xfrm>
+            <a:off x="2868705" y="2484071"/>
+            <a:ext cx="855809" cy="215444"/>
+          </a:xfrm>
+          <a:prstGeom prst="rect">
+            <a:avLst/>
+          </a:prstGeom>
+          <a:noFill/>
+        </p:spPr>
+        <p:txBody>
+          <a:bodyPr wrap="square" lIns="0" tIns="0" rIns="0" bIns="0" rtlCol="0">
+            <a:spAutoFit/>
+          </a:bodyPr>
+          <a:lstStyle>
+            <a:defPPr>
+              <a:defRPr lang="en-US"/>
+            </a:defPPr>
+            <a:lvl1pPr algn="r">
+              <a:defRPr sz="1400">
+                <a:solidFill>
+                  <a:srgbClr val="0070C0"/>
+                </a:solidFill>
+              </a:defRPr>
+            </a:lvl1pPr>
+          </a:lstStyle>
+          <a:p>
+            <a:r>
+              <a:rPr lang="en-US" dirty="0"/>
+              <a:t>execute()</a:t>
+            </a:r>
+          </a:p>
+        </p:txBody>
+      </p:sp>
+      <p:cxnSp>
+        <p:nvCxnSpPr>
+          <p:cNvPr id="34" name="Straight Arrow Connector 33"/>
+          <p:cNvCxnSpPr>
+            <a:cxnSpLocks/>
+          </p:cNvCxnSpPr>
+          <p:nvPr/>
+        </p:nvCxnSpPr>
+        <p:spPr>
+          <a:xfrm>
+            <a:off x="3734392" y="1878232"/>
+            <a:ext cx="949256" cy="0"/>
+          </a:xfrm>
+          <a:prstGeom prst="straightConnector1">
+            <a:avLst/>
+          </a:prstGeom>
+          <a:ln w="19050">
+            <a:solidFill>
+              <a:srgbClr val="0070C0"/>
+            </a:solidFill>
+            <a:prstDash val="sysDash"/>
+            <a:headEnd type="arrow" w="med" len="med"/>
+            <a:tailEnd type="none" w="med" len="med"/>
+          </a:ln>
+        </p:spPr>
+        <p:style>
+          <a:lnRef idx="1">
+            <a:schemeClr val="accent1"/>
+          </a:lnRef>
+          <a:fillRef idx="0">
+            <a:schemeClr val="accent1"/>
+          </a:fillRef>
+          <a:effectRef idx="0">
+            <a:schemeClr val="accent1"/>
+          </a:effectRef>
+          <a:fontRef idx="minor">
+            <a:schemeClr val="tx1"/>
+          </a:fontRef>
+        </p:style>
+      </p:cxnSp>
+      <p:cxnSp>
+        <p:nvCxnSpPr>
+          <p:cNvPr id="35" name="Straight Arrow Connector 34"/>
+          <p:cNvCxnSpPr>
+            <a:cxnSpLocks/>
+          </p:cNvCxnSpPr>
+          <p:nvPr/>
+        </p:nvCxnSpPr>
+        <p:spPr>
+          <a:xfrm>
+            <a:off x="1316635" y="2133600"/>
+            <a:ext cx="2348067" cy="0"/>
+          </a:xfrm>
+          <a:prstGeom prst="straightConnector1">
+            <a:avLst/>
+          </a:prstGeom>
+          <a:ln w="19050">
+            <a:solidFill>
+              <a:srgbClr val="0070C0"/>
+            </a:solidFill>
+            <a:prstDash val="sysDash"/>
+            <a:headEnd type="arrow" w="med" len="med"/>
+            <a:tailEnd type="none" w="med" len="med"/>
+          </a:ln>
+        </p:spPr>
+        <p:style>
+          <a:lnRef idx="1">
+            <a:schemeClr val="accent1"/>
+          </a:lnRef>
+          <a:fillRef idx="0">
+            <a:schemeClr val="accent1"/>
+          </a:fillRef>
+          <a:effectRef idx="0">
+            <a:schemeClr val="accent1"/>
+          </a:effectRef>
+          <a:fontRef idx="minor">
+            <a:schemeClr val="tx1"/>
+          </a:fontRef>
+        </p:style>
+      </p:cxnSp>
+      <p:cxnSp>
+        <p:nvCxnSpPr>
+          <p:cNvPr id="37" name="Straight Arrow Connector 36"/>
+          <p:cNvCxnSpPr>
+            <a:cxnSpLocks/>
+          </p:cNvCxnSpPr>
+          <p:nvPr/>
+        </p:nvCxnSpPr>
+        <p:spPr>
+          <a:xfrm>
+            <a:off x="-325717" y="6422387"/>
+            <a:ext cx="1475019" cy="0"/>
+          </a:xfrm>
+          <a:prstGeom prst="straightConnector1">
+            <a:avLst/>
+          </a:prstGeom>
+          <a:ln w="19050">
+            <a:solidFill>
+              <a:schemeClr val="accent1"/>
+            </a:solidFill>
+            <a:prstDash val="sysDash"/>
+            <a:headEnd type="arrow" w="med" len="med"/>
+            <a:tailEnd type="none" w="med" len="med"/>
+          </a:ln>
+        </p:spPr>
+        <p:style>
+          <a:lnRef idx="1">
+            <a:schemeClr val="accent1"/>
+          </a:lnRef>
+          <a:fillRef idx="0">
+            <a:schemeClr val="accent1"/>
+          </a:fillRef>
+          <a:effectRef idx="0">
+            <a:schemeClr val="accent1"/>
+          </a:effectRef>
+          <a:fontRef idx="minor">
+            <a:schemeClr val="tx1"/>
+          </a:fontRef>
+        </p:style>
+      </p:cxnSp>
+      <p:sp>
+        <p:nvSpPr>
+          <p:cNvPr id="65" name="Rectangle 64"/>
+          <p:cNvSpPr/>
+          <p:nvPr/>
+        </p:nvSpPr>
+        <p:spPr>
+          <a:xfrm>
+            <a:off x="4571226" y="2743200"/>
+            <a:ext cx="176833" cy="3505200"/>
+          </a:xfrm>
+          <a:prstGeom prst="rect">
+            <a:avLst/>
+          </a:prstGeom>
+          <a:solidFill>
+            <a:srgbClr val="0070C0"/>
+          </a:solidFill>
+          <a:ln>
+            <a:solidFill>
+              <a:srgbClr val="0070C0"/>
+            </a:solidFill>
+          </a:ln>
+          <a:effectLst/>
+        </p:spPr>
+        <p:style>
+          <a:lnRef idx="1">
+            <a:schemeClr val="accent3"/>
+          </a:lnRef>
+          <a:fillRef idx="2">
+            <a:schemeClr val="accent3"/>
+          </a:fillRef>
+          <a:effectRef idx="1">
+            <a:schemeClr val="accent3"/>
+          </a:effectRef>
+          <a:fontRef idx="minor">
+            <a:schemeClr val="dk1"/>
+          </a:fontRef>
+        </p:style>
+        <p:txBody>
+          <a:bodyPr rtlCol="0" anchor="ctr"/>
+          <a:lstStyle/>
+          <a:p>
+            <a:pPr algn="ctr"/>
+            <a:endParaRPr lang="en-SG" sz="1400"/>
+          </a:p>
+        </p:txBody>
+      </p:sp>
+      <p:sp>
+        <p:nvSpPr>
+          <p:cNvPr id="79" name="TextBox 78"/>
+          <p:cNvSpPr txBox="1"/>
+          <p:nvPr/>
+        </p:nvSpPr>
+        <p:spPr>
+          <a:xfrm>
+            <a:off x="5691757" y="2653306"/>
+            <a:ext cx="1506699" cy="184666"/>
+          </a:xfrm>
+          <a:prstGeom prst="rect">
+            <a:avLst/>
+          </a:prstGeom>
+          <a:noFill/>
+        </p:spPr>
+        <p:txBody>
+          <a:bodyPr wrap="square" lIns="0" tIns="0" rIns="0" bIns="0" rtlCol="0">
+            <a:spAutoFit/>
+          </a:bodyPr>
+          <a:lstStyle>
+            <a:defPPr>
+              <a:defRPr lang="en-US"/>
+            </a:defPPr>
+            <a:lvl1pPr algn="r">
+              <a:defRPr sz="1400">
+                <a:solidFill>
+                  <a:srgbClr val="0070C0"/>
+                </a:solidFill>
+              </a:defRPr>
+            </a:lvl1pPr>
+          </a:lstStyle>
+          <a:p>
+            <a:r>
+              <a:rPr lang="en-US" sz="1200" dirty="0" err="1">
+                <a:solidFill>
+                  <a:schemeClr val="accent4">
+                    <a:lumMod val="75000"/>
+                  </a:schemeClr>
+                </a:solidFill>
+              </a:rPr>
+              <a:t>setCardAsAnswered</a:t>
+            </a:r>
+            <a:r>
+              <a:rPr lang="en-US" sz="1200" dirty="0">
+                <a:solidFill>
+                  <a:schemeClr val="accent4">
+                    <a:lumMod val="75000"/>
+                  </a:schemeClr>
+                </a:solidFill>
+              </a:rPr>
+              <a:t>(</a:t>
+            </a:r>
+            <a:r>
+              <a:rPr lang="en-US" sz="1200" dirty="0">
+                <a:solidFill>
+                  <a:srgbClr val="7030A0"/>
+                </a:solidFill>
+              </a:rPr>
+              <a:t>)</a:t>
+            </a:r>
+            <a:endParaRPr lang="en-US" sz="1200" dirty="0"/>
+          </a:p>
+        </p:txBody>
+      </p:sp>
+      <p:sp>
+        <p:nvSpPr>
+          <p:cNvPr id="80" name="TextBox 79"/>
+          <p:cNvSpPr txBox="1"/>
+          <p:nvPr/>
+        </p:nvSpPr>
+        <p:spPr>
+          <a:xfrm>
+            <a:off x="1392334" y="1106150"/>
+            <a:ext cx="2036666" cy="215444"/>
+          </a:xfrm>
+          <a:prstGeom prst="rect">
+            <a:avLst/>
+          </a:prstGeom>
+          <a:noFill/>
+        </p:spPr>
+        <p:txBody>
+          <a:bodyPr wrap="square" lIns="0" tIns="0" rIns="0" bIns="0" rtlCol="0">
+            <a:spAutoFit/>
+          </a:bodyPr>
+          <a:lstStyle>
+            <a:defPPr>
+              <a:defRPr lang="en-US"/>
+            </a:defPPr>
+            <a:lvl1pPr algn="r">
+              <a:defRPr sz="1400">
+                <a:solidFill>
+                  <a:srgbClr val="0070C0"/>
+                </a:solidFill>
+              </a:defRPr>
+            </a:lvl1pPr>
+          </a:lstStyle>
+          <a:p>
+            <a:r>
+              <a:rPr lang="en-US" dirty="0" err="1"/>
+              <a:t>parseCommand</a:t>
+            </a:r>
+            <a:r>
+              <a:rPr lang="en-US" dirty="0"/>
+              <a:t>(“</a:t>
+            </a:r>
+            <a:r>
+              <a:rPr lang="en-US" dirty="0" err="1"/>
+              <a:t>ans</a:t>
+            </a:r>
+            <a:r>
+              <a:rPr lang="en-US" dirty="0"/>
+              <a:t> four”)</a:t>
+            </a:r>
+          </a:p>
+        </p:txBody>
+      </p:sp>
+      <p:sp>
+        <p:nvSpPr>
+          <p:cNvPr id="82" name="TextBox 81"/>
+          <p:cNvSpPr txBox="1"/>
+          <p:nvPr/>
+        </p:nvSpPr>
+        <p:spPr>
+          <a:xfrm>
+            <a:off x="2438088" y="6021105"/>
+            <a:ext cx="621216" cy="215444"/>
+          </a:xfrm>
+          <a:prstGeom prst="rect">
+            <a:avLst/>
+          </a:prstGeom>
+          <a:noFill/>
+        </p:spPr>
+        <p:txBody>
+          <a:bodyPr wrap="square" lIns="0" tIns="0" rIns="0" bIns="0" rtlCol="0">
+            <a:spAutoFit/>
+          </a:bodyPr>
+          <a:lstStyle>
+            <a:defPPr>
+              <a:defRPr lang="en-US"/>
+            </a:defPPr>
+            <a:lvl1pPr algn="r">
+              <a:defRPr sz="1400">
+                <a:solidFill>
+                  <a:srgbClr val="0070C0"/>
+                </a:solidFill>
+              </a:defRPr>
+            </a:lvl1pPr>
+          </a:lstStyle>
+          <a:p>
+            <a:r>
+              <a:rPr lang="en-US" dirty="0"/>
+              <a:t>r</a:t>
+            </a:r>
+          </a:p>
+        </p:txBody>
+      </p:sp>
+      <p:sp>
+        <p:nvSpPr>
+          <p:cNvPr id="83" name="TextBox 82"/>
+          <p:cNvSpPr txBox="1"/>
+          <p:nvPr/>
+        </p:nvSpPr>
+        <p:spPr>
+          <a:xfrm>
+            <a:off x="260733" y="6206332"/>
+            <a:ext cx="330290" cy="215443"/>
+          </a:xfrm>
+          <a:prstGeom prst="rect">
+            <a:avLst/>
+          </a:prstGeom>
+          <a:noFill/>
+        </p:spPr>
+        <p:txBody>
+          <a:bodyPr wrap="square" lIns="0" tIns="0" rIns="0" bIns="0" rtlCol="0">
+            <a:spAutoFit/>
+          </a:bodyPr>
+          <a:lstStyle>
+            <a:defPPr>
+              <a:defRPr lang="en-US"/>
+            </a:defPPr>
+            <a:lvl1pPr algn="r">
+              <a:defRPr sz="1400">
+                <a:solidFill>
+                  <a:srgbClr val="0070C0"/>
+                </a:solidFill>
+              </a:defRPr>
+            </a:lvl1pPr>
+          </a:lstStyle>
+          <a:p>
+            <a:r>
+              <a:rPr lang="en-US" dirty="0"/>
+              <a:t>r</a:t>
+            </a:r>
+          </a:p>
+        </p:txBody>
+      </p:sp>
+      <p:sp>
+        <p:nvSpPr>
+          <p:cNvPr id="84" name="Rectangle 62"/>
+          <p:cNvSpPr/>
+          <p:nvPr/>
+        </p:nvSpPr>
+        <p:spPr>
+          <a:xfrm>
+            <a:off x="10409847" y="4133505"/>
+            <a:ext cx="1125906" cy="590894"/>
+          </a:xfrm>
+          <a:prstGeom prst="rect">
+            <a:avLst/>
+          </a:prstGeom>
+          <a:solidFill>
+            <a:srgbClr val="7030A0"/>
+          </a:solidFill>
+          <a:ln w="19050">
+            <a:solidFill>
+              <a:srgbClr val="7030A0"/>
+            </a:solidFill>
+          </a:ln>
+          <a:effectLst/>
+        </p:spPr>
+        <p:style>
+          <a:lnRef idx="1">
+            <a:schemeClr val="accent2"/>
+          </a:lnRef>
+          <a:fillRef idx="2">
+            <a:schemeClr val="accent2"/>
+          </a:fillRef>
+          <a:effectRef idx="1">
+            <a:schemeClr val="accent2"/>
+          </a:effectRef>
+          <a:fontRef idx="minor">
+            <a:schemeClr val="dk1"/>
+          </a:fontRef>
+        </p:style>
+        <p:txBody>
+          <a:bodyPr rtlCol="0" anchor="ctr"/>
+          <a:lstStyle/>
+          <a:p>
+            <a:pPr algn="ctr"/>
+            <a:r>
+              <a:rPr lang="en-US" sz="1600" dirty="0">
+                <a:solidFill>
+                  <a:schemeClr val="bg1"/>
+                </a:solidFill>
+              </a:rPr>
+              <a:t>:</a:t>
+            </a:r>
+            <a:r>
+              <a:rPr lang="en-US" sz="1600" dirty="0" err="1">
+                <a:solidFill>
+                  <a:schemeClr val="bg1"/>
+                </a:solidFill>
+              </a:rPr>
+              <a:t>VersionedCardFolder</a:t>
+            </a:r>
+            <a:endParaRPr lang="en-SG" sz="1600" dirty="0">
+              <a:solidFill>
+                <a:schemeClr val="bg1"/>
+              </a:solidFill>
+            </a:endParaRPr>
+          </a:p>
+        </p:txBody>
+      </p:sp>
+      <p:sp>
+        <p:nvSpPr>
+          <p:cNvPr id="93" name="TextBox 92"/>
+          <p:cNvSpPr txBox="1"/>
+          <p:nvPr/>
+        </p:nvSpPr>
+        <p:spPr>
+          <a:xfrm>
+            <a:off x="2350076" y="1905793"/>
+            <a:ext cx="220343" cy="215444"/>
+          </a:xfrm>
+          <a:prstGeom prst="rect">
+            <a:avLst/>
+          </a:prstGeom>
+          <a:noFill/>
+        </p:spPr>
+        <p:txBody>
+          <a:bodyPr wrap="square" lIns="0" tIns="0" rIns="0" bIns="0" rtlCol="0">
+            <a:spAutoFit/>
+          </a:bodyPr>
+          <a:lstStyle>
+            <a:defPPr>
+              <a:defRPr lang="en-US"/>
+            </a:defPPr>
+            <a:lvl1pPr algn="r">
+              <a:defRPr sz="1400">
+                <a:solidFill>
+                  <a:srgbClr val="0070C0"/>
+                </a:solidFill>
+              </a:defRPr>
+            </a:lvl1pPr>
+          </a:lstStyle>
+          <a:p>
+            <a:r>
+              <a:rPr lang="en-US" dirty="0"/>
+              <a:t>a</a:t>
+            </a:r>
+          </a:p>
+        </p:txBody>
+      </p:sp>
+      <p:sp>
+        <p:nvSpPr>
+          <p:cNvPr id="40" name="Rectangle 62"/>
+          <p:cNvSpPr/>
+          <p:nvPr/>
+        </p:nvSpPr>
+        <p:spPr>
+          <a:xfrm>
+            <a:off x="8156249" y="2362200"/>
+            <a:ext cx="841636" cy="300180"/>
+          </a:xfrm>
+          <a:prstGeom prst="rect">
+            <a:avLst/>
+          </a:prstGeom>
+          <a:solidFill>
+            <a:srgbClr val="7030A0"/>
+          </a:solidFill>
+          <a:ln w="19050">
+            <a:solidFill>
+              <a:srgbClr val="7030A0"/>
+            </a:solidFill>
+          </a:ln>
+          <a:effectLst/>
+        </p:spPr>
+        <p:style>
+          <a:lnRef idx="1">
+            <a:schemeClr val="accent2"/>
+          </a:lnRef>
+          <a:fillRef idx="2">
+            <a:schemeClr val="accent2"/>
+          </a:fillRef>
+          <a:effectRef idx="1">
+            <a:schemeClr val="accent2"/>
+          </a:effectRef>
+          <a:fontRef idx="minor">
+            <a:schemeClr val="dk1"/>
+          </a:fontRef>
+        </p:style>
+        <p:txBody>
+          <a:bodyPr rtlCol="0" anchor="ctr"/>
+          <a:lstStyle/>
+          <a:p>
+            <a:pPr algn="ctr"/>
+            <a:r>
+              <a:rPr lang="en-US" sz="1600" dirty="0">
+                <a:solidFill>
+                  <a:schemeClr val="bg1"/>
+                </a:solidFill>
+              </a:rPr>
+              <a:t>: Model</a:t>
+            </a:r>
+            <a:endParaRPr lang="en-SG" sz="1600" dirty="0">
+              <a:solidFill>
+                <a:schemeClr val="bg1"/>
+              </a:solidFill>
+            </a:endParaRPr>
+          </a:p>
+        </p:txBody>
+      </p:sp>
+      <p:cxnSp>
+        <p:nvCxnSpPr>
+          <p:cNvPr id="46" name="Straight Connector 45"/>
+          <p:cNvCxnSpPr>
+            <a:cxnSpLocks/>
+          </p:cNvCxnSpPr>
+          <p:nvPr/>
+        </p:nvCxnSpPr>
+        <p:spPr>
+          <a:xfrm flipH="1">
+            <a:off x="8586536" y="2653306"/>
+            <a:ext cx="10399" cy="3242431"/>
+          </a:xfrm>
+          <a:prstGeom prst="line">
+            <a:avLst/>
+          </a:prstGeom>
+          <a:ln w="19050">
+            <a:solidFill>
+              <a:srgbClr val="7030A0"/>
+            </a:solidFill>
+            <a:prstDash val="sysDash"/>
+          </a:ln>
+          <a:effectLst/>
+        </p:spPr>
+        <p:style>
+          <a:lnRef idx="1">
+            <a:schemeClr val="accent1"/>
+          </a:lnRef>
+          <a:fillRef idx="2">
+            <a:schemeClr val="accent1"/>
+          </a:fillRef>
+          <a:effectRef idx="1">
+            <a:schemeClr val="accent1"/>
+          </a:effectRef>
+          <a:fontRef idx="minor">
+            <a:schemeClr val="dk1"/>
+          </a:fontRef>
+        </p:style>
+      </p:cxnSp>
+      <p:sp>
+        <p:nvSpPr>
+          <p:cNvPr id="49" name="Rectangle 48"/>
+          <p:cNvSpPr/>
+          <p:nvPr/>
+        </p:nvSpPr>
+        <p:spPr>
+          <a:xfrm>
+            <a:off x="8502584" y="4484841"/>
+            <a:ext cx="160323" cy="177679"/>
+          </a:xfrm>
+          <a:prstGeom prst="rect">
+            <a:avLst/>
+          </a:prstGeom>
+          <a:solidFill>
+            <a:srgbClr val="7030A0"/>
+          </a:solidFill>
+          <a:ln>
+            <a:solidFill>
+              <a:srgbClr val="7030A0"/>
+            </a:solidFill>
+          </a:ln>
+          <a:effectLst/>
+        </p:spPr>
+        <p:style>
+          <a:lnRef idx="1">
+            <a:schemeClr val="accent3"/>
+          </a:lnRef>
+          <a:fillRef idx="2">
+            <a:schemeClr val="accent3"/>
+          </a:fillRef>
+          <a:effectRef idx="1">
+            <a:schemeClr val="accent3"/>
+          </a:effectRef>
+          <a:fontRef idx="minor">
+            <a:schemeClr val="dk1"/>
+          </a:fontRef>
+        </p:style>
+        <p:txBody>
+          <a:bodyPr rtlCol="0" anchor="ctr"/>
+          <a:lstStyle/>
+          <a:p>
+            <a:pPr algn="ctr"/>
+            <a:endParaRPr lang="en-SG" sz="1400"/>
+          </a:p>
+        </p:txBody>
+      </p:sp>
+      <p:cxnSp>
+        <p:nvCxnSpPr>
+          <p:cNvPr id="50" name="Straight Arrow Connector 49"/>
+          <p:cNvCxnSpPr>
+            <a:cxnSpLocks/>
+          </p:cNvCxnSpPr>
+          <p:nvPr/>
+        </p:nvCxnSpPr>
+        <p:spPr>
+          <a:xfrm>
+            <a:off x="4750212" y="2895600"/>
+            <a:ext cx="3752372" cy="0"/>
+          </a:xfrm>
+          <a:prstGeom prst="straightConnector1">
+            <a:avLst/>
+          </a:prstGeom>
+          <a:ln w="19050">
+            <a:solidFill>
+              <a:srgbClr val="0070C0"/>
+            </a:solidFill>
+            <a:tailEnd type="arrow"/>
+          </a:ln>
+        </p:spPr>
+        <p:style>
+          <a:lnRef idx="1">
+            <a:schemeClr val="accent1"/>
+          </a:lnRef>
+          <a:fillRef idx="0">
+            <a:schemeClr val="accent1"/>
+          </a:fillRef>
+          <a:effectRef idx="0">
+            <a:schemeClr val="accent1"/>
+          </a:effectRef>
+          <a:fontRef idx="minor">
+            <a:schemeClr val="tx1"/>
+          </a:fontRef>
+        </p:style>
+      </p:cxnSp>
+      <p:sp>
+        <p:nvSpPr>
+          <p:cNvPr id="4" name="TextBox 3"/>
+          <p:cNvSpPr txBox="1"/>
+          <p:nvPr/>
+        </p:nvSpPr>
+        <p:spPr>
+          <a:xfrm>
+            <a:off x="4530440" y="6407645"/>
+            <a:ext cx="258404" cy="261610"/>
+          </a:xfrm>
+          <a:prstGeom prst="rect">
+            <a:avLst/>
+          </a:prstGeom>
+          <a:noFill/>
+        </p:spPr>
+        <p:txBody>
+          <a:bodyPr wrap="none" rtlCol="0">
+            <a:spAutoFit/>
+          </a:bodyPr>
+          <a:lstStyle/>
+          <a:p>
+            <a:r>
+              <a:rPr lang="en-SG" sz="1100" dirty="0">
+                <a:solidFill>
+                  <a:srgbClr val="002060"/>
+                </a:solidFill>
+              </a:rPr>
+              <a:t>X</a:t>
+            </a:r>
+          </a:p>
+        </p:txBody>
+      </p:sp>
+      <p:sp>
+        <p:nvSpPr>
+          <p:cNvPr id="19" name="Rectangle 62"/>
+          <p:cNvSpPr/>
+          <p:nvPr/>
+        </p:nvSpPr>
+        <p:spPr>
+          <a:xfrm>
+            <a:off x="4114800" y="1260268"/>
+            <a:ext cx="1093635" cy="461538"/>
+          </a:xfrm>
+          <a:prstGeom prst="rect">
+            <a:avLst/>
+          </a:prstGeom>
+          <a:solidFill>
+            <a:srgbClr val="0070C0"/>
+          </a:solidFill>
+          <a:ln w="19050">
+            <a:solidFill>
+              <a:srgbClr val="0070C0"/>
+            </a:solidFill>
+          </a:ln>
+          <a:effectLst/>
+        </p:spPr>
+        <p:style>
+          <a:lnRef idx="1">
+            <a:schemeClr val="accent2"/>
+          </a:lnRef>
+          <a:fillRef idx="2">
+            <a:schemeClr val="accent2"/>
+          </a:fillRef>
+          <a:effectRef idx="1">
+            <a:schemeClr val="accent2"/>
+          </a:effectRef>
+          <a:fontRef idx="minor">
+            <a:schemeClr val="dk1"/>
+          </a:fontRef>
+        </p:style>
+        <p:txBody>
+          <a:bodyPr rtlCol="0" anchor="ctr"/>
+          <a:lstStyle/>
+          <a:p>
+            <a:pPr algn="ctr"/>
+            <a:r>
+              <a:rPr lang="en-US" sz="1600" dirty="0">
+                <a:solidFill>
+                  <a:schemeClr val="bg1"/>
+                </a:solidFill>
+              </a:rPr>
+              <a:t>a:Answer</a:t>
+            </a:r>
+            <a:br>
+              <a:rPr lang="en-US" sz="1600" dirty="0">
+                <a:solidFill>
+                  <a:schemeClr val="bg1"/>
+                </a:solidFill>
+              </a:rPr>
+            </a:br>
+            <a:r>
+              <a:rPr lang="en-US" sz="1600" dirty="0">
+                <a:solidFill>
+                  <a:schemeClr val="bg1"/>
+                </a:solidFill>
+              </a:rPr>
+              <a:t>Command</a:t>
+            </a:r>
+            <a:endParaRPr lang="en-SG" sz="1600" dirty="0">
+              <a:solidFill>
+                <a:schemeClr val="bg1"/>
+              </a:solidFill>
+            </a:endParaRPr>
+          </a:p>
+        </p:txBody>
+      </p:sp>
+      <p:cxnSp>
+        <p:nvCxnSpPr>
+          <p:cNvPr id="66" name="Straight Arrow Connector 65">
+            <a:extLst>
+              <a:ext uri="{FF2B5EF4-FFF2-40B4-BE49-F238E27FC236}">
+                <a16:creationId xmlns:a16="http://schemas.microsoft.com/office/drawing/2014/main" id="{39916E2E-195A-4DC8-B025-B05FA87E6796}"/>
+              </a:ext>
+            </a:extLst>
+          </p:cNvPr>
+          <p:cNvCxnSpPr>
+            <a:cxnSpLocks/>
+          </p:cNvCxnSpPr>
+          <p:nvPr/>
+        </p:nvCxnSpPr>
+        <p:spPr>
+          <a:xfrm flipV="1">
+            <a:off x="1316635" y="2731313"/>
+            <a:ext cx="3255365" cy="2"/>
+          </a:xfrm>
+          <a:prstGeom prst="straightConnector1">
+            <a:avLst/>
+          </a:prstGeom>
+          <a:ln w="19050">
+            <a:solidFill>
+              <a:srgbClr val="0070C0"/>
+            </a:solidFill>
+            <a:tailEnd type="arrow"/>
+          </a:ln>
+        </p:spPr>
+        <p:style>
+          <a:lnRef idx="1">
+            <a:schemeClr val="accent1"/>
+          </a:lnRef>
+          <a:fillRef idx="0">
+            <a:schemeClr val="accent1"/>
+          </a:fillRef>
+          <a:effectRef idx="0">
+            <a:schemeClr val="accent1"/>
+          </a:effectRef>
+          <a:fontRef idx="minor">
+            <a:schemeClr val="tx1"/>
+          </a:fontRef>
+        </p:style>
+      </p:cxnSp>
+      <p:cxnSp>
+        <p:nvCxnSpPr>
+          <p:cNvPr id="67" name="Straight Arrow Connector 66">
+            <a:extLst>
+              <a:ext uri="{FF2B5EF4-FFF2-40B4-BE49-F238E27FC236}">
+                <a16:creationId xmlns:a16="http://schemas.microsoft.com/office/drawing/2014/main" id="{D881596E-177C-4FDC-8E60-CAB90B3D5FAB}"/>
+              </a:ext>
+            </a:extLst>
+          </p:cNvPr>
+          <p:cNvCxnSpPr>
+            <a:cxnSpLocks/>
+          </p:cNvCxnSpPr>
+          <p:nvPr/>
+        </p:nvCxnSpPr>
+        <p:spPr>
+          <a:xfrm>
+            <a:off x="1333529" y="1363918"/>
+            <a:ext cx="2256705" cy="1"/>
+          </a:xfrm>
+          <a:prstGeom prst="straightConnector1">
+            <a:avLst/>
+          </a:prstGeom>
+          <a:ln w="19050">
+            <a:solidFill>
+              <a:srgbClr val="0070C0"/>
+            </a:solidFill>
+            <a:tailEnd type="arrow"/>
+          </a:ln>
+        </p:spPr>
+        <p:style>
+          <a:lnRef idx="1">
+            <a:schemeClr val="accent1"/>
+          </a:lnRef>
+          <a:fillRef idx="0">
+            <a:schemeClr val="accent1"/>
+          </a:fillRef>
+          <a:effectRef idx="0">
+            <a:schemeClr val="accent1"/>
+          </a:effectRef>
+          <a:fontRef idx="minor">
+            <a:schemeClr val="tx1"/>
+          </a:fontRef>
+        </p:style>
+      </p:cxnSp>
+      <p:cxnSp>
+        <p:nvCxnSpPr>
+          <p:cNvPr id="69" name="Straight Arrow Connector 68">
+            <a:extLst>
+              <a:ext uri="{FF2B5EF4-FFF2-40B4-BE49-F238E27FC236}">
+                <a16:creationId xmlns:a16="http://schemas.microsoft.com/office/drawing/2014/main" id="{7C9F21BC-13A9-471F-825A-2621FD36355F}"/>
+              </a:ext>
+            </a:extLst>
+          </p:cNvPr>
+          <p:cNvCxnSpPr>
+            <a:cxnSpLocks/>
+          </p:cNvCxnSpPr>
+          <p:nvPr/>
+        </p:nvCxnSpPr>
+        <p:spPr>
+          <a:xfrm flipV="1">
+            <a:off x="1299540" y="6232298"/>
+            <a:ext cx="3350119" cy="1"/>
+          </a:xfrm>
+          <a:prstGeom prst="straightConnector1">
+            <a:avLst/>
+          </a:prstGeom>
+          <a:ln w="19050">
+            <a:solidFill>
+              <a:srgbClr val="0070C0"/>
+            </a:solidFill>
+            <a:prstDash val="sysDash"/>
+            <a:headEnd type="arrow" w="med" len="med"/>
+            <a:tailEnd type="none" w="med" len="med"/>
+          </a:ln>
+        </p:spPr>
+        <p:style>
+          <a:lnRef idx="1">
+            <a:schemeClr val="accent1"/>
+          </a:lnRef>
+          <a:fillRef idx="0">
+            <a:schemeClr val="accent1"/>
+          </a:fillRef>
+          <a:effectRef idx="0">
+            <a:schemeClr val="accent1"/>
+          </a:effectRef>
+          <a:fontRef idx="minor">
+            <a:schemeClr val="tx1"/>
+          </a:fontRef>
+        </p:style>
+      </p:cxnSp>
+      <p:sp>
+        <p:nvSpPr>
+          <p:cNvPr id="41" name="TextBox 40"/>
+          <p:cNvSpPr txBox="1"/>
+          <p:nvPr/>
+        </p:nvSpPr>
+        <p:spPr>
+          <a:xfrm>
+            <a:off x="9373113" y="5220394"/>
+            <a:ext cx="792202" cy="184666"/>
+          </a:xfrm>
+          <a:prstGeom prst="rect">
+            <a:avLst/>
+          </a:prstGeom>
+          <a:noFill/>
+          <a:ln>
+            <a:noFill/>
+          </a:ln>
+        </p:spPr>
+        <p:txBody>
+          <a:bodyPr wrap="square" lIns="0" tIns="0" rIns="0" bIns="0" rtlCol="0">
+            <a:spAutoFit/>
+          </a:bodyPr>
+          <a:lstStyle>
+            <a:defPPr>
+              <a:defRPr lang="en-US"/>
+            </a:defPPr>
+            <a:lvl1pPr algn="r">
+              <a:defRPr sz="1400">
+                <a:solidFill>
+                  <a:srgbClr val="0070C0"/>
+                </a:solidFill>
+              </a:defRPr>
+            </a:lvl1pPr>
+          </a:lstStyle>
+          <a:p>
+            <a:r>
+              <a:rPr lang="en-US" sz="1200" dirty="0">
+                <a:solidFill>
+                  <a:srgbClr val="7030A0"/>
+                </a:solidFill>
+              </a:rPr>
+              <a:t>commit(</a:t>
+            </a:r>
+            <a:r>
+              <a:rPr lang="en-US" sz="1200" dirty="0">
+                <a:solidFill>
+                  <a:schemeClr val="accent4">
+                    <a:lumMod val="75000"/>
+                  </a:schemeClr>
+                </a:solidFill>
+              </a:rPr>
+              <a:t>)</a:t>
+            </a:r>
+          </a:p>
+        </p:txBody>
+      </p:sp>
+      <p:cxnSp>
+        <p:nvCxnSpPr>
+          <p:cNvPr id="63" name="Straight Arrow Connector 62">
+            <a:extLst>
+              <a:ext uri="{FF2B5EF4-FFF2-40B4-BE49-F238E27FC236}">
+                <a16:creationId xmlns:a16="http://schemas.microsoft.com/office/drawing/2014/main" id="{7C9F21BC-13A9-471F-825A-2621FD36355F}"/>
+              </a:ext>
+            </a:extLst>
+          </p:cNvPr>
+          <p:cNvCxnSpPr>
+            <a:cxnSpLocks/>
+          </p:cNvCxnSpPr>
+          <p:nvPr/>
+        </p:nvCxnSpPr>
+        <p:spPr>
+          <a:xfrm>
+            <a:off x="4748059" y="3551619"/>
+            <a:ext cx="3791128" cy="1"/>
+          </a:xfrm>
+          <a:prstGeom prst="straightConnector1">
+            <a:avLst/>
+          </a:prstGeom>
+          <a:ln w="19050">
+            <a:solidFill>
+              <a:srgbClr val="7030A0"/>
+            </a:solidFill>
+            <a:prstDash val="sysDash"/>
+            <a:headEnd type="arrow" w="med" len="med"/>
+            <a:tailEnd type="none" w="med" len="med"/>
+          </a:ln>
+        </p:spPr>
+        <p:style>
+          <a:lnRef idx="1">
+            <a:schemeClr val="accent1"/>
+          </a:lnRef>
+          <a:fillRef idx="0">
+            <a:schemeClr val="accent1"/>
+          </a:fillRef>
+          <a:effectRef idx="0">
+            <a:schemeClr val="accent1"/>
+          </a:effectRef>
+          <a:fontRef idx="minor">
+            <a:schemeClr val="tx1"/>
+          </a:fontRef>
+        </p:style>
+      </p:cxnSp>
+      <p:sp>
+        <p:nvSpPr>
+          <p:cNvPr id="43" name="Rectangle 42">
+            <a:extLst>
+              <a:ext uri="{FF2B5EF4-FFF2-40B4-BE49-F238E27FC236}">
+                <a16:creationId xmlns:a16="http://schemas.microsoft.com/office/drawing/2014/main" id="{D8899995-D8B3-48DB-83CC-4E947E18B5AB}"/>
+              </a:ext>
+            </a:extLst>
+          </p:cNvPr>
+          <p:cNvSpPr/>
+          <p:nvPr/>
+        </p:nvSpPr>
+        <p:spPr>
+          <a:xfrm>
+            <a:off x="8507541" y="4908869"/>
+            <a:ext cx="177469" cy="201567"/>
+          </a:xfrm>
+          <a:prstGeom prst="rect">
+            <a:avLst/>
+          </a:prstGeom>
+          <a:solidFill>
+            <a:srgbClr val="7030A0"/>
+          </a:solidFill>
+          <a:ln>
+            <a:solidFill>
+              <a:srgbClr val="7030A0"/>
+            </a:solidFill>
+          </a:ln>
+          <a:effectLst/>
+        </p:spPr>
+        <p:style>
+          <a:lnRef idx="1">
+            <a:schemeClr val="accent3"/>
+          </a:lnRef>
+          <a:fillRef idx="2">
+            <a:schemeClr val="accent3"/>
+          </a:fillRef>
+          <a:effectRef idx="1">
+            <a:schemeClr val="accent3"/>
+          </a:effectRef>
+          <a:fontRef idx="minor">
+            <a:schemeClr val="dk1"/>
+          </a:fontRef>
+        </p:style>
+        <p:txBody>
+          <a:bodyPr rtlCol="0" anchor="ctr"/>
+          <a:lstStyle/>
+          <a:p>
+            <a:pPr algn="ctr"/>
+            <a:endParaRPr lang="en-SG" sz="1400"/>
+          </a:p>
+        </p:txBody>
+      </p:sp>
+      <p:cxnSp>
+        <p:nvCxnSpPr>
+          <p:cNvPr id="45" name="Straight Arrow Connector 44">
+            <a:extLst>
+              <a:ext uri="{FF2B5EF4-FFF2-40B4-BE49-F238E27FC236}">
+                <a16:creationId xmlns:a16="http://schemas.microsoft.com/office/drawing/2014/main" id="{03EADA17-4AED-4AB7-876A-EB638DAEC97E}"/>
+              </a:ext>
+            </a:extLst>
+          </p:cNvPr>
+          <p:cNvCxnSpPr>
+            <a:cxnSpLocks/>
+          </p:cNvCxnSpPr>
+          <p:nvPr/>
+        </p:nvCxnSpPr>
+        <p:spPr>
+          <a:xfrm>
+            <a:off x="4769416" y="4488889"/>
+            <a:ext cx="3743799" cy="0"/>
+          </a:xfrm>
+          <a:prstGeom prst="straightConnector1">
+            <a:avLst/>
+          </a:prstGeom>
+          <a:ln w="19050">
+            <a:solidFill>
+              <a:srgbClr val="0070C0"/>
+            </a:solidFill>
+            <a:tailEnd type="arrow"/>
+          </a:ln>
+        </p:spPr>
+        <p:style>
+          <a:lnRef idx="1">
+            <a:schemeClr val="accent1"/>
+          </a:lnRef>
+          <a:fillRef idx="0">
+            <a:schemeClr val="accent1"/>
+          </a:fillRef>
+          <a:effectRef idx="0">
+            <a:schemeClr val="accent1"/>
+          </a:effectRef>
+          <a:fontRef idx="minor">
+            <a:schemeClr val="tx1"/>
+          </a:fontRef>
+        </p:style>
+      </p:cxnSp>
+      <p:sp>
+        <p:nvSpPr>
+          <p:cNvPr id="47" name="TextBox 46">
+            <a:extLst>
+              <a:ext uri="{FF2B5EF4-FFF2-40B4-BE49-F238E27FC236}">
+                <a16:creationId xmlns:a16="http://schemas.microsoft.com/office/drawing/2014/main" id="{E0B2A83B-1939-4B03-BDE6-AB851C1954EB}"/>
+              </a:ext>
+            </a:extLst>
+          </p:cNvPr>
+          <p:cNvSpPr txBox="1"/>
+          <p:nvPr/>
+        </p:nvSpPr>
+        <p:spPr>
+          <a:xfrm>
+            <a:off x="5502789" y="4299727"/>
+            <a:ext cx="2148604" cy="184666"/>
+          </a:xfrm>
+          <a:prstGeom prst="rect">
+            <a:avLst/>
+          </a:prstGeom>
+          <a:noFill/>
+        </p:spPr>
+        <p:txBody>
+          <a:bodyPr wrap="square" lIns="0" tIns="0" rIns="0" bIns="0" rtlCol="0">
+            <a:spAutoFit/>
+          </a:bodyPr>
+          <a:lstStyle>
+            <a:defPPr>
+              <a:defRPr lang="en-US"/>
+            </a:defPPr>
+            <a:lvl1pPr algn="r">
+              <a:defRPr sz="1400">
+                <a:solidFill>
+                  <a:srgbClr val="0070C0"/>
+                </a:solidFill>
+              </a:defRPr>
+            </a:lvl1pPr>
+          </a:lstStyle>
+          <a:p>
+            <a:r>
+              <a:rPr lang="en-US" sz="1200" dirty="0" err="1">
+                <a:solidFill>
+                  <a:schemeClr val="accent4">
+                    <a:lumMod val="75000"/>
+                  </a:schemeClr>
+                </a:solidFill>
+              </a:rPr>
+              <a:t>setCard</a:t>
+            </a:r>
+            <a:r>
+              <a:rPr lang="en-US" sz="1200" dirty="0">
+                <a:solidFill>
+                  <a:schemeClr val="accent4">
+                    <a:lumMod val="75000"/>
+                  </a:schemeClr>
+                </a:solidFill>
+              </a:rPr>
+              <a:t>(</a:t>
+            </a:r>
+            <a:r>
+              <a:rPr lang="en-US" sz="1200" dirty="0" err="1">
+                <a:solidFill>
+                  <a:schemeClr val="accent4">
+                    <a:lumMod val="75000"/>
+                  </a:schemeClr>
+                </a:solidFill>
+              </a:rPr>
+              <a:t>cardToMark</a:t>
+            </a:r>
+            <a:r>
+              <a:rPr lang="en-US" sz="1200" dirty="0">
+                <a:solidFill>
+                  <a:schemeClr val="accent4">
+                    <a:lumMod val="75000"/>
+                  </a:schemeClr>
+                </a:solidFill>
+              </a:rPr>
+              <a:t>, </a:t>
+            </a:r>
+            <a:r>
+              <a:rPr lang="en-US" sz="1200" dirty="0" err="1">
+                <a:solidFill>
+                  <a:schemeClr val="accent4">
+                    <a:lumMod val="75000"/>
+                  </a:schemeClr>
+                </a:solidFill>
+              </a:rPr>
+              <a:t>scoredCard</a:t>
+            </a:r>
+            <a:r>
+              <a:rPr lang="en-US" sz="1200" dirty="0">
+                <a:solidFill>
+                  <a:schemeClr val="accent4">
+                    <a:lumMod val="75000"/>
+                  </a:schemeClr>
+                </a:solidFill>
+              </a:rPr>
+              <a:t>)</a:t>
+            </a:r>
+            <a:endParaRPr lang="en-US" sz="1200" dirty="0"/>
+          </a:p>
+        </p:txBody>
+      </p:sp>
+      <p:sp>
+        <p:nvSpPr>
+          <p:cNvPr id="87" name="Rectangle 86">
+            <a:extLst>
+              <a:ext uri="{FF2B5EF4-FFF2-40B4-BE49-F238E27FC236}">
+                <a16:creationId xmlns:a16="http://schemas.microsoft.com/office/drawing/2014/main" id="{619B7847-51F1-424D-B0DA-C20D5609496E}"/>
+              </a:ext>
+            </a:extLst>
+          </p:cNvPr>
+          <p:cNvSpPr>
+            <a:spLocks/>
+          </p:cNvSpPr>
+          <p:nvPr/>
+        </p:nvSpPr>
+        <p:spPr>
+          <a:xfrm>
+            <a:off x="8492388" y="3373938"/>
+            <a:ext cx="177468" cy="177682"/>
+          </a:xfrm>
+          <a:prstGeom prst="rect">
+            <a:avLst/>
+          </a:prstGeom>
+          <a:solidFill>
+            <a:srgbClr val="7030A0"/>
+          </a:solidFill>
+          <a:ln>
+            <a:solidFill>
+              <a:srgbClr val="7030A0"/>
+            </a:solidFill>
+          </a:ln>
+          <a:effectLst>
+            <a:outerShdw blurRad="50800" dist="38100" dir="8100000" algn="tr" rotWithShape="0">
+              <a:prstClr val="black">
+                <a:alpha val="40000"/>
+              </a:prstClr>
+            </a:outerShdw>
+          </a:effectLst>
+        </p:spPr>
+        <p:style>
+          <a:lnRef idx="1">
+            <a:schemeClr val="accent3"/>
+          </a:lnRef>
+          <a:fillRef idx="2">
+            <a:schemeClr val="accent3"/>
+          </a:fillRef>
+          <a:effectRef idx="1">
+            <a:schemeClr val="accent3"/>
+          </a:effectRef>
+          <a:fontRef idx="minor">
+            <a:schemeClr val="dk1"/>
+          </a:fontRef>
+        </p:style>
+        <p:txBody>
+          <a:bodyPr rtlCol="0" anchor="ctr"/>
+          <a:lstStyle/>
+          <a:p>
+            <a:pPr algn="ctr"/>
+            <a:endParaRPr lang="en-SG" sz="1400"/>
+          </a:p>
+        </p:txBody>
+      </p:sp>
+      <p:sp>
+        <p:nvSpPr>
+          <p:cNvPr id="96" name="Rectangle 95">
+            <a:extLst>
+              <a:ext uri="{FF2B5EF4-FFF2-40B4-BE49-F238E27FC236}">
+                <a16:creationId xmlns:a16="http://schemas.microsoft.com/office/drawing/2014/main" id="{569BDD56-8E8E-4B8B-A571-7F3AA1D103E4}"/>
+              </a:ext>
+            </a:extLst>
+          </p:cNvPr>
+          <p:cNvSpPr>
+            <a:spLocks/>
+          </p:cNvSpPr>
+          <p:nvPr/>
+        </p:nvSpPr>
+        <p:spPr>
+          <a:xfrm>
+            <a:off x="4692432" y="3901615"/>
+            <a:ext cx="177468" cy="177682"/>
+          </a:xfrm>
+          <a:prstGeom prst="rect">
+            <a:avLst/>
+          </a:prstGeom>
+          <a:solidFill>
+            <a:srgbClr val="0070C0"/>
+          </a:solidFill>
+          <a:ln>
+            <a:solidFill>
+              <a:srgbClr val="0070C0"/>
+            </a:solidFill>
+          </a:ln>
+          <a:effectLst>
+            <a:outerShdw blurRad="50800" dist="38100" dir="8100000" algn="tr" rotWithShape="0">
+              <a:prstClr val="black">
+                <a:alpha val="40000"/>
+              </a:prstClr>
+            </a:outerShdw>
+          </a:effectLst>
+        </p:spPr>
+        <p:style>
+          <a:lnRef idx="1">
+            <a:schemeClr val="accent3"/>
+          </a:lnRef>
+          <a:fillRef idx="2">
+            <a:schemeClr val="accent3"/>
+          </a:fillRef>
+          <a:effectRef idx="1">
+            <a:schemeClr val="accent3"/>
+          </a:effectRef>
+          <a:fontRef idx="minor">
+            <a:schemeClr val="dk1"/>
+          </a:fontRef>
+        </p:style>
+        <p:txBody>
+          <a:bodyPr rtlCol="0" anchor="ctr"/>
+          <a:lstStyle/>
+          <a:p>
+            <a:pPr algn="ctr"/>
+            <a:endParaRPr lang="en-SG" sz="1400"/>
+          </a:p>
+        </p:txBody>
+      </p:sp>
+      <p:cxnSp>
+        <p:nvCxnSpPr>
+          <p:cNvPr id="97" name="Curved Connector 12">
+            <a:extLst>
+              <a:ext uri="{FF2B5EF4-FFF2-40B4-BE49-F238E27FC236}">
+                <a16:creationId xmlns:a16="http://schemas.microsoft.com/office/drawing/2014/main" id="{4813CD09-D166-454F-87F7-CBB7C05588A0}"/>
+              </a:ext>
+            </a:extLst>
+          </p:cNvPr>
+          <p:cNvCxnSpPr>
+            <a:cxnSpLocks/>
+          </p:cNvCxnSpPr>
+          <p:nvPr/>
+        </p:nvCxnSpPr>
+        <p:spPr>
+          <a:xfrm rot="16200000" flipH="1">
+            <a:off x="4714295" y="3776644"/>
+            <a:ext cx="156923" cy="76200"/>
+          </a:xfrm>
+          <a:prstGeom prst="curvedConnector4">
+            <a:avLst>
+              <a:gd name="adj1" fmla="val -8094"/>
+              <a:gd name="adj2" fmla="val 283333"/>
+            </a:avLst>
+          </a:prstGeom>
+          <a:ln>
+            <a:tailEnd type="triangle"/>
+          </a:ln>
+        </p:spPr>
+        <p:style>
+          <a:lnRef idx="1">
+            <a:schemeClr val="accent1"/>
+          </a:lnRef>
+          <a:fillRef idx="0">
+            <a:schemeClr val="accent1"/>
+          </a:fillRef>
+          <a:effectRef idx="0">
+            <a:schemeClr val="accent1"/>
+          </a:effectRef>
+          <a:fontRef idx="minor">
+            <a:schemeClr val="tx1"/>
+          </a:fontRef>
+        </p:style>
+      </p:cxnSp>
+      <p:cxnSp>
+        <p:nvCxnSpPr>
+          <p:cNvPr id="98" name="Curved Connector 12">
+            <a:extLst>
+              <a:ext uri="{FF2B5EF4-FFF2-40B4-BE49-F238E27FC236}">
+                <a16:creationId xmlns:a16="http://schemas.microsoft.com/office/drawing/2014/main" id="{A160D65E-5BBC-4893-9B05-2266ECE04FCB}"/>
+              </a:ext>
+            </a:extLst>
+          </p:cNvPr>
+          <p:cNvCxnSpPr>
+            <a:cxnSpLocks/>
+          </p:cNvCxnSpPr>
+          <p:nvPr/>
+        </p:nvCxnSpPr>
+        <p:spPr>
+          <a:xfrm rot="10800000" flipV="1">
+            <a:off x="4739375" y="4092328"/>
+            <a:ext cx="144692" cy="108124"/>
+          </a:xfrm>
+          <a:prstGeom prst="curvedConnector3">
+            <a:avLst>
+              <a:gd name="adj1" fmla="val -90435"/>
+            </a:avLst>
+          </a:prstGeom>
+          <a:ln>
+            <a:prstDash val="dash"/>
+            <a:tailEnd type="triangle"/>
+          </a:ln>
+        </p:spPr>
+        <p:style>
+          <a:lnRef idx="1">
+            <a:schemeClr val="accent1"/>
+          </a:lnRef>
+          <a:fillRef idx="0">
+            <a:schemeClr val="accent1"/>
+          </a:fillRef>
+          <a:effectRef idx="0">
+            <a:schemeClr val="accent1"/>
+          </a:effectRef>
+          <a:fontRef idx="minor">
+            <a:schemeClr val="tx1"/>
+          </a:fontRef>
+        </p:style>
+      </p:cxnSp>
+      <p:sp>
+        <p:nvSpPr>
+          <p:cNvPr id="99" name="TextBox 98">
+            <a:extLst>
+              <a:ext uri="{FF2B5EF4-FFF2-40B4-BE49-F238E27FC236}">
+                <a16:creationId xmlns:a16="http://schemas.microsoft.com/office/drawing/2014/main" id="{C0EB45D1-3DC5-457C-8463-52BD15EB66CF}"/>
+              </a:ext>
+            </a:extLst>
+          </p:cNvPr>
+          <p:cNvSpPr txBox="1"/>
+          <p:nvPr/>
+        </p:nvSpPr>
+        <p:spPr>
+          <a:xfrm>
+            <a:off x="4955904" y="3691281"/>
+            <a:ext cx="3118417" cy="184666"/>
+          </a:xfrm>
+          <a:prstGeom prst="rect">
+            <a:avLst/>
+          </a:prstGeom>
+          <a:noFill/>
+          <a:ln>
+            <a:noFill/>
+          </a:ln>
+        </p:spPr>
+        <p:txBody>
+          <a:bodyPr wrap="square" lIns="0" tIns="0" rIns="0" bIns="0" rtlCol="0">
+            <a:spAutoFit/>
+          </a:bodyPr>
+          <a:lstStyle>
+            <a:defPPr>
+              <a:defRPr lang="en-US"/>
+            </a:defPPr>
+            <a:lvl1pPr algn="r">
+              <a:defRPr sz="1400">
+                <a:solidFill>
+                  <a:srgbClr val="0070C0"/>
+                </a:solidFill>
+              </a:defRPr>
+            </a:lvl1pPr>
+          </a:lstStyle>
+          <a:p>
+            <a:r>
+              <a:rPr lang="en-US" sz="1200" dirty="0" err="1"/>
+              <a:t>createScoredCard</a:t>
+            </a:r>
+            <a:r>
+              <a:rPr lang="en-US" sz="1200" dirty="0"/>
+              <a:t>(</a:t>
+            </a:r>
+            <a:r>
+              <a:rPr lang="en-US" sz="1200" dirty="0" err="1"/>
+              <a:t>cardToMark</a:t>
+            </a:r>
+            <a:r>
+              <a:rPr lang="en-US" sz="1200" dirty="0"/>
+              <a:t>, </a:t>
+            </a:r>
+            <a:r>
+              <a:rPr lang="en-US" sz="1200" dirty="0" err="1"/>
+              <a:t>isAttemptCorrect</a:t>
+            </a:r>
+            <a:r>
+              <a:rPr lang="en-US" sz="1200" dirty="0"/>
+              <a:t>)</a:t>
+            </a:r>
+          </a:p>
+        </p:txBody>
+      </p:sp>
+      <p:sp>
+        <p:nvSpPr>
+          <p:cNvPr id="71" name="TextBox 70">
+            <a:extLst>
+              <a:ext uri="{FF2B5EF4-FFF2-40B4-BE49-F238E27FC236}">
+                <a16:creationId xmlns:a16="http://schemas.microsoft.com/office/drawing/2014/main" id="{3869E216-BDD7-4497-921C-A465C8D51816}"/>
+              </a:ext>
+            </a:extLst>
+          </p:cNvPr>
+          <p:cNvSpPr txBox="1"/>
+          <p:nvPr/>
+        </p:nvSpPr>
+        <p:spPr>
+          <a:xfrm>
+            <a:off x="5392775" y="3211142"/>
+            <a:ext cx="2154053" cy="184666"/>
+          </a:xfrm>
+          <a:prstGeom prst="rect">
+            <a:avLst/>
+          </a:prstGeom>
+          <a:noFill/>
+        </p:spPr>
+        <p:txBody>
+          <a:bodyPr wrap="square" lIns="0" tIns="0" rIns="0" bIns="0" rtlCol="0">
+            <a:spAutoFit/>
+          </a:bodyPr>
+          <a:lstStyle>
+            <a:defPPr>
+              <a:defRPr lang="en-US"/>
+            </a:defPPr>
+            <a:lvl1pPr algn="r">
+              <a:defRPr sz="1400">
+                <a:solidFill>
+                  <a:srgbClr val="0070C0"/>
+                </a:solidFill>
+              </a:defRPr>
+            </a:lvl1pPr>
+          </a:lstStyle>
+          <a:p>
+            <a:r>
+              <a:rPr lang="en-US" sz="1200" dirty="0" err="1">
+                <a:solidFill>
+                  <a:schemeClr val="accent4">
+                    <a:lumMod val="75000"/>
+                  </a:schemeClr>
+                </a:solidFill>
+              </a:rPr>
+              <a:t>markAttemptedAnswer</a:t>
+            </a:r>
+            <a:r>
+              <a:rPr lang="en-US" sz="1200" dirty="0">
+                <a:solidFill>
+                  <a:schemeClr val="accent4">
+                    <a:lumMod val="75000"/>
+                  </a:schemeClr>
+                </a:solidFill>
+              </a:rPr>
+              <a:t>(attempt</a:t>
+            </a:r>
+            <a:r>
+              <a:rPr lang="en-US" sz="1200" dirty="0">
+                <a:solidFill>
+                  <a:srgbClr val="7030A0"/>
+                </a:solidFill>
+              </a:rPr>
+              <a:t>)</a:t>
+            </a:r>
+            <a:endParaRPr lang="en-US" sz="1200" dirty="0"/>
+          </a:p>
+        </p:txBody>
+      </p:sp>
+      <p:sp>
+        <p:nvSpPr>
+          <p:cNvPr id="73" name="Rectangle 72">
+            <a:extLst>
+              <a:ext uri="{FF2B5EF4-FFF2-40B4-BE49-F238E27FC236}">
+                <a16:creationId xmlns:a16="http://schemas.microsoft.com/office/drawing/2014/main" id="{B2B58013-04E4-4EA6-AB4E-36383BFB2948}"/>
+              </a:ext>
+            </a:extLst>
+          </p:cNvPr>
+          <p:cNvSpPr/>
+          <p:nvPr/>
+        </p:nvSpPr>
+        <p:spPr>
+          <a:xfrm>
+            <a:off x="8513215" y="2878956"/>
+            <a:ext cx="177469" cy="201567"/>
+          </a:xfrm>
+          <a:prstGeom prst="rect">
+            <a:avLst/>
+          </a:prstGeom>
+          <a:solidFill>
+            <a:srgbClr val="7030A0"/>
+          </a:solidFill>
+          <a:ln>
+            <a:solidFill>
+              <a:srgbClr val="7030A0"/>
+            </a:solidFill>
+          </a:ln>
+          <a:effectLst/>
+        </p:spPr>
+        <p:style>
+          <a:lnRef idx="1">
+            <a:schemeClr val="accent3"/>
+          </a:lnRef>
+          <a:fillRef idx="2">
+            <a:schemeClr val="accent3"/>
+          </a:fillRef>
+          <a:effectRef idx="1">
+            <a:schemeClr val="accent3"/>
+          </a:effectRef>
+          <a:fontRef idx="minor">
+            <a:schemeClr val="dk1"/>
+          </a:fontRef>
+        </p:style>
+        <p:txBody>
+          <a:bodyPr rtlCol="0" anchor="ctr"/>
+          <a:lstStyle/>
+          <a:p>
+            <a:pPr algn="ctr"/>
+            <a:endParaRPr lang="en-SG" sz="1400"/>
+          </a:p>
+        </p:txBody>
+      </p:sp>
+      <p:cxnSp>
+        <p:nvCxnSpPr>
+          <p:cNvPr id="75" name="Straight Arrow Connector 74">
+            <a:extLst>
+              <a:ext uri="{FF2B5EF4-FFF2-40B4-BE49-F238E27FC236}">
+                <a16:creationId xmlns:a16="http://schemas.microsoft.com/office/drawing/2014/main" id="{685FE26A-7317-4437-82B9-C34804FD172E}"/>
+              </a:ext>
+            </a:extLst>
+          </p:cNvPr>
+          <p:cNvCxnSpPr>
+            <a:cxnSpLocks/>
+          </p:cNvCxnSpPr>
+          <p:nvPr/>
+        </p:nvCxnSpPr>
+        <p:spPr>
+          <a:xfrm>
+            <a:off x="4731914" y="3062579"/>
+            <a:ext cx="3791128" cy="1"/>
+          </a:xfrm>
+          <a:prstGeom prst="straightConnector1">
+            <a:avLst/>
+          </a:prstGeom>
+          <a:ln w="19050">
+            <a:solidFill>
+              <a:srgbClr val="7030A0"/>
+            </a:solidFill>
+            <a:prstDash val="sysDash"/>
+            <a:headEnd type="arrow" w="med" len="med"/>
+            <a:tailEnd type="none" w="med" len="med"/>
+          </a:ln>
+        </p:spPr>
+        <p:style>
+          <a:lnRef idx="1">
+            <a:schemeClr val="accent1"/>
+          </a:lnRef>
+          <a:fillRef idx="0">
+            <a:schemeClr val="accent1"/>
+          </a:fillRef>
+          <a:effectRef idx="0">
+            <a:schemeClr val="accent1"/>
+          </a:effectRef>
+          <a:fontRef idx="minor">
+            <a:schemeClr val="tx1"/>
+          </a:fontRef>
+        </p:style>
+      </p:cxnSp>
+      <p:cxnSp>
+        <p:nvCxnSpPr>
+          <p:cNvPr id="76" name="Straight Arrow Connector 75">
+            <a:extLst>
+              <a:ext uri="{FF2B5EF4-FFF2-40B4-BE49-F238E27FC236}">
+                <a16:creationId xmlns:a16="http://schemas.microsoft.com/office/drawing/2014/main" id="{2792DEE9-2FBF-4652-A80C-B29913469A2E}"/>
+              </a:ext>
+            </a:extLst>
+          </p:cNvPr>
+          <p:cNvCxnSpPr>
+            <a:cxnSpLocks/>
+          </p:cNvCxnSpPr>
+          <p:nvPr/>
+        </p:nvCxnSpPr>
+        <p:spPr>
+          <a:xfrm>
+            <a:off x="4731239" y="3394073"/>
+            <a:ext cx="3752372" cy="0"/>
+          </a:xfrm>
+          <a:prstGeom prst="straightConnector1">
+            <a:avLst/>
+          </a:prstGeom>
+          <a:ln w="19050">
+            <a:solidFill>
+              <a:srgbClr val="0070C0"/>
+            </a:solidFill>
+            <a:tailEnd type="arrow"/>
+          </a:ln>
+        </p:spPr>
+        <p:style>
+          <a:lnRef idx="1">
+            <a:schemeClr val="accent1"/>
+          </a:lnRef>
+          <a:fillRef idx="0">
+            <a:schemeClr val="accent1"/>
+          </a:fillRef>
+          <a:effectRef idx="0">
+            <a:schemeClr val="accent1"/>
+          </a:effectRef>
+          <a:fontRef idx="minor">
+            <a:schemeClr val="tx1"/>
+          </a:fontRef>
+        </p:style>
+      </p:cxnSp>
+      <p:sp>
+        <p:nvSpPr>
+          <p:cNvPr id="85" name="TextBox 84">
+            <a:extLst>
+              <a:ext uri="{FF2B5EF4-FFF2-40B4-BE49-F238E27FC236}">
+                <a16:creationId xmlns:a16="http://schemas.microsoft.com/office/drawing/2014/main" id="{B3636778-39CC-4247-93BD-CE15805797D8}"/>
+              </a:ext>
+            </a:extLst>
+          </p:cNvPr>
+          <p:cNvSpPr txBox="1"/>
+          <p:nvPr/>
+        </p:nvSpPr>
+        <p:spPr>
+          <a:xfrm>
+            <a:off x="5697313" y="3376113"/>
+            <a:ext cx="1414508" cy="184666"/>
+          </a:xfrm>
+          <a:prstGeom prst="rect">
+            <a:avLst/>
+          </a:prstGeom>
+          <a:noFill/>
+        </p:spPr>
+        <p:txBody>
+          <a:bodyPr wrap="square" lIns="0" tIns="0" rIns="0" bIns="0" rtlCol="0">
+            <a:spAutoFit/>
+          </a:bodyPr>
+          <a:lstStyle>
+            <a:defPPr>
+              <a:defRPr lang="en-US"/>
+            </a:defPPr>
+            <a:lvl1pPr algn="r">
+              <a:defRPr sz="1400">
+                <a:solidFill>
+                  <a:srgbClr val="0070C0"/>
+                </a:solidFill>
+              </a:defRPr>
+            </a:lvl1pPr>
+          </a:lstStyle>
+          <a:p>
+            <a:r>
+              <a:rPr lang="en-US" sz="1200" dirty="0" err="1"/>
+              <a:t>isAttemptCorrect</a:t>
+            </a:r>
+            <a:endParaRPr lang="en-US" sz="1200" dirty="0"/>
+          </a:p>
+        </p:txBody>
+      </p:sp>
+      <p:sp>
+        <p:nvSpPr>
+          <p:cNvPr id="88" name="TextBox 87">
+            <a:extLst>
+              <a:ext uri="{FF2B5EF4-FFF2-40B4-BE49-F238E27FC236}">
+                <a16:creationId xmlns:a16="http://schemas.microsoft.com/office/drawing/2014/main" id="{30716F43-D0B9-4ADE-B0DC-D6766C017809}"/>
+              </a:ext>
+            </a:extLst>
+          </p:cNvPr>
+          <p:cNvSpPr txBox="1"/>
+          <p:nvPr/>
+        </p:nvSpPr>
+        <p:spPr>
+          <a:xfrm>
+            <a:off x="4819221" y="4012517"/>
+            <a:ext cx="967660" cy="184666"/>
+          </a:xfrm>
+          <a:prstGeom prst="rect">
+            <a:avLst/>
+          </a:prstGeom>
+          <a:noFill/>
+          <a:ln>
+            <a:noFill/>
+          </a:ln>
+        </p:spPr>
+        <p:txBody>
+          <a:bodyPr wrap="square" lIns="0" tIns="0" rIns="0" bIns="0" rtlCol="0">
+            <a:spAutoFit/>
+          </a:bodyPr>
+          <a:lstStyle>
+            <a:defPPr>
+              <a:defRPr lang="en-US"/>
+            </a:defPPr>
+            <a:lvl1pPr algn="r">
+              <a:defRPr sz="1400">
+                <a:solidFill>
+                  <a:srgbClr val="0070C0"/>
+                </a:solidFill>
+              </a:defRPr>
+            </a:lvl1pPr>
+          </a:lstStyle>
+          <a:p>
+            <a:r>
+              <a:rPr lang="en-US" sz="1200" dirty="0" err="1"/>
+              <a:t>scoredCard</a:t>
+            </a:r>
+            <a:r>
+              <a:rPr lang="en-US" sz="1200" dirty="0"/>
+              <a:t>)</a:t>
+            </a:r>
+          </a:p>
+        </p:txBody>
+      </p:sp>
+      <p:cxnSp>
+        <p:nvCxnSpPr>
+          <p:cNvPr id="90" name="Straight Arrow Connector 89">
+            <a:extLst>
+              <a:ext uri="{FF2B5EF4-FFF2-40B4-BE49-F238E27FC236}">
+                <a16:creationId xmlns:a16="http://schemas.microsoft.com/office/drawing/2014/main" id="{83545A62-B411-49CA-B6E4-D75482AD3D7C}"/>
+              </a:ext>
+            </a:extLst>
+          </p:cNvPr>
+          <p:cNvCxnSpPr>
+            <a:cxnSpLocks/>
+          </p:cNvCxnSpPr>
+          <p:nvPr/>
+        </p:nvCxnSpPr>
+        <p:spPr>
+          <a:xfrm>
+            <a:off x="4769237" y="4936869"/>
+            <a:ext cx="3743799" cy="0"/>
+          </a:xfrm>
+          <a:prstGeom prst="straightConnector1">
+            <a:avLst/>
+          </a:prstGeom>
+          <a:ln w="19050">
+            <a:solidFill>
+              <a:srgbClr val="0070C0"/>
+            </a:solidFill>
+            <a:tailEnd type="arrow"/>
+          </a:ln>
+        </p:spPr>
+        <p:style>
+          <a:lnRef idx="1">
+            <a:schemeClr val="accent1"/>
+          </a:lnRef>
+          <a:fillRef idx="0">
+            <a:schemeClr val="accent1"/>
+          </a:fillRef>
+          <a:effectRef idx="0">
+            <a:schemeClr val="accent1"/>
+          </a:effectRef>
+          <a:fontRef idx="minor">
+            <a:schemeClr val="tx1"/>
+          </a:fontRef>
+        </p:style>
+      </p:cxnSp>
+      <p:sp>
+        <p:nvSpPr>
+          <p:cNvPr id="91" name="TextBox 90">
+            <a:extLst>
+              <a:ext uri="{FF2B5EF4-FFF2-40B4-BE49-F238E27FC236}">
+                <a16:creationId xmlns:a16="http://schemas.microsoft.com/office/drawing/2014/main" id="{B4566C92-4551-4599-BF33-90C08EE0289D}"/>
+              </a:ext>
+            </a:extLst>
+          </p:cNvPr>
+          <p:cNvSpPr txBox="1"/>
+          <p:nvPr/>
+        </p:nvSpPr>
+        <p:spPr>
+          <a:xfrm>
+            <a:off x="5248246" y="4752203"/>
+            <a:ext cx="2148604" cy="184666"/>
+          </a:xfrm>
+          <a:prstGeom prst="rect">
+            <a:avLst/>
+          </a:prstGeom>
+          <a:noFill/>
+        </p:spPr>
+        <p:txBody>
+          <a:bodyPr wrap="square" lIns="0" tIns="0" rIns="0" bIns="0" rtlCol="0">
+            <a:spAutoFit/>
+          </a:bodyPr>
+          <a:lstStyle>
+            <a:defPPr>
+              <a:defRPr lang="en-US"/>
+            </a:defPPr>
+            <a:lvl1pPr algn="r">
+              <a:defRPr sz="1400">
+                <a:solidFill>
+                  <a:srgbClr val="0070C0"/>
+                </a:solidFill>
+              </a:defRPr>
+            </a:lvl1pPr>
+          </a:lstStyle>
+          <a:p>
+            <a:r>
+              <a:rPr lang="en-US" sz="1200" dirty="0" err="1">
+                <a:solidFill>
+                  <a:schemeClr val="accent4">
+                    <a:lumMod val="75000"/>
+                  </a:schemeClr>
+                </a:solidFill>
+              </a:rPr>
+              <a:t>updateFilteredCard</a:t>
+            </a:r>
+            <a:r>
+              <a:rPr lang="en-US" sz="1200" dirty="0">
+                <a:solidFill>
+                  <a:schemeClr val="accent4">
+                    <a:lumMod val="75000"/>
+                  </a:schemeClr>
+                </a:solidFill>
+              </a:rPr>
+              <a:t>()</a:t>
+            </a:r>
+            <a:endParaRPr lang="en-US" sz="1200" dirty="0"/>
+          </a:p>
+        </p:txBody>
+      </p:sp>
+      <p:cxnSp>
+        <p:nvCxnSpPr>
+          <p:cNvPr id="100" name="Straight Arrow Connector 99">
+            <a:extLst>
+              <a:ext uri="{FF2B5EF4-FFF2-40B4-BE49-F238E27FC236}">
+                <a16:creationId xmlns:a16="http://schemas.microsoft.com/office/drawing/2014/main" id="{AABCC43A-F3E3-4584-A614-F24979AE049C}"/>
+              </a:ext>
+            </a:extLst>
+          </p:cNvPr>
+          <p:cNvCxnSpPr>
+            <a:cxnSpLocks/>
+          </p:cNvCxnSpPr>
+          <p:nvPr/>
+        </p:nvCxnSpPr>
+        <p:spPr>
+          <a:xfrm>
+            <a:off x="4769237" y="4664530"/>
+            <a:ext cx="3791128" cy="1"/>
+          </a:xfrm>
+          <a:prstGeom prst="straightConnector1">
+            <a:avLst/>
+          </a:prstGeom>
+          <a:ln w="19050">
+            <a:solidFill>
+              <a:srgbClr val="7030A0"/>
+            </a:solidFill>
+            <a:prstDash val="sysDash"/>
+            <a:headEnd type="arrow" w="med" len="med"/>
+            <a:tailEnd type="none" w="med" len="med"/>
+          </a:ln>
+        </p:spPr>
+        <p:style>
+          <a:lnRef idx="1">
+            <a:schemeClr val="accent1"/>
+          </a:lnRef>
+          <a:fillRef idx="0">
+            <a:schemeClr val="accent1"/>
+          </a:fillRef>
+          <a:effectRef idx="0">
+            <a:schemeClr val="accent1"/>
+          </a:effectRef>
+          <a:fontRef idx="minor">
+            <a:schemeClr val="tx1"/>
+          </a:fontRef>
+        </p:style>
+      </p:cxnSp>
+      <p:cxnSp>
+        <p:nvCxnSpPr>
+          <p:cNvPr id="101" name="Straight Arrow Connector 100">
+            <a:extLst>
+              <a:ext uri="{FF2B5EF4-FFF2-40B4-BE49-F238E27FC236}">
+                <a16:creationId xmlns:a16="http://schemas.microsoft.com/office/drawing/2014/main" id="{C329979A-EE3A-449A-965F-1CE20F280036}"/>
+              </a:ext>
+            </a:extLst>
+          </p:cNvPr>
+          <p:cNvCxnSpPr>
+            <a:cxnSpLocks/>
+          </p:cNvCxnSpPr>
+          <p:nvPr/>
+        </p:nvCxnSpPr>
+        <p:spPr>
+          <a:xfrm>
+            <a:off x="4769237" y="5110436"/>
+            <a:ext cx="3791128" cy="1"/>
+          </a:xfrm>
+          <a:prstGeom prst="straightConnector1">
+            <a:avLst/>
+          </a:prstGeom>
+          <a:ln w="19050">
+            <a:solidFill>
+              <a:srgbClr val="7030A0"/>
+            </a:solidFill>
+            <a:prstDash val="sysDash"/>
+            <a:headEnd type="arrow" w="med" len="med"/>
+            <a:tailEnd type="none" w="med" len="med"/>
+          </a:ln>
+        </p:spPr>
+        <p:style>
+          <a:lnRef idx="1">
+            <a:schemeClr val="accent1"/>
+          </a:lnRef>
+          <a:fillRef idx="0">
+            <a:schemeClr val="accent1"/>
+          </a:fillRef>
+          <a:effectRef idx="0">
+            <a:schemeClr val="accent1"/>
+          </a:effectRef>
+          <a:fontRef idx="minor">
+            <a:schemeClr val="tx1"/>
+          </a:fontRef>
+        </p:style>
+      </p:cxnSp>
+      <p:sp>
+        <p:nvSpPr>
+          <p:cNvPr id="102" name="Rectangle 101">
+            <a:extLst>
+              <a:ext uri="{FF2B5EF4-FFF2-40B4-BE49-F238E27FC236}">
+                <a16:creationId xmlns:a16="http://schemas.microsoft.com/office/drawing/2014/main" id="{A2D4B6BB-FCC7-491B-891E-D147BA97FB75}"/>
+              </a:ext>
+            </a:extLst>
+          </p:cNvPr>
+          <p:cNvSpPr/>
+          <p:nvPr/>
+        </p:nvSpPr>
+        <p:spPr>
+          <a:xfrm>
+            <a:off x="8497801" y="5418848"/>
+            <a:ext cx="177469" cy="201567"/>
+          </a:xfrm>
+          <a:prstGeom prst="rect">
+            <a:avLst/>
+          </a:prstGeom>
+          <a:solidFill>
+            <a:srgbClr val="7030A0"/>
+          </a:solidFill>
+          <a:ln>
+            <a:solidFill>
+              <a:srgbClr val="7030A0"/>
+            </a:solidFill>
+          </a:ln>
+          <a:effectLst/>
+        </p:spPr>
+        <p:style>
+          <a:lnRef idx="1">
+            <a:schemeClr val="accent3"/>
+          </a:lnRef>
+          <a:fillRef idx="2">
+            <a:schemeClr val="accent3"/>
+          </a:fillRef>
+          <a:effectRef idx="1">
+            <a:schemeClr val="accent3"/>
+          </a:effectRef>
+          <a:fontRef idx="minor">
+            <a:schemeClr val="dk1"/>
+          </a:fontRef>
+        </p:style>
+        <p:txBody>
+          <a:bodyPr rtlCol="0" anchor="ctr"/>
+          <a:lstStyle/>
+          <a:p>
+            <a:pPr algn="ctr"/>
+            <a:endParaRPr lang="en-SG" sz="1400"/>
+          </a:p>
+        </p:txBody>
+      </p:sp>
+      <p:cxnSp>
+        <p:nvCxnSpPr>
+          <p:cNvPr id="103" name="Straight Arrow Connector 102">
+            <a:extLst>
+              <a:ext uri="{FF2B5EF4-FFF2-40B4-BE49-F238E27FC236}">
+                <a16:creationId xmlns:a16="http://schemas.microsoft.com/office/drawing/2014/main" id="{D69DFE0D-7AD8-422D-9603-7FC743D92480}"/>
+              </a:ext>
+            </a:extLst>
+          </p:cNvPr>
+          <p:cNvCxnSpPr>
+            <a:cxnSpLocks/>
+          </p:cNvCxnSpPr>
+          <p:nvPr/>
+        </p:nvCxnSpPr>
+        <p:spPr>
+          <a:xfrm>
+            <a:off x="4758785" y="5418848"/>
+            <a:ext cx="3743799" cy="0"/>
+          </a:xfrm>
+          <a:prstGeom prst="straightConnector1">
+            <a:avLst/>
+          </a:prstGeom>
+          <a:ln w="19050">
+            <a:solidFill>
+              <a:srgbClr val="0070C0"/>
+            </a:solidFill>
+            <a:tailEnd type="arrow"/>
+          </a:ln>
+        </p:spPr>
+        <p:style>
+          <a:lnRef idx="1">
+            <a:schemeClr val="accent1"/>
+          </a:lnRef>
+          <a:fillRef idx="0">
+            <a:schemeClr val="accent1"/>
+          </a:fillRef>
+          <a:effectRef idx="0">
+            <a:schemeClr val="accent1"/>
+          </a:effectRef>
+          <a:fontRef idx="minor">
+            <a:schemeClr val="tx1"/>
+          </a:fontRef>
+        </p:style>
+      </p:cxnSp>
+      <p:sp>
+        <p:nvSpPr>
+          <p:cNvPr id="104" name="TextBox 103">
+            <a:extLst>
+              <a:ext uri="{FF2B5EF4-FFF2-40B4-BE49-F238E27FC236}">
+                <a16:creationId xmlns:a16="http://schemas.microsoft.com/office/drawing/2014/main" id="{2BB23F5C-C250-4EA2-BB4D-1395EC316386}"/>
+              </a:ext>
+            </a:extLst>
+          </p:cNvPr>
+          <p:cNvSpPr txBox="1"/>
+          <p:nvPr/>
+        </p:nvSpPr>
+        <p:spPr>
+          <a:xfrm>
+            <a:off x="5370804" y="5220394"/>
+            <a:ext cx="2148604" cy="184666"/>
+          </a:xfrm>
+          <a:prstGeom prst="rect">
+            <a:avLst/>
+          </a:prstGeom>
+          <a:noFill/>
+        </p:spPr>
+        <p:txBody>
+          <a:bodyPr wrap="square" lIns="0" tIns="0" rIns="0" bIns="0" rtlCol="0">
+            <a:spAutoFit/>
+          </a:bodyPr>
+          <a:lstStyle>
+            <a:defPPr>
+              <a:defRPr lang="en-US"/>
+            </a:defPPr>
+            <a:lvl1pPr algn="r">
+              <a:defRPr sz="1400">
+                <a:solidFill>
+                  <a:srgbClr val="0070C0"/>
+                </a:solidFill>
+              </a:defRPr>
+            </a:lvl1pPr>
+          </a:lstStyle>
+          <a:p>
+            <a:r>
+              <a:rPr lang="en-US" sz="1200" dirty="0" err="1">
+                <a:solidFill>
+                  <a:schemeClr val="accent4">
+                    <a:lumMod val="75000"/>
+                  </a:schemeClr>
+                </a:solidFill>
+              </a:rPr>
+              <a:t>commitActiveCardFolder</a:t>
+            </a:r>
+            <a:r>
+              <a:rPr lang="en-US" sz="1200" dirty="0">
+                <a:solidFill>
+                  <a:schemeClr val="accent4">
+                    <a:lumMod val="75000"/>
+                  </a:schemeClr>
+                </a:solidFill>
+              </a:rPr>
+              <a:t>()</a:t>
+            </a:r>
+            <a:endParaRPr lang="en-US" sz="1200" dirty="0"/>
+          </a:p>
+        </p:txBody>
+      </p:sp>
+      <p:cxnSp>
+        <p:nvCxnSpPr>
+          <p:cNvPr id="105" name="Straight Arrow Connector 104">
+            <a:extLst>
+              <a:ext uri="{FF2B5EF4-FFF2-40B4-BE49-F238E27FC236}">
+                <a16:creationId xmlns:a16="http://schemas.microsoft.com/office/drawing/2014/main" id="{B67F0DB4-E919-4ACE-B78D-92FCB505ADE2}"/>
+              </a:ext>
+            </a:extLst>
+          </p:cNvPr>
+          <p:cNvCxnSpPr>
+            <a:cxnSpLocks/>
+          </p:cNvCxnSpPr>
+          <p:nvPr/>
+        </p:nvCxnSpPr>
+        <p:spPr>
+          <a:xfrm>
+            <a:off x="4769237" y="5614678"/>
+            <a:ext cx="3791128" cy="1"/>
+          </a:xfrm>
+          <a:prstGeom prst="straightConnector1">
+            <a:avLst/>
+          </a:prstGeom>
+          <a:ln w="19050">
+            <a:solidFill>
+              <a:srgbClr val="7030A0"/>
+            </a:solidFill>
+            <a:prstDash val="sysDash"/>
+            <a:headEnd type="arrow" w="med" len="med"/>
+            <a:tailEnd type="none" w="med" len="med"/>
+          </a:ln>
+        </p:spPr>
+        <p:style>
+          <a:lnRef idx="1">
+            <a:schemeClr val="accent1"/>
+          </a:lnRef>
+          <a:fillRef idx="0">
+            <a:schemeClr val="accent1"/>
+          </a:fillRef>
+          <a:effectRef idx="0">
+            <a:schemeClr val="accent1"/>
+          </a:effectRef>
+          <a:fontRef idx="minor">
+            <a:schemeClr val="tx1"/>
+          </a:fontRef>
+        </p:style>
+      </p:cxnSp>
+      <p:cxnSp>
+        <p:nvCxnSpPr>
+          <p:cNvPr id="106" name="Straight Arrow Connector 105">
+            <a:extLst>
+              <a:ext uri="{FF2B5EF4-FFF2-40B4-BE49-F238E27FC236}">
+                <a16:creationId xmlns:a16="http://schemas.microsoft.com/office/drawing/2014/main" id="{711D62E0-D9FF-485C-AEA5-DCC4791DC03A}"/>
+              </a:ext>
+            </a:extLst>
+          </p:cNvPr>
+          <p:cNvCxnSpPr>
+            <a:cxnSpLocks/>
+          </p:cNvCxnSpPr>
+          <p:nvPr/>
+        </p:nvCxnSpPr>
+        <p:spPr>
+          <a:xfrm>
+            <a:off x="8662906" y="5431867"/>
+            <a:ext cx="2240893" cy="0"/>
+          </a:xfrm>
+          <a:prstGeom prst="straightConnector1">
+            <a:avLst/>
+          </a:prstGeom>
+          <a:ln w="19050">
+            <a:solidFill>
+              <a:srgbClr val="7030A0"/>
+            </a:solidFill>
+            <a:tailEnd type="arrow"/>
+          </a:ln>
+        </p:spPr>
+        <p:style>
+          <a:lnRef idx="1">
+            <a:schemeClr val="accent1"/>
+          </a:lnRef>
+          <a:fillRef idx="0">
+            <a:schemeClr val="accent1"/>
+          </a:fillRef>
+          <a:effectRef idx="0">
+            <a:schemeClr val="accent1"/>
+          </a:effectRef>
+          <a:fontRef idx="minor">
+            <a:schemeClr val="tx1"/>
+          </a:fontRef>
+        </p:style>
+      </p:cxnSp>
+      <p:sp>
+        <p:nvSpPr>
+          <p:cNvPr id="107" name="Rectangle 106">
+            <a:extLst>
+              <a:ext uri="{FF2B5EF4-FFF2-40B4-BE49-F238E27FC236}">
+                <a16:creationId xmlns:a16="http://schemas.microsoft.com/office/drawing/2014/main" id="{11E7DA69-49E2-4F10-99A4-570BD39DA721}"/>
+              </a:ext>
+            </a:extLst>
+          </p:cNvPr>
+          <p:cNvSpPr/>
+          <p:nvPr/>
+        </p:nvSpPr>
+        <p:spPr>
+          <a:xfrm>
+            <a:off x="10903799" y="5431867"/>
+            <a:ext cx="120852" cy="125840"/>
+          </a:xfrm>
+          <a:prstGeom prst="rect">
+            <a:avLst/>
+          </a:prstGeom>
+          <a:solidFill>
+            <a:srgbClr val="7030A0"/>
+          </a:solidFill>
+          <a:ln>
+            <a:solidFill>
+              <a:srgbClr val="7030A0"/>
+            </a:solidFill>
+          </a:ln>
+          <a:effectLst/>
+        </p:spPr>
+        <p:style>
+          <a:lnRef idx="1">
+            <a:schemeClr val="accent3"/>
+          </a:lnRef>
+          <a:fillRef idx="2">
+            <a:schemeClr val="accent3"/>
+          </a:fillRef>
+          <a:effectRef idx="1">
+            <a:schemeClr val="accent3"/>
+          </a:effectRef>
+          <a:fontRef idx="minor">
+            <a:schemeClr val="dk1"/>
+          </a:fontRef>
+        </p:style>
+        <p:txBody>
+          <a:bodyPr rtlCol="0" anchor="ctr"/>
+          <a:lstStyle/>
+          <a:p>
+            <a:pPr algn="ctr"/>
+            <a:endParaRPr lang="en-SG" sz="1400"/>
+          </a:p>
+        </p:txBody>
+      </p:sp>
+      <p:cxnSp>
+        <p:nvCxnSpPr>
+          <p:cNvPr id="108" name="Straight Arrow Connector 107">
+            <a:extLst>
+              <a:ext uri="{FF2B5EF4-FFF2-40B4-BE49-F238E27FC236}">
+                <a16:creationId xmlns:a16="http://schemas.microsoft.com/office/drawing/2014/main" id="{EE2F7510-FA21-4A99-A09E-A0752A0E8E15}"/>
+              </a:ext>
+            </a:extLst>
+          </p:cNvPr>
+          <p:cNvCxnSpPr>
+            <a:cxnSpLocks/>
+          </p:cNvCxnSpPr>
+          <p:nvPr/>
+        </p:nvCxnSpPr>
+        <p:spPr>
+          <a:xfrm flipV="1">
+            <a:off x="8676710" y="5557707"/>
+            <a:ext cx="2236465" cy="9346"/>
+          </a:xfrm>
+          <a:prstGeom prst="straightConnector1">
+            <a:avLst/>
+          </a:prstGeom>
+          <a:ln w="19050">
+            <a:solidFill>
+              <a:srgbClr val="7030A0"/>
+            </a:solidFill>
+            <a:prstDash val="sysDash"/>
+            <a:headEnd type="arrow" w="med" len="med"/>
+            <a:tailEnd type="none" w="med" len="med"/>
+          </a:ln>
+        </p:spPr>
+        <p:style>
+          <a:lnRef idx="1">
+            <a:schemeClr val="accent1"/>
+          </a:lnRef>
+          <a:fillRef idx="0">
+            <a:schemeClr val="accent1"/>
+          </a:fillRef>
+          <a:effectRef idx="0">
+            <a:schemeClr val="accent1"/>
+          </a:effectRef>
+          <a:fontRef idx="minor">
+            <a:schemeClr val="tx1"/>
+          </a:fontRef>
+        </p:style>
+      </p:cxnSp>
+    </p:spTree>
+    <p:extLst>
+      <p:ext uri="{BB962C8B-B14F-4D97-AF65-F5344CB8AC3E}">
+        <p14:creationId xmlns:p14="http://schemas.microsoft.com/office/powerpoint/2010/main" val="624761106"/>
+      </p:ext>
+    </p:extLst>
+  </p:cSld>
+  <p:clrMapOvr>
+    <a:masterClrMapping/>
+  </p:clrMapOvr>
+</p:sld>
+</file>
+
+<file path=ppt/slides/slide3.xml><?xml version="1.0" encoding="utf-8"?>
 <p:sld xmlns:a="http://schemas.openxmlformats.org/drawingml/2006/main" xmlns:r="http://schemas.openxmlformats.org/officeDocument/2006/relationships" xmlns:p="http://schemas.openxmlformats.org/presentationml/2006/main">
   <p:cSld>
     <p:spTree>

</xml_diff>

<commit_message>
Update Developer Guide - remove inTestSession to getState() - tag only test command to put into PPP
</commit_message>
<xml_diff>
--- a/docs/diagrams/TestSessionSequenceDiagram.pptx
+++ b/docs/diagrams/TestSessionSequenceDiagram.pptx
@@ -210,7 +210,7 @@
           <a:p>
             <a:fld id="{F5CC4B3F-88C1-4FFA-B1B6-F41C21DC6924}" type="datetimeFigureOut">
               <a:rPr lang="en-US" smtClean="0"/>
-              <a:t>3/31/2019</a:t>
+              <a:t>4/7/2019</a:t>
             </a:fld>
             <a:endParaRPr lang="en-US"/>
           </a:p>
@@ -745,7 +745,7 @@
           <a:p>
             <a:fld id="{78C97017-6FC3-485B-9764-EAC9E56C1D49}" type="datetimeFigureOut">
               <a:rPr lang="en-US" smtClean="0"/>
-              <a:t>3/31/2019</a:t>
+              <a:t>4/7/2019</a:t>
             </a:fld>
             <a:endParaRPr lang="en-US"/>
           </a:p>
@@ -913,7 +913,7 @@
           <a:p>
             <a:fld id="{78C97017-6FC3-485B-9764-EAC9E56C1D49}" type="datetimeFigureOut">
               <a:rPr lang="en-US" smtClean="0"/>
-              <a:t>3/31/2019</a:t>
+              <a:t>4/7/2019</a:t>
             </a:fld>
             <a:endParaRPr lang="en-US"/>
           </a:p>
@@ -1091,7 +1091,7 @@
           <a:p>
             <a:fld id="{78C97017-6FC3-485B-9764-EAC9E56C1D49}" type="datetimeFigureOut">
               <a:rPr lang="en-US" smtClean="0"/>
-              <a:t>3/31/2019</a:t>
+              <a:t>4/7/2019</a:t>
             </a:fld>
             <a:endParaRPr lang="en-US"/>
           </a:p>
@@ -1259,7 +1259,7 @@
           <a:p>
             <a:fld id="{78C97017-6FC3-485B-9764-EAC9E56C1D49}" type="datetimeFigureOut">
               <a:rPr lang="en-US" smtClean="0"/>
-              <a:t>3/31/2019</a:t>
+              <a:t>4/7/2019</a:t>
             </a:fld>
             <a:endParaRPr lang="en-US"/>
           </a:p>
@@ -1504,7 +1504,7 @@
           <a:p>
             <a:fld id="{78C97017-6FC3-485B-9764-EAC9E56C1D49}" type="datetimeFigureOut">
               <a:rPr lang="en-US" smtClean="0"/>
-              <a:t>3/31/2019</a:t>
+              <a:t>4/7/2019</a:t>
             </a:fld>
             <a:endParaRPr lang="en-US"/>
           </a:p>
@@ -1789,7 +1789,7 @@
           <a:p>
             <a:fld id="{78C97017-6FC3-485B-9764-EAC9E56C1D49}" type="datetimeFigureOut">
               <a:rPr lang="en-US" smtClean="0"/>
-              <a:t>3/31/2019</a:t>
+              <a:t>4/7/2019</a:t>
             </a:fld>
             <a:endParaRPr lang="en-US"/>
           </a:p>
@@ -2208,7 +2208,7 @@
           <a:p>
             <a:fld id="{78C97017-6FC3-485B-9764-EAC9E56C1D49}" type="datetimeFigureOut">
               <a:rPr lang="en-US" smtClean="0"/>
-              <a:t>3/31/2019</a:t>
+              <a:t>4/7/2019</a:t>
             </a:fld>
             <a:endParaRPr lang="en-US"/>
           </a:p>
@@ -2325,7 +2325,7 @@
           <a:p>
             <a:fld id="{78C97017-6FC3-485B-9764-EAC9E56C1D49}" type="datetimeFigureOut">
               <a:rPr lang="en-US" smtClean="0"/>
-              <a:t>3/31/2019</a:t>
+              <a:t>4/7/2019</a:t>
             </a:fld>
             <a:endParaRPr lang="en-US"/>
           </a:p>
@@ -2420,7 +2420,7 @@
           <a:p>
             <a:fld id="{78C97017-6FC3-485B-9764-EAC9E56C1D49}" type="datetimeFigureOut">
               <a:rPr lang="en-US" smtClean="0"/>
-              <a:t>3/31/2019</a:t>
+              <a:t>4/7/2019</a:t>
             </a:fld>
             <a:endParaRPr lang="en-US"/>
           </a:p>
@@ -2695,7 +2695,7 @@
           <a:p>
             <a:fld id="{78C97017-6FC3-485B-9764-EAC9E56C1D49}" type="datetimeFigureOut">
               <a:rPr lang="en-US" smtClean="0"/>
-              <a:t>3/31/2019</a:t>
+              <a:t>4/7/2019</a:t>
             </a:fld>
             <a:endParaRPr lang="en-US"/>
           </a:p>
@@ -2947,7 +2947,7 @@
           <a:p>
             <a:fld id="{78C97017-6FC3-485B-9764-EAC9E56C1D49}" type="datetimeFigureOut">
               <a:rPr lang="en-US" smtClean="0"/>
-              <a:t>3/31/2019</a:t>
+              <a:t>4/7/2019</a:t>
             </a:fld>
             <a:endParaRPr lang="en-US"/>
           </a:p>
@@ -3158,7 +3158,7 @@
           <a:p>
             <a:fld id="{78C97017-6FC3-485B-9764-EAC9E56C1D49}" type="datetimeFigureOut">
               <a:rPr lang="en-US" smtClean="0"/>
-              <a:t>3/31/2019</a:t>
+              <a:t>4/7/2019</a:t>
             </a:fld>
             <a:endParaRPr lang="en-US"/>
           </a:p>
@@ -8602,155 +8602,6 @@
       </p:sp>
       <p:sp>
         <p:nvSpPr>
-          <p:cNvPr id="96" name="Rectangle 95">
-            <a:extLst>
-              <a:ext uri="{FF2B5EF4-FFF2-40B4-BE49-F238E27FC236}">
-                <a16:creationId xmlns:a16="http://schemas.microsoft.com/office/drawing/2014/main" id="{569BDD56-8E8E-4B8B-A571-7F3AA1D103E4}"/>
-              </a:ext>
-            </a:extLst>
-          </p:cNvPr>
-          <p:cNvSpPr>
-            <a:spLocks/>
-          </p:cNvSpPr>
-          <p:nvPr/>
-        </p:nvSpPr>
-        <p:spPr>
-          <a:xfrm>
-            <a:off x="4692432" y="3901615"/>
-            <a:ext cx="177468" cy="177682"/>
-          </a:xfrm>
-          <a:prstGeom prst="rect">
-            <a:avLst/>
-          </a:prstGeom>
-          <a:solidFill>
-            <a:srgbClr val="0070C0"/>
-          </a:solidFill>
-          <a:ln>
-            <a:solidFill>
-              <a:srgbClr val="0070C0"/>
-            </a:solidFill>
-          </a:ln>
-          <a:effectLst>
-            <a:outerShdw blurRad="50800" dist="38100" dir="8100000" algn="tr" rotWithShape="0">
-              <a:prstClr val="black">
-                <a:alpha val="40000"/>
-              </a:prstClr>
-            </a:outerShdw>
-          </a:effectLst>
-        </p:spPr>
-        <p:style>
-          <a:lnRef idx="1">
-            <a:schemeClr val="accent3"/>
-          </a:lnRef>
-          <a:fillRef idx="2">
-            <a:schemeClr val="accent3"/>
-          </a:fillRef>
-          <a:effectRef idx="1">
-            <a:schemeClr val="accent3"/>
-          </a:effectRef>
-          <a:fontRef idx="minor">
-            <a:schemeClr val="dk1"/>
-          </a:fontRef>
-        </p:style>
-        <p:txBody>
-          <a:bodyPr rtlCol="0" anchor="ctr"/>
-          <a:lstStyle/>
-          <a:p>
-            <a:pPr algn="ctr"/>
-            <a:endParaRPr lang="en-SG" sz="1400"/>
-          </a:p>
-        </p:txBody>
-      </p:sp>
-      <p:cxnSp>
-        <p:nvCxnSpPr>
-          <p:cNvPr id="97" name="Curved Connector 12">
-            <a:extLst>
-              <a:ext uri="{FF2B5EF4-FFF2-40B4-BE49-F238E27FC236}">
-                <a16:creationId xmlns:a16="http://schemas.microsoft.com/office/drawing/2014/main" id="{4813CD09-D166-454F-87F7-CBB7C05588A0}"/>
-              </a:ext>
-            </a:extLst>
-          </p:cNvPr>
-          <p:cNvCxnSpPr>
-            <a:cxnSpLocks/>
-          </p:cNvCxnSpPr>
-          <p:nvPr/>
-        </p:nvCxnSpPr>
-        <p:spPr>
-          <a:xfrm rot="16200000" flipH="1">
-            <a:off x="4714295" y="3776644"/>
-            <a:ext cx="156923" cy="76200"/>
-          </a:xfrm>
-          <a:prstGeom prst="curvedConnector4">
-            <a:avLst>
-              <a:gd name="adj1" fmla="val -8094"/>
-              <a:gd name="adj2" fmla="val 283333"/>
-            </a:avLst>
-          </a:prstGeom>
-          <a:ln>
-            <a:tailEnd type="triangle"/>
-          </a:ln>
-        </p:spPr>
-        <p:style>
-          <a:lnRef idx="1">
-            <a:schemeClr val="accent1"/>
-          </a:lnRef>
-          <a:fillRef idx="0">
-            <a:schemeClr val="accent1"/>
-          </a:fillRef>
-          <a:effectRef idx="0">
-            <a:schemeClr val="accent1"/>
-          </a:effectRef>
-          <a:fontRef idx="minor">
-            <a:schemeClr val="tx1"/>
-          </a:fontRef>
-        </p:style>
-      </p:cxnSp>
-      <p:cxnSp>
-        <p:nvCxnSpPr>
-          <p:cNvPr id="98" name="Curved Connector 12">
-            <a:extLst>
-              <a:ext uri="{FF2B5EF4-FFF2-40B4-BE49-F238E27FC236}">
-                <a16:creationId xmlns:a16="http://schemas.microsoft.com/office/drawing/2014/main" id="{A160D65E-5BBC-4893-9B05-2266ECE04FCB}"/>
-              </a:ext>
-            </a:extLst>
-          </p:cNvPr>
-          <p:cNvCxnSpPr>
-            <a:cxnSpLocks/>
-          </p:cNvCxnSpPr>
-          <p:nvPr/>
-        </p:nvCxnSpPr>
-        <p:spPr>
-          <a:xfrm rot="10800000" flipV="1">
-            <a:off x="4739375" y="4092328"/>
-            <a:ext cx="144692" cy="108124"/>
-          </a:xfrm>
-          <a:prstGeom prst="curvedConnector3">
-            <a:avLst>
-              <a:gd name="adj1" fmla="val -90435"/>
-            </a:avLst>
-          </a:prstGeom>
-          <a:ln>
-            <a:prstDash val="dash"/>
-            <a:tailEnd type="triangle"/>
-          </a:ln>
-        </p:spPr>
-        <p:style>
-          <a:lnRef idx="1">
-            <a:schemeClr val="accent1"/>
-          </a:lnRef>
-          <a:fillRef idx="0">
-            <a:schemeClr val="accent1"/>
-          </a:fillRef>
-          <a:effectRef idx="0">
-            <a:schemeClr val="accent1"/>
-          </a:effectRef>
-          <a:fontRef idx="minor">
-            <a:schemeClr val="tx1"/>
-          </a:fontRef>
-        </p:style>
-      </p:cxnSp>
-      <p:sp>
-        <p:nvSpPr>
           <p:cNvPr id="99" name="TextBox 98">
             <a:extLst>
               <a:ext uri="{FF2B5EF4-FFF2-40B4-BE49-F238E27FC236}">
@@ -8792,27 +8643,51 @@
           </a:lstStyle>
           <a:p>
             <a:r>
-              <a:rPr lang="en-US" sz="1200" dirty="0" err="1"/>
+              <a:rPr lang="en-US" sz="1200" dirty="0" err="1">
+                <a:solidFill>
+                  <a:srgbClr val="7030A0"/>
+                </a:solidFill>
+              </a:rPr>
               <a:t>createScoredCard</a:t>
             </a:r>
             <a:r>
-              <a:rPr lang="en-US" sz="1200" dirty="0"/>
+              <a:rPr lang="en-US" sz="1200" dirty="0">
+                <a:solidFill>
+                  <a:srgbClr val="7030A0"/>
+                </a:solidFill>
+              </a:rPr>
               <a:t>(</a:t>
             </a:r>
             <a:r>
-              <a:rPr lang="en-US" sz="1200" dirty="0" err="1"/>
+              <a:rPr lang="en-US" sz="1200" dirty="0" err="1">
+                <a:solidFill>
+                  <a:srgbClr val="7030A0"/>
+                </a:solidFill>
+              </a:rPr>
               <a:t>cardToMark</a:t>
             </a:r>
             <a:r>
-              <a:rPr lang="en-US" sz="1200" dirty="0"/>
+              <a:rPr lang="en-US" sz="1200" dirty="0">
+                <a:solidFill>
+                  <a:srgbClr val="7030A0"/>
+                </a:solidFill>
+              </a:rPr>
               <a:t>, </a:t>
             </a:r>
             <a:r>
-              <a:rPr lang="en-US" sz="1200" dirty="0" err="1"/>
+              <a:rPr lang="en-US" sz="1200" dirty="0" err="1">
+                <a:solidFill>
+                  <a:srgbClr val="7030A0"/>
+                </a:solidFill>
+              </a:rPr>
               <a:t>isAttemptCorrect</a:t>
             </a:r>
             <a:r>
-              <a:rPr lang="en-US" sz="1200" dirty="0"/>
+              <a:rPr lang="en-US" sz="1200" dirty="0">
+                <a:solidFill>
+                  <a:srgbClr val="7030A0"/>
+                </a:solidFill>
+              </a:rPr>
               <a:t>)</a:t>
             </a:r>
           </a:p>
@@ -9093,7 +8968,7 @@
         </p:nvSpPr>
         <p:spPr>
           <a:xfrm>
-            <a:off x="4819221" y="4012517"/>
+            <a:off x="5920737" y="3887110"/>
             <a:ext cx="967660" cy="184666"/>
           </a:xfrm>
           <a:prstGeom prst="rect">
@@ -9125,10 +9000,7 @@
               <a:rPr lang="en-US" sz="1200" dirty="0" err="1"/>
               <a:t>scoredCard</a:t>
             </a:r>
-            <a:r>
-              <a:rPr lang="en-US" sz="1200" dirty="0"/>
-              <a:t>)</a:t>
-            </a:r>
+            <a:endParaRPr lang="en-US" sz="1200" dirty="0"/>
           </a:p>
         </p:txBody>
       </p:sp>
@@ -9652,6 +9524,157 @@
           <a:xfrm flipV="1">
             <a:off x="8676710" y="5557707"/>
             <a:ext cx="2236465" cy="9346"/>
+          </a:xfrm>
+          <a:prstGeom prst="straightConnector1">
+            <a:avLst/>
+          </a:prstGeom>
+          <a:ln w="19050">
+            <a:solidFill>
+              <a:srgbClr val="7030A0"/>
+            </a:solidFill>
+            <a:prstDash val="sysDash"/>
+            <a:headEnd type="arrow" w="med" len="med"/>
+            <a:tailEnd type="none" w="med" len="med"/>
+          </a:ln>
+        </p:spPr>
+        <p:style>
+          <a:lnRef idx="1">
+            <a:schemeClr val="accent1"/>
+          </a:lnRef>
+          <a:fillRef idx="0">
+            <a:schemeClr val="accent1"/>
+          </a:fillRef>
+          <a:effectRef idx="0">
+            <a:schemeClr val="accent1"/>
+          </a:effectRef>
+          <a:fontRef idx="minor">
+            <a:schemeClr val="tx1"/>
+          </a:fontRef>
+        </p:style>
+      </p:cxnSp>
+      <p:sp>
+        <p:nvSpPr>
+          <p:cNvPr id="64" name="Rectangle 63">
+            <a:extLst>
+              <a:ext uri="{FF2B5EF4-FFF2-40B4-BE49-F238E27FC236}">
+                <a16:creationId xmlns:a16="http://schemas.microsoft.com/office/drawing/2014/main" id="{D89C4DB1-6A61-40DF-A9CC-12A0E44CC01D}"/>
+              </a:ext>
+            </a:extLst>
+          </p:cNvPr>
+          <p:cNvSpPr>
+            <a:spLocks/>
+          </p:cNvSpPr>
+          <p:nvPr/>
+        </p:nvSpPr>
+        <p:spPr>
+          <a:xfrm>
+            <a:off x="8492388" y="3881524"/>
+            <a:ext cx="177468" cy="177682"/>
+          </a:xfrm>
+          <a:prstGeom prst="rect">
+            <a:avLst/>
+          </a:prstGeom>
+          <a:solidFill>
+            <a:srgbClr val="7030A0"/>
+          </a:solidFill>
+          <a:ln>
+            <a:solidFill>
+              <a:srgbClr val="7030A0"/>
+            </a:solidFill>
+          </a:ln>
+          <a:effectLst>
+            <a:outerShdw blurRad="50800" dist="38100" dir="8100000" algn="tr" rotWithShape="0">
+              <a:prstClr val="black">
+                <a:alpha val="40000"/>
+              </a:prstClr>
+            </a:outerShdw>
+          </a:effectLst>
+        </p:spPr>
+        <p:style>
+          <a:lnRef idx="1">
+            <a:schemeClr val="accent3"/>
+          </a:lnRef>
+          <a:fillRef idx="2">
+            <a:schemeClr val="accent3"/>
+          </a:fillRef>
+          <a:effectRef idx="1">
+            <a:schemeClr val="accent3"/>
+          </a:effectRef>
+          <a:fontRef idx="minor">
+            <a:schemeClr val="dk1"/>
+          </a:fontRef>
+        </p:style>
+        <p:txBody>
+          <a:bodyPr rtlCol="0" anchor="ctr"/>
+          <a:lstStyle/>
+          <a:p>
+            <a:pPr algn="ctr"/>
+            <a:endParaRPr lang="en-SG" sz="1400"/>
+          </a:p>
+        </p:txBody>
+      </p:sp>
+      <p:cxnSp>
+        <p:nvCxnSpPr>
+          <p:cNvPr id="68" name="Straight Arrow Connector 67">
+            <a:extLst>
+              <a:ext uri="{FF2B5EF4-FFF2-40B4-BE49-F238E27FC236}">
+                <a16:creationId xmlns:a16="http://schemas.microsoft.com/office/drawing/2014/main" id="{8A0E91AF-6B4C-40B1-9414-85F19E2DAEFD}"/>
+              </a:ext>
+            </a:extLst>
+          </p:cNvPr>
+          <p:cNvCxnSpPr>
+            <a:cxnSpLocks/>
+          </p:cNvCxnSpPr>
+          <p:nvPr/>
+        </p:nvCxnSpPr>
+        <p:spPr>
+          <a:xfrm>
+            <a:off x="4750212" y="3896900"/>
+            <a:ext cx="3752372" cy="0"/>
+          </a:xfrm>
+          <a:prstGeom prst="straightConnector1">
+            <a:avLst/>
+          </a:prstGeom>
+          <a:ln w="19050">
+            <a:solidFill>
+              <a:srgbClr val="0070C0"/>
+            </a:solidFill>
+            <a:tailEnd type="arrow"/>
+          </a:ln>
+        </p:spPr>
+        <p:style>
+          <a:lnRef idx="1">
+            <a:schemeClr val="accent1"/>
+          </a:lnRef>
+          <a:fillRef idx="0">
+            <a:schemeClr val="accent1"/>
+          </a:fillRef>
+          <a:effectRef idx="0">
+            <a:schemeClr val="accent1"/>
+          </a:effectRef>
+          <a:fontRef idx="minor">
+            <a:schemeClr val="tx1"/>
+          </a:fontRef>
+        </p:style>
+      </p:cxnSp>
+      <p:cxnSp>
+        <p:nvCxnSpPr>
+          <p:cNvPr id="70" name="Straight Arrow Connector 69">
+            <a:extLst>
+              <a:ext uri="{FF2B5EF4-FFF2-40B4-BE49-F238E27FC236}">
+                <a16:creationId xmlns:a16="http://schemas.microsoft.com/office/drawing/2014/main" id="{73E5CC2A-EDC7-46EC-A5D2-4693090BA120}"/>
+              </a:ext>
+            </a:extLst>
+          </p:cNvPr>
+          <p:cNvCxnSpPr>
+            <a:cxnSpLocks/>
+          </p:cNvCxnSpPr>
+          <p:nvPr/>
+        </p:nvCxnSpPr>
+        <p:spPr>
+          <a:xfrm>
+            <a:off x="4747207" y="4063253"/>
+            <a:ext cx="3791128" cy="1"/>
           </a:xfrm>
           <a:prstGeom prst="straightConnector1">
             <a:avLst/>

</xml_diff>

<commit_message>
Update test session sequence diagram and ui class diagram for DG
</commit_message>
<xml_diff>
--- a/docs/diagrams/TestSessionSequenceDiagram.pptx
+++ b/docs/diagrams/TestSessionSequenceDiagram.pptx
@@ -5,12 +5,11 @@
     <p:sldMasterId id="2147483648" r:id="rId1"/>
   </p:sldMasterIdLst>
   <p:notesMasterIdLst>
-    <p:notesMasterId r:id="rId5"/>
+    <p:notesMasterId r:id="rId4"/>
   </p:notesMasterIdLst>
   <p:sldIdLst>
     <p:sldId id="267" r:id="rId2"/>
     <p:sldId id="271" r:id="rId3"/>
-    <p:sldId id="270" r:id="rId4"/>
   </p:sldIdLst>
   <p:sldSz cx="9144000" cy="6858000" type="screen4x3"/>
   <p:notesSz cx="6858000" cy="9144000"/>
@@ -210,7 +209,7 @@
           <a:p>
             <a:fld id="{F5CC4B3F-88C1-4FFA-B1B6-F41C21DC6924}" type="datetimeFigureOut">
               <a:rPr lang="en-US" smtClean="0"/>
-              <a:t>4/7/2019</a:t>
+              <a:t>4/13/2019</a:t>
             </a:fld>
             <a:endParaRPr lang="en-US"/>
           </a:p>
@@ -477,95 +476,6 @@
 </p:notesMaster>
 </file>
 
-<file path=ppt/notesSlides/notesSlide1.xml><?xml version="1.0" encoding="utf-8"?>
-<p:notes xmlns:a="http://schemas.openxmlformats.org/drawingml/2006/main" xmlns:r="http://schemas.openxmlformats.org/officeDocument/2006/relationships" xmlns:p="http://schemas.openxmlformats.org/presentationml/2006/main">
-  <p:cSld>
-    <p:spTree>
-      <p:nvGrpSpPr>
-        <p:cNvPr id="1" name=""/>
-        <p:cNvGrpSpPr/>
-        <p:nvPr/>
-      </p:nvGrpSpPr>
-      <p:grpSpPr>
-        <a:xfrm>
-          <a:off x="0" y="0"/>
-          <a:ext cx="0" cy="0"/>
-          <a:chOff x="0" y="0"/>
-          <a:chExt cx="0" cy="0"/>
-        </a:xfrm>
-      </p:grpSpPr>
-      <p:sp>
-        <p:nvSpPr>
-          <p:cNvPr id="2" name="Slide Image Placeholder 1"/>
-          <p:cNvSpPr>
-            <a:spLocks noGrp="1" noRot="1" noChangeAspect="1"/>
-          </p:cNvSpPr>
-          <p:nvPr>
-            <p:ph type="sldImg"/>
-          </p:nvPr>
-        </p:nvSpPr>
-        <p:spPr>
-          <a:xfrm>
-            <a:off x="1143000" y="685800"/>
-            <a:ext cx="4572000" cy="3429000"/>
-          </a:xfrm>
-        </p:spPr>
-      </p:sp>
-      <p:sp>
-        <p:nvSpPr>
-          <p:cNvPr id="3" name="Notes Placeholder 2"/>
-          <p:cNvSpPr>
-            <a:spLocks noGrp="1"/>
-          </p:cNvSpPr>
-          <p:nvPr>
-            <p:ph type="body" idx="1"/>
-          </p:nvPr>
-        </p:nvSpPr>
-        <p:spPr/>
-        <p:txBody>
-          <a:bodyPr/>
-          <a:lstStyle/>
-          <a:p>
-            <a:endParaRPr lang="en-SG" dirty="0"/>
-          </a:p>
-        </p:txBody>
-      </p:sp>
-      <p:sp>
-        <p:nvSpPr>
-          <p:cNvPr id="4" name="Slide Number Placeholder 3"/>
-          <p:cNvSpPr>
-            <a:spLocks noGrp="1"/>
-          </p:cNvSpPr>
-          <p:nvPr>
-            <p:ph type="sldNum" sz="quarter" idx="5"/>
-          </p:nvPr>
-        </p:nvSpPr>
-        <p:spPr/>
-        <p:txBody>
-          <a:bodyPr/>
-          <a:lstStyle/>
-          <a:p>
-            <a:fld id="{5A7AB025-77E3-4BD1-A2FD-B3183DBA47A3}" type="slidenum">
-              <a:rPr lang="en-US" smtClean="0"/>
-              <a:t>3</a:t>
-            </a:fld>
-            <a:endParaRPr lang="en-US"/>
-          </a:p>
-        </p:txBody>
-      </p:sp>
-    </p:spTree>
-    <p:extLst>
-      <p:ext uri="{BB962C8B-B14F-4D97-AF65-F5344CB8AC3E}">
-        <p14:creationId xmlns:p14="http://schemas.microsoft.com/office/powerpoint/2010/main" val="445692092"/>
-      </p:ext>
-    </p:extLst>
-  </p:cSld>
-  <p:clrMapOvr>
-    <a:masterClrMapping/>
-  </p:clrMapOvr>
-</p:notes>
-</file>
-
 <file path=ppt/slideLayouts/slideLayout1.xml><?xml version="1.0" encoding="utf-8"?>
 <p:sldLayout xmlns:a="http://schemas.openxmlformats.org/drawingml/2006/main" xmlns:r="http://schemas.openxmlformats.org/officeDocument/2006/relationships" xmlns:p="http://schemas.openxmlformats.org/presentationml/2006/main" type="title" preserve="1">
   <p:cSld name="Title Slide">
@@ -745,7 +655,7 @@
           <a:p>
             <a:fld id="{78C97017-6FC3-485B-9764-EAC9E56C1D49}" type="datetimeFigureOut">
               <a:rPr lang="en-US" smtClean="0"/>
-              <a:t>4/7/2019</a:t>
+              <a:t>4/13/2019</a:t>
             </a:fld>
             <a:endParaRPr lang="en-US"/>
           </a:p>
@@ -913,7 +823,7 @@
           <a:p>
             <a:fld id="{78C97017-6FC3-485B-9764-EAC9E56C1D49}" type="datetimeFigureOut">
               <a:rPr lang="en-US" smtClean="0"/>
-              <a:t>4/7/2019</a:t>
+              <a:t>4/13/2019</a:t>
             </a:fld>
             <a:endParaRPr lang="en-US"/>
           </a:p>
@@ -1091,7 +1001,7 @@
           <a:p>
             <a:fld id="{78C97017-6FC3-485B-9764-EAC9E56C1D49}" type="datetimeFigureOut">
               <a:rPr lang="en-US" smtClean="0"/>
-              <a:t>4/7/2019</a:t>
+              <a:t>4/13/2019</a:t>
             </a:fld>
             <a:endParaRPr lang="en-US"/>
           </a:p>
@@ -1259,7 +1169,7 @@
           <a:p>
             <a:fld id="{78C97017-6FC3-485B-9764-EAC9E56C1D49}" type="datetimeFigureOut">
               <a:rPr lang="en-US" smtClean="0"/>
-              <a:t>4/7/2019</a:t>
+              <a:t>4/13/2019</a:t>
             </a:fld>
             <a:endParaRPr lang="en-US"/>
           </a:p>
@@ -1504,7 +1414,7 @@
           <a:p>
             <a:fld id="{78C97017-6FC3-485B-9764-EAC9E56C1D49}" type="datetimeFigureOut">
               <a:rPr lang="en-US" smtClean="0"/>
-              <a:t>4/7/2019</a:t>
+              <a:t>4/13/2019</a:t>
             </a:fld>
             <a:endParaRPr lang="en-US"/>
           </a:p>
@@ -1789,7 +1699,7 @@
           <a:p>
             <a:fld id="{78C97017-6FC3-485B-9764-EAC9E56C1D49}" type="datetimeFigureOut">
               <a:rPr lang="en-US" smtClean="0"/>
-              <a:t>4/7/2019</a:t>
+              <a:t>4/13/2019</a:t>
             </a:fld>
             <a:endParaRPr lang="en-US"/>
           </a:p>
@@ -2208,7 +2118,7 @@
           <a:p>
             <a:fld id="{78C97017-6FC3-485B-9764-EAC9E56C1D49}" type="datetimeFigureOut">
               <a:rPr lang="en-US" smtClean="0"/>
-              <a:t>4/7/2019</a:t>
+              <a:t>4/13/2019</a:t>
             </a:fld>
             <a:endParaRPr lang="en-US"/>
           </a:p>
@@ -2325,7 +2235,7 @@
           <a:p>
             <a:fld id="{78C97017-6FC3-485B-9764-EAC9E56C1D49}" type="datetimeFigureOut">
               <a:rPr lang="en-US" smtClean="0"/>
-              <a:t>4/7/2019</a:t>
+              <a:t>4/13/2019</a:t>
             </a:fld>
             <a:endParaRPr lang="en-US"/>
           </a:p>
@@ -2420,7 +2330,7 @@
           <a:p>
             <a:fld id="{78C97017-6FC3-485B-9764-EAC9E56C1D49}" type="datetimeFigureOut">
               <a:rPr lang="en-US" smtClean="0"/>
-              <a:t>4/7/2019</a:t>
+              <a:t>4/13/2019</a:t>
             </a:fld>
             <a:endParaRPr lang="en-US"/>
           </a:p>
@@ -2695,7 +2605,7 @@
           <a:p>
             <a:fld id="{78C97017-6FC3-485B-9764-EAC9E56C1D49}" type="datetimeFigureOut">
               <a:rPr lang="en-US" smtClean="0"/>
-              <a:t>4/7/2019</a:t>
+              <a:t>4/13/2019</a:t>
             </a:fld>
             <a:endParaRPr lang="en-US"/>
           </a:p>
@@ -2947,7 +2857,7 @@
           <a:p>
             <a:fld id="{78C97017-6FC3-485B-9764-EAC9E56C1D49}" type="datetimeFigureOut">
               <a:rPr lang="en-US" smtClean="0"/>
-              <a:t>4/7/2019</a:t>
+              <a:t>4/13/2019</a:t>
             </a:fld>
             <a:endParaRPr lang="en-US"/>
           </a:p>
@@ -3158,7 +3068,7 @@
           <a:p>
             <a:fld id="{78C97017-6FC3-485B-9764-EAC9E56C1D49}" type="datetimeFigureOut">
               <a:rPr lang="en-US" smtClean="0"/>
-              <a:t>4/7/2019</a:t>
+              <a:t>4/13/2019</a:t>
             </a:fld>
             <a:endParaRPr lang="en-US"/>
           </a:p>
@@ -4459,7 +4369,7 @@
                   </a:schemeClr>
                 </a:solidFill>
               </a:rPr>
-              <a:t>testCardFolder</a:t>
+              <a:t>startTestSession</a:t>
             </a:r>
             <a:r>
               <a:rPr lang="en-US" sz="1200" dirty="0">
@@ -9707,2281 +9617,6 @@
     <p:extLst>
       <p:ext uri="{BB962C8B-B14F-4D97-AF65-F5344CB8AC3E}">
         <p14:creationId xmlns:p14="http://schemas.microsoft.com/office/powerpoint/2010/main" val="624761106"/>
-      </p:ext>
-    </p:extLst>
-  </p:cSld>
-  <p:clrMapOvr>
-    <a:masterClrMapping/>
-  </p:clrMapOvr>
-</p:sld>
-</file>
-
-<file path=ppt/slides/slide3.xml><?xml version="1.0" encoding="utf-8"?>
-<p:sld xmlns:a="http://schemas.openxmlformats.org/drawingml/2006/main" xmlns:r="http://schemas.openxmlformats.org/officeDocument/2006/relationships" xmlns:p="http://schemas.openxmlformats.org/presentationml/2006/main">
-  <p:cSld>
-    <p:spTree>
-      <p:nvGrpSpPr>
-        <p:cNvPr id="1" name=""/>
-        <p:cNvGrpSpPr/>
-        <p:nvPr/>
-      </p:nvGrpSpPr>
-      <p:grpSpPr>
-        <a:xfrm>
-          <a:off x="0" y="0"/>
-          <a:ext cx="0" cy="0"/>
-          <a:chOff x="0" y="0"/>
-          <a:chExt cx="0" cy="0"/>
-        </a:xfrm>
-      </p:grpSpPr>
-      <p:grpSp>
-        <p:nvGrpSpPr>
-          <p:cNvPr id="3" name="Group 2">
-            <a:extLst>
-              <a:ext uri="{FF2B5EF4-FFF2-40B4-BE49-F238E27FC236}">
-                <a16:creationId xmlns:a16="http://schemas.microsoft.com/office/drawing/2014/main" id="{D4A95512-C081-4B55-87C0-578C6DE31528}"/>
-              </a:ext>
-            </a:extLst>
-          </p:cNvPr>
-          <p:cNvGrpSpPr/>
-          <p:nvPr/>
-        </p:nvGrpSpPr>
-        <p:grpSpPr>
-          <a:xfrm>
-            <a:off x="-76842" y="228600"/>
-            <a:ext cx="9900520" cy="5843404"/>
-            <a:chOff x="1039404" y="176397"/>
-            <a:chExt cx="4318546" cy="2318154"/>
-          </a:xfrm>
-        </p:grpSpPr>
-        <p:sp>
-          <p:nvSpPr>
-            <p:cNvPr id="129" name="Rectangle 65">
-              <a:extLst>
-                <a:ext uri="{FF2B5EF4-FFF2-40B4-BE49-F238E27FC236}">
-                  <a16:creationId xmlns:a16="http://schemas.microsoft.com/office/drawing/2014/main" id="{685F4543-20F1-4917-A688-3872C723BA41}"/>
-                </a:ext>
-              </a:extLst>
-            </p:cNvPr>
-            <p:cNvSpPr/>
-            <p:nvPr/>
-          </p:nvSpPr>
-          <p:spPr>
-            <a:xfrm>
-              <a:off x="1156426" y="176397"/>
-              <a:ext cx="3525307" cy="2318154"/>
-            </a:xfrm>
-            <a:prstGeom prst="roundRect">
-              <a:avLst>
-                <a:gd name="adj" fmla="val 3484"/>
-              </a:avLst>
-            </a:prstGeom>
-            <a:solidFill>
-              <a:srgbClr val="F1F5E9"/>
-            </a:solidFill>
-            <a:ln w="19050">
-              <a:noFill/>
-            </a:ln>
-            <a:effectLst/>
-          </p:spPr>
-          <p:style>
-            <a:lnRef idx="1">
-              <a:schemeClr val="accent2"/>
-            </a:lnRef>
-            <a:fillRef idx="2">
-              <a:schemeClr val="accent2"/>
-            </a:fillRef>
-            <a:effectRef idx="1">
-              <a:schemeClr val="accent2"/>
-            </a:effectRef>
-            <a:fontRef idx="minor">
-              <a:schemeClr val="dk1"/>
-            </a:fontRef>
-          </p:style>
-          <p:txBody>
-            <a:bodyPr rtlCol="0" anchor="t"/>
-            <a:lstStyle/>
-            <a:p>
-              <a:r>
-                <a:rPr lang="en-US" sz="1200" b="1" dirty="0">
-                  <a:solidFill>
-                    <a:schemeClr val="accent3">
-                      <a:lumMod val="75000"/>
-                    </a:schemeClr>
-                  </a:solidFill>
-                </a:rPr>
-                <a:t>UI</a:t>
-              </a:r>
-              <a:endParaRPr lang="en-SG" sz="1200" b="1" dirty="0">
-                <a:solidFill>
-                  <a:schemeClr val="accent3">
-                    <a:lumMod val="75000"/>
-                  </a:schemeClr>
-                </a:solidFill>
-              </a:endParaRPr>
-            </a:p>
-          </p:txBody>
-        </p:sp>
-        <p:sp>
-          <p:nvSpPr>
-            <p:cNvPr id="81" name="Rectangle 65"/>
-            <p:cNvSpPr>
-              <a:spLocks/>
-            </p:cNvSpPr>
-            <p:nvPr/>
-          </p:nvSpPr>
-          <p:spPr>
-            <a:xfrm>
-              <a:off x="4745435" y="176397"/>
-              <a:ext cx="612515" cy="2318154"/>
-            </a:xfrm>
-            <a:prstGeom prst="roundRect">
-              <a:avLst>
-                <a:gd name="adj" fmla="val 11063"/>
-              </a:avLst>
-            </a:prstGeom>
-            <a:solidFill>
-              <a:schemeClr val="accent1">
-                <a:lumMod val="20000"/>
-                <a:lumOff val="80000"/>
-              </a:schemeClr>
-            </a:solidFill>
-            <a:ln w="19050">
-              <a:noFill/>
-            </a:ln>
-            <a:effectLst/>
-          </p:spPr>
-          <p:style>
-            <a:lnRef idx="1">
-              <a:schemeClr val="accent2"/>
-            </a:lnRef>
-            <a:fillRef idx="2">
-              <a:schemeClr val="accent2"/>
-            </a:fillRef>
-            <a:effectRef idx="1">
-              <a:schemeClr val="accent2"/>
-            </a:effectRef>
-            <a:fontRef idx="minor">
-              <a:schemeClr val="dk1"/>
-            </a:fontRef>
-          </p:style>
-          <p:txBody>
-            <a:bodyPr rtlCol="0" anchor="t"/>
-            <a:lstStyle/>
-            <a:p>
-              <a:r>
-                <a:rPr lang="en-US" sz="1200" b="1" dirty="0">
-                  <a:solidFill>
-                    <a:srgbClr val="0070C0"/>
-                  </a:solidFill>
-                </a:rPr>
-                <a:t>Logic</a:t>
-              </a:r>
-              <a:endParaRPr lang="en-SG" sz="1200" b="1" dirty="0">
-                <a:solidFill>
-                  <a:srgbClr val="0070C0"/>
-                </a:solidFill>
-              </a:endParaRPr>
-            </a:p>
-          </p:txBody>
-        </p:sp>
-        <p:sp>
-          <p:nvSpPr>
-            <p:cNvPr id="2" name="Rectangle 62"/>
-            <p:cNvSpPr>
-              <a:spLocks/>
-            </p:cNvSpPr>
-            <p:nvPr/>
-          </p:nvSpPr>
-          <p:spPr>
-            <a:xfrm>
-              <a:off x="4803916" y="345902"/>
-              <a:ext cx="515553" cy="204795"/>
-            </a:xfrm>
-            <a:prstGeom prst="rect">
-              <a:avLst/>
-            </a:prstGeom>
-            <a:solidFill>
-              <a:srgbClr val="0070C0"/>
-            </a:solidFill>
-            <a:ln w="19050">
-              <a:solidFill>
-                <a:srgbClr val="0070C0"/>
-              </a:solidFill>
-            </a:ln>
-            <a:effectLst/>
-          </p:spPr>
-          <p:style>
-            <a:lnRef idx="1">
-              <a:schemeClr val="accent2"/>
-            </a:lnRef>
-            <a:fillRef idx="2">
-              <a:schemeClr val="accent2"/>
-            </a:fillRef>
-            <a:effectRef idx="1">
-              <a:schemeClr val="accent2"/>
-            </a:effectRef>
-            <a:fontRef idx="minor">
-              <a:schemeClr val="dk1"/>
-            </a:fontRef>
-          </p:style>
-          <p:txBody>
-            <a:bodyPr rtlCol="0" anchor="ctr"/>
-            <a:lstStyle/>
-            <a:p>
-              <a:pPr algn="ctr"/>
-              <a:r>
-                <a:rPr lang="en-US" sz="1200" dirty="0">
-                  <a:solidFill>
-                    <a:schemeClr val="bg1"/>
-                  </a:solidFill>
-                </a:rPr>
-                <a:t>:Logic Manager</a:t>
-              </a:r>
-              <a:endParaRPr lang="en-SG" sz="1200" dirty="0">
-                <a:solidFill>
-                  <a:schemeClr val="bg1"/>
-                </a:solidFill>
-              </a:endParaRPr>
-            </a:p>
-          </p:txBody>
-        </p:sp>
-        <p:cxnSp>
-          <p:nvCxnSpPr>
-            <p:cNvPr id="5" name="Straight Connector 4"/>
-            <p:cNvCxnSpPr>
-              <a:cxnSpLocks/>
-              <a:endCxn id="81" idx="2"/>
-            </p:cNvCxnSpPr>
-            <p:nvPr/>
-          </p:nvCxnSpPr>
-          <p:spPr>
-            <a:xfrm flipH="1">
-              <a:off x="5051693" y="537377"/>
-              <a:ext cx="19065" cy="1957174"/>
-            </a:xfrm>
-            <a:prstGeom prst="line">
-              <a:avLst/>
-            </a:prstGeom>
-            <a:ln w="19050">
-              <a:solidFill>
-                <a:srgbClr val="0070C0">
-                  <a:alpha val="25098"/>
-                </a:srgbClr>
-              </a:solidFill>
-              <a:prstDash val="sysDash"/>
-            </a:ln>
-            <a:effectLst/>
-          </p:spPr>
-          <p:style>
-            <a:lnRef idx="1">
-              <a:schemeClr val="accent1"/>
-            </a:lnRef>
-            <a:fillRef idx="2">
-              <a:schemeClr val="accent1"/>
-            </a:fillRef>
-            <a:effectRef idx="1">
-              <a:schemeClr val="accent1"/>
-            </a:effectRef>
-            <a:fontRef idx="minor">
-              <a:schemeClr val="dk1"/>
-            </a:fontRef>
-          </p:style>
-        </p:cxnSp>
-        <p:sp>
-          <p:nvSpPr>
-            <p:cNvPr id="6" name="Rectangle 5"/>
-            <p:cNvSpPr>
-              <a:spLocks/>
-            </p:cNvSpPr>
-            <p:nvPr/>
-          </p:nvSpPr>
-          <p:spPr>
-            <a:xfrm>
-              <a:off x="5036950" y="720202"/>
-              <a:ext cx="71156" cy="138485"/>
-            </a:xfrm>
-            <a:prstGeom prst="rect">
-              <a:avLst/>
-            </a:prstGeom>
-            <a:solidFill>
-              <a:srgbClr val="0070C0"/>
-            </a:solidFill>
-            <a:ln>
-              <a:solidFill>
-                <a:srgbClr val="0070C0"/>
-              </a:solidFill>
-            </a:ln>
-            <a:effectLst/>
-          </p:spPr>
-          <p:style>
-            <a:lnRef idx="1">
-              <a:schemeClr val="accent3"/>
-            </a:lnRef>
-            <a:fillRef idx="2">
-              <a:schemeClr val="accent3"/>
-            </a:fillRef>
-            <a:effectRef idx="1">
-              <a:schemeClr val="accent3"/>
-            </a:effectRef>
-            <a:fontRef idx="minor">
-              <a:schemeClr val="dk1"/>
-            </a:fontRef>
-          </p:style>
-          <p:txBody>
-            <a:bodyPr rtlCol="0" anchor="ctr"/>
-            <a:lstStyle/>
-            <a:p>
-              <a:pPr algn="ctr"/>
-              <a:endParaRPr lang="en-SG" sz="1200"/>
-            </a:p>
-          </p:txBody>
-        </p:sp>
-        <p:cxnSp>
-          <p:nvCxnSpPr>
-            <p:cNvPr id="23" name="Straight Arrow Connector 22"/>
-            <p:cNvCxnSpPr>
-              <a:cxnSpLocks/>
-            </p:cNvCxnSpPr>
-            <p:nvPr/>
-          </p:nvCxnSpPr>
-          <p:spPr>
-            <a:xfrm flipV="1">
-              <a:off x="1777351" y="1025229"/>
-              <a:ext cx="3259599" cy="0"/>
-            </a:xfrm>
-            <a:prstGeom prst="straightConnector1">
-              <a:avLst/>
-            </a:prstGeom>
-            <a:ln w="19050">
-              <a:solidFill>
-                <a:srgbClr val="00B050"/>
-              </a:solidFill>
-              <a:tailEnd type="arrow"/>
-            </a:ln>
-          </p:spPr>
-          <p:style>
-            <a:lnRef idx="1">
-              <a:schemeClr val="accent1"/>
-            </a:lnRef>
-            <a:fillRef idx="0">
-              <a:schemeClr val="accent1"/>
-            </a:fillRef>
-            <a:effectRef idx="0">
-              <a:schemeClr val="accent1"/>
-            </a:effectRef>
-            <a:fontRef idx="minor">
-              <a:schemeClr val="tx1"/>
-            </a:fontRef>
-          </p:style>
-        </p:cxnSp>
-        <p:sp>
-          <p:nvSpPr>
-            <p:cNvPr id="26" name="TextBox 25"/>
-            <p:cNvSpPr txBox="1">
-              <a:spLocks/>
-            </p:cNvSpPr>
-            <p:nvPr/>
-          </p:nvSpPr>
-          <p:spPr>
-            <a:xfrm>
-              <a:off x="2731284" y="629744"/>
-              <a:ext cx="481016" cy="171056"/>
-            </a:xfrm>
-            <a:prstGeom prst="rect">
-              <a:avLst/>
-            </a:prstGeom>
-            <a:noFill/>
-          </p:spPr>
-          <p:txBody>
-            <a:bodyPr wrap="square" lIns="0" tIns="0" rIns="0" bIns="0" rtlCol="0">
-              <a:spAutoFit/>
-            </a:bodyPr>
-            <a:lstStyle/>
-            <a:p>
-              <a:pPr algn="r"/>
-              <a:r>
-                <a:rPr lang="en-US" sz="1200" dirty="0" err="1">
-                  <a:solidFill>
-                    <a:srgbClr val="0070C0"/>
-                  </a:solidFill>
-                </a:rPr>
-                <a:t>getFilteredCards</a:t>
-              </a:r>
-              <a:r>
-                <a:rPr lang="en-US" sz="1200" dirty="0">
-                  <a:solidFill>
-                    <a:srgbClr val="0070C0"/>
-                  </a:solidFill>
-                </a:rPr>
-                <a:t>()</a:t>
-              </a:r>
-            </a:p>
-          </p:txBody>
-        </p:sp>
-        <p:cxnSp>
-          <p:nvCxnSpPr>
-            <p:cNvPr id="37" name="Straight Arrow Connector 36"/>
-            <p:cNvCxnSpPr>
-              <a:cxnSpLocks/>
-            </p:cNvCxnSpPr>
-            <p:nvPr/>
-          </p:nvCxnSpPr>
-          <p:spPr>
-            <a:xfrm>
-              <a:off x="1072922" y="2339336"/>
-              <a:ext cx="640572" cy="0"/>
-            </a:xfrm>
-            <a:prstGeom prst="straightConnector1">
-              <a:avLst/>
-            </a:prstGeom>
-            <a:ln w="19050">
-              <a:solidFill>
-                <a:srgbClr val="00B050"/>
-              </a:solidFill>
-              <a:prstDash val="sysDash"/>
-              <a:headEnd type="arrow" w="med" len="med"/>
-              <a:tailEnd type="none" w="med" len="med"/>
-            </a:ln>
-          </p:spPr>
-          <p:style>
-            <a:lnRef idx="1">
-              <a:schemeClr val="accent1"/>
-            </a:lnRef>
-            <a:fillRef idx="0">
-              <a:schemeClr val="accent1"/>
-            </a:fillRef>
-            <a:effectRef idx="0">
-              <a:schemeClr val="accent1"/>
-            </a:effectRef>
-            <a:fontRef idx="minor">
-              <a:schemeClr val="tx1"/>
-            </a:fontRef>
-          </p:style>
-        </p:cxnSp>
-        <p:sp>
-          <p:nvSpPr>
-            <p:cNvPr id="130" name="Rectangle 62">
-              <a:extLst>
-                <a:ext uri="{FF2B5EF4-FFF2-40B4-BE49-F238E27FC236}">
-                  <a16:creationId xmlns:a16="http://schemas.microsoft.com/office/drawing/2014/main" id="{2C526AA9-AB6C-4D20-B4CA-BB30F883110F}"/>
-                </a:ext>
-              </a:extLst>
-            </p:cNvPr>
-            <p:cNvSpPr/>
-            <p:nvPr/>
-          </p:nvSpPr>
-          <p:spPr>
-            <a:xfrm>
-              <a:off x="1482559" y="308027"/>
-              <a:ext cx="534710" cy="212937"/>
-            </a:xfrm>
-            <a:prstGeom prst="rect">
-              <a:avLst/>
-            </a:prstGeom>
-            <a:solidFill>
-              <a:srgbClr val="00B050"/>
-            </a:solidFill>
-            <a:ln w="19050">
-              <a:solidFill>
-                <a:srgbClr val="00B050"/>
-              </a:solidFill>
-            </a:ln>
-            <a:effectLst/>
-          </p:spPr>
-          <p:style>
-            <a:lnRef idx="1">
-              <a:schemeClr val="accent2"/>
-            </a:lnRef>
-            <a:fillRef idx="2">
-              <a:schemeClr val="accent2"/>
-            </a:fillRef>
-            <a:effectRef idx="1">
-              <a:schemeClr val="accent2"/>
-            </a:effectRef>
-            <a:fontRef idx="minor">
-              <a:schemeClr val="dk1"/>
-            </a:fontRef>
-          </p:style>
-          <p:txBody>
-            <a:bodyPr rtlCol="0" anchor="ctr"/>
-            <a:lstStyle/>
-            <a:p>
-              <a:pPr algn="ctr"/>
-              <a:r>
-                <a:rPr lang="en-US" sz="1200" dirty="0">
-                  <a:solidFill>
-                    <a:schemeClr val="bg1"/>
-                  </a:solidFill>
-                </a:rPr>
-                <a:t>:</a:t>
-              </a:r>
-              <a:r>
-                <a:rPr lang="en-US" sz="1200" dirty="0" err="1">
-                  <a:solidFill>
-                    <a:schemeClr val="bg1"/>
-                  </a:solidFill>
-                </a:rPr>
-                <a:t>MainWindow</a:t>
-              </a:r>
-              <a:endParaRPr lang="en-SG" sz="1200" dirty="0">
-                <a:solidFill>
-                  <a:schemeClr val="bg1"/>
-                </a:solidFill>
-              </a:endParaRPr>
-            </a:p>
-          </p:txBody>
-        </p:sp>
-        <p:cxnSp>
-          <p:nvCxnSpPr>
-            <p:cNvPr id="131" name="Straight Connector 130">
-              <a:extLst>
-                <a:ext uri="{FF2B5EF4-FFF2-40B4-BE49-F238E27FC236}">
-                  <a16:creationId xmlns:a16="http://schemas.microsoft.com/office/drawing/2014/main" id="{6AFB2F5A-4272-4B6D-A79E-397B1F7CE21C}"/>
-                </a:ext>
-              </a:extLst>
-            </p:cNvPr>
-            <p:cNvCxnSpPr>
-              <a:cxnSpLocks/>
-            </p:cNvCxnSpPr>
-            <p:nvPr/>
-          </p:nvCxnSpPr>
-          <p:spPr>
-            <a:xfrm>
-              <a:off x="1749914" y="518127"/>
-              <a:ext cx="0" cy="1976424"/>
-            </a:xfrm>
-            <a:prstGeom prst="line">
-              <a:avLst/>
-            </a:prstGeom>
-            <a:ln w="19050">
-              <a:solidFill>
-                <a:srgbClr val="00B050">
-                  <a:alpha val="25000"/>
-                </a:srgbClr>
-              </a:solidFill>
-              <a:prstDash val="sysDash"/>
-            </a:ln>
-            <a:effectLst/>
-          </p:spPr>
-          <p:style>
-            <a:lnRef idx="1">
-              <a:schemeClr val="accent1"/>
-            </a:lnRef>
-            <a:fillRef idx="2">
-              <a:schemeClr val="accent1"/>
-            </a:fillRef>
-            <a:effectRef idx="1">
-              <a:schemeClr val="accent1"/>
-            </a:effectRef>
-            <a:fontRef idx="minor">
-              <a:schemeClr val="dk1"/>
-            </a:fontRef>
-          </p:style>
-        </p:cxnSp>
-        <p:sp>
-          <p:nvSpPr>
-            <p:cNvPr id="132" name="Rectangle 131">
-              <a:extLst>
-                <a:ext uri="{FF2B5EF4-FFF2-40B4-BE49-F238E27FC236}">
-                  <a16:creationId xmlns:a16="http://schemas.microsoft.com/office/drawing/2014/main" id="{18BBF34E-83DB-48C3-A8C6-7C246D44DC25}"/>
-                </a:ext>
-              </a:extLst>
-            </p:cNvPr>
-            <p:cNvSpPr>
-              <a:spLocks/>
-            </p:cNvSpPr>
-            <p:nvPr/>
-          </p:nvSpPr>
-          <p:spPr>
-            <a:xfrm>
-              <a:off x="1721477" y="685455"/>
-              <a:ext cx="51411" cy="1654196"/>
-            </a:xfrm>
-            <a:prstGeom prst="rect">
-              <a:avLst/>
-            </a:prstGeom>
-            <a:solidFill>
-              <a:srgbClr val="00B050"/>
-            </a:solidFill>
-            <a:ln>
-              <a:solidFill>
-                <a:srgbClr val="00B050"/>
-              </a:solidFill>
-            </a:ln>
-            <a:effectLst/>
-          </p:spPr>
-          <p:style>
-            <a:lnRef idx="1">
-              <a:schemeClr val="accent3"/>
-            </a:lnRef>
-            <a:fillRef idx="2">
-              <a:schemeClr val="accent3"/>
-            </a:fillRef>
-            <a:effectRef idx="1">
-              <a:schemeClr val="accent3"/>
-            </a:effectRef>
-            <a:fontRef idx="minor">
-              <a:schemeClr val="dk1"/>
-            </a:fontRef>
-          </p:style>
-          <p:txBody>
-            <a:bodyPr rtlCol="0" anchor="ctr"/>
-            <a:lstStyle/>
-            <a:p>
-              <a:pPr algn="ctr"/>
-              <a:endParaRPr lang="en-SG" sz="1200">
-                <a:solidFill>
-                  <a:srgbClr val="0070C0"/>
-                </a:solidFill>
-              </a:endParaRPr>
-            </a:p>
-          </p:txBody>
-        </p:sp>
-        <p:cxnSp>
-          <p:nvCxnSpPr>
-            <p:cNvPr id="60" name="Straight Arrow Connector 59">
-              <a:extLst>
-                <a:ext uri="{FF2B5EF4-FFF2-40B4-BE49-F238E27FC236}">
-                  <a16:creationId xmlns:a16="http://schemas.microsoft.com/office/drawing/2014/main" id="{AE797A79-BE3D-48C8-A169-BB7CAE78B61A}"/>
-                </a:ext>
-              </a:extLst>
-            </p:cNvPr>
-            <p:cNvCxnSpPr>
-              <a:cxnSpLocks/>
-            </p:cNvCxnSpPr>
-            <p:nvPr/>
-          </p:nvCxnSpPr>
-          <p:spPr>
-            <a:xfrm>
-              <a:off x="1744591" y="722319"/>
-              <a:ext cx="3292359" cy="0"/>
-            </a:xfrm>
-            <a:prstGeom prst="straightConnector1">
-              <a:avLst/>
-            </a:prstGeom>
-            <a:ln w="19050">
-              <a:solidFill>
-                <a:srgbClr val="00B050"/>
-              </a:solidFill>
-              <a:tailEnd type="arrow"/>
-            </a:ln>
-          </p:spPr>
-          <p:style>
-            <a:lnRef idx="1">
-              <a:schemeClr val="accent1"/>
-            </a:lnRef>
-            <a:fillRef idx="0">
-              <a:schemeClr val="accent1"/>
-            </a:fillRef>
-            <a:effectRef idx="0">
-              <a:schemeClr val="accent1"/>
-            </a:effectRef>
-            <a:fontRef idx="minor">
-              <a:schemeClr val="tx1"/>
-            </a:fontRef>
-          </p:style>
-        </p:cxnSp>
-        <p:sp>
-          <p:nvSpPr>
-            <p:cNvPr id="61" name="TextBox 60">
-              <a:extLst>
-                <a:ext uri="{FF2B5EF4-FFF2-40B4-BE49-F238E27FC236}">
-                  <a16:creationId xmlns:a16="http://schemas.microsoft.com/office/drawing/2014/main" id="{0B7CA563-B6C8-437A-8357-72A7EBB71DAA}"/>
-                </a:ext>
-              </a:extLst>
-            </p:cNvPr>
-            <p:cNvSpPr txBox="1">
-              <a:spLocks/>
-            </p:cNvSpPr>
-            <p:nvPr/>
-          </p:nvSpPr>
-          <p:spPr>
-            <a:xfrm>
-              <a:off x="2666761" y="915654"/>
-              <a:ext cx="648566" cy="171056"/>
-            </a:xfrm>
-            <a:prstGeom prst="rect">
-              <a:avLst/>
-            </a:prstGeom>
-            <a:noFill/>
-          </p:spPr>
-          <p:txBody>
-            <a:bodyPr wrap="square" lIns="0" tIns="0" rIns="0" bIns="0" rtlCol="0">
-              <a:spAutoFit/>
-            </a:bodyPr>
-            <a:lstStyle/>
-            <a:p>
-              <a:pPr algn="r"/>
-              <a:r>
-                <a:rPr lang="en-US" sz="1200" dirty="0" err="1">
-                  <a:solidFill>
-                    <a:srgbClr val="0070C0"/>
-                  </a:solidFill>
-                </a:rPr>
-                <a:t>selectedCardProperty</a:t>
-              </a:r>
-              <a:r>
-                <a:rPr lang="en-US" sz="1200" dirty="0">
-                  <a:solidFill>
-                    <a:srgbClr val="0070C0"/>
-                  </a:solidFill>
-                </a:rPr>
-                <a:t>()</a:t>
-              </a:r>
-            </a:p>
-          </p:txBody>
-        </p:sp>
-        <p:sp>
-          <p:nvSpPr>
-            <p:cNvPr id="62" name="Rectangle 62">
-              <a:extLst>
-                <a:ext uri="{FF2B5EF4-FFF2-40B4-BE49-F238E27FC236}">
-                  <a16:creationId xmlns:a16="http://schemas.microsoft.com/office/drawing/2014/main" id="{897FC5F1-B0A3-4562-87A9-73DD891B18C5}"/>
-                </a:ext>
-              </a:extLst>
-            </p:cNvPr>
-            <p:cNvSpPr/>
-            <p:nvPr/>
-          </p:nvSpPr>
-          <p:spPr>
-            <a:xfrm>
-              <a:off x="2693164" y="1283042"/>
-              <a:ext cx="534710" cy="212937"/>
-            </a:xfrm>
-            <a:prstGeom prst="rect">
-              <a:avLst/>
-            </a:prstGeom>
-            <a:solidFill>
-              <a:srgbClr val="00B050"/>
-            </a:solidFill>
-            <a:ln w="19050">
-              <a:solidFill>
-                <a:srgbClr val="00B050"/>
-              </a:solidFill>
-            </a:ln>
-            <a:effectLst/>
-          </p:spPr>
-          <p:style>
-            <a:lnRef idx="1">
-              <a:schemeClr val="accent2"/>
-            </a:lnRef>
-            <a:fillRef idx="2">
-              <a:schemeClr val="accent2"/>
-            </a:fillRef>
-            <a:effectRef idx="1">
-              <a:schemeClr val="accent2"/>
-            </a:effectRef>
-            <a:fontRef idx="minor">
-              <a:schemeClr val="dk1"/>
-            </a:fontRef>
-          </p:style>
-          <p:txBody>
-            <a:bodyPr rtlCol="0" anchor="ctr"/>
-            <a:lstStyle/>
-            <a:p>
-              <a:pPr algn="ctr"/>
-              <a:r>
-                <a:rPr lang="en-US" sz="1200" dirty="0" err="1">
-                  <a:solidFill>
-                    <a:schemeClr val="bg1"/>
-                  </a:solidFill>
-                </a:rPr>
-                <a:t>ts:TestSession</a:t>
-              </a:r>
-              <a:endParaRPr lang="en-SG" sz="1200" dirty="0">
-                <a:solidFill>
-                  <a:schemeClr val="bg1"/>
-                </a:solidFill>
-              </a:endParaRPr>
-            </a:p>
-          </p:txBody>
-        </p:sp>
-        <p:sp>
-          <p:nvSpPr>
-            <p:cNvPr id="64" name="Rectangle 62">
-              <a:extLst>
-                <a:ext uri="{FF2B5EF4-FFF2-40B4-BE49-F238E27FC236}">
-                  <a16:creationId xmlns:a16="http://schemas.microsoft.com/office/drawing/2014/main" id="{56249334-9585-475B-8C50-FA444A182646}"/>
-                </a:ext>
-              </a:extLst>
-            </p:cNvPr>
-            <p:cNvSpPr/>
-            <p:nvPr/>
-          </p:nvSpPr>
-          <p:spPr>
-            <a:xfrm>
-              <a:off x="3249178" y="1698882"/>
-              <a:ext cx="534710" cy="212937"/>
-            </a:xfrm>
-            <a:prstGeom prst="rect">
-              <a:avLst/>
-            </a:prstGeom>
-            <a:solidFill>
-              <a:srgbClr val="00B050"/>
-            </a:solidFill>
-            <a:ln w="19050">
-              <a:solidFill>
-                <a:srgbClr val="00B050"/>
-              </a:solidFill>
-            </a:ln>
-            <a:effectLst/>
-          </p:spPr>
-          <p:style>
-            <a:lnRef idx="1">
-              <a:schemeClr val="accent2"/>
-            </a:lnRef>
-            <a:fillRef idx="2">
-              <a:schemeClr val="accent2"/>
-            </a:fillRef>
-            <a:effectRef idx="1">
-              <a:schemeClr val="accent2"/>
-            </a:effectRef>
-            <a:fontRef idx="minor">
-              <a:schemeClr val="dk1"/>
-            </a:fontRef>
-          </p:style>
-          <p:txBody>
-            <a:bodyPr rtlCol="0" anchor="ctr"/>
-            <a:lstStyle/>
-            <a:p>
-              <a:pPr algn="ctr"/>
-              <a:r>
-                <a:rPr lang="en-US" sz="1200" dirty="0" err="1">
-                  <a:solidFill>
-                    <a:schemeClr val="bg1"/>
-                  </a:solidFill>
-                </a:rPr>
-                <a:t>ms:CardMain</a:t>
-              </a:r>
-              <a:r>
-                <a:rPr lang="en-US" sz="1200" dirty="0">
-                  <a:solidFill>
-                    <a:schemeClr val="bg1"/>
-                  </a:solidFill>
-                </a:rPr>
-                <a:t> Screen</a:t>
-              </a:r>
-              <a:endParaRPr lang="en-SG" sz="1200" dirty="0">
-                <a:solidFill>
-                  <a:schemeClr val="bg1"/>
-                </a:solidFill>
-              </a:endParaRPr>
-            </a:p>
-          </p:txBody>
-        </p:sp>
-        <p:cxnSp>
-          <p:nvCxnSpPr>
-            <p:cNvPr id="68" name="Straight Arrow Connector 67">
-              <a:extLst>
-                <a:ext uri="{FF2B5EF4-FFF2-40B4-BE49-F238E27FC236}">
-                  <a16:creationId xmlns:a16="http://schemas.microsoft.com/office/drawing/2014/main" id="{9218ACE9-44E0-4A8E-A0D7-7DB05E823C35}"/>
-                </a:ext>
-              </a:extLst>
-            </p:cNvPr>
-            <p:cNvCxnSpPr>
-              <a:cxnSpLocks/>
-              <a:endCxn id="62" idx="1"/>
-            </p:cNvCxnSpPr>
-            <p:nvPr/>
-          </p:nvCxnSpPr>
-          <p:spPr>
-            <a:xfrm>
-              <a:off x="1777350" y="1388726"/>
-              <a:ext cx="915814" cy="784"/>
-            </a:xfrm>
-            <a:prstGeom prst="straightConnector1">
-              <a:avLst/>
-            </a:prstGeom>
-            <a:ln w="19050">
-              <a:solidFill>
-                <a:srgbClr val="00B050"/>
-              </a:solidFill>
-              <a:tailEnd type="arrow"/>
-            </a:ln>
-          </p:spPr>
-          <p:style>
-            <a:lnRef idx="1">
-              <a:schemeClr val="accent1"/>
-            </a:lnRef>
-            <a:fillRef idx="0">
-              <a:schemeClr val="accent1"/>
-            </a:fillRef>
-            <a:effectRef idx="0">
-              <a:schemeClr val="accent1"/>
-            </a:effectRef>
-            <a:fontRef idx="minor">
-              <a:schemeClr val="tx1"/>
-            </a:fontRef>
-          </p:style>
-        </p:cxnSp>
-        <p:cxnSp>
-          <p:nvCxnSpPr>
-            <p:cNvPr id="70" name="Straight Connector 69">
-              <a:extLst>
-                <a:ext uri="{FF2B5EF4-FFF2-40B4-BE49-F238E27FC236}">
-                  <a16:creationId xmlns:a16="http://schemas.microsoft.com/office/drawing/2014/main" id="{9679ADDF-AB30-4906-8AAC-23A495AB2098}"/>
-                </a:ext>
-              </a:extLst>
-            </p:cNvPr>
-            <p:cNvCxnSpPr>
-              <a:cxnSpLocks/>
-            </p:cNvCxnSpPr>
-            <p:nvPr/>
-          </p:nvCxnSpPr>
-          <p:spPr>
-            <a:xfrm>
-              <a:off x="2959724" y="1503770"/>
-              <a:ext cx="0" cy="990780"/>
-            </a:xfrm>
-            <a:prstGeom prst="line">
-              <a:avLst/>
-            </a:prstGeom>
-            <a:ln w="19050">
-              <a:solidFill>
-                <a:srgbClr val="00B050">
-                  <a:alpha val="25000"/>
-                </a:srgbClr>
-              </a:solidFill>
-              <a:prstDash val="sysDash"/>
-            </a:ln>
-            <a:effectLst/>
-          </p:spPr>
-          <p:style>
-            <a:lnRef idx="1">
-              <a:schemeClr val="accent1"/>
-            </a:lnRef>
-            <a:fillRef idx="2">
-              <a:schemeClr val="accent1"/>
-            </a:fillRef>
-            <a:effectRef idx="1">
-              <a:schemeClr val="accent1"/>
-            </a:effectRef>
-            <a:fontRef idx="minor">
-              <a:schemeClr val="dk1"/>
-            </a:fontRef>
-          </p:style>
-        </p:cxnSp>
-        <p:sp>
-          <p:nvSpPr>
-            <p:cNvPr id="71" name="Rectangle 70">
-              <a:extLst>
-                <a:ext uri="{FF2B5EF4-FFF2-40B4-BE49-F238E27FC236}">
-                  <a16:creationId xmlns:a16="http://schemas.microsoft.com/office/drawing/2014/main" id="{040E19BD-EEDA-49F4-87AA-759463B6ED2B}"/>
-                </a:ext>
-              </a:extLst>
-            </p:cNvPr>
-            <p:cNvSpPr>
-              <a:spLocks/>
-            </p:cNvSpPr>
-            <p:nvPr/>
-          </p:nvSpPr>
-          <p:spPr>
-            <a:xfrm>
-              <a:off x="2935874" y="1489647"/>
-              <a:ext cx="55873" cy="83718"/>
-            </a:xfrm>
-            <a:prstGeom prst="rect">
-              <a:avLst/>
-            </a:prstGeom>
-            <a:solidFill>
-              <a:srgbClr val="00B050"/>
-            </a:solidFill>
-            <a:ln>
-              <a:solidFill>
-                <a:srgbClr val="00B050"/>
-              </a:solidFill>
-            </a:ln>
-            <a:effectLst/>
-          </p:spPr>
-          <p:style>
-            <a:lnRef idx="1">
-              <a:schemeClr val="accent3"/>
-            </a:lnRef>
-            <a:fillRef idx="2">
-              <a:schemeClr val="accent3"/>
-            </a:fillRef>
-            <a:effectRef idx="1">
-              <a:schemeClr val="accent3"/>
-            </a:effectRef>
-            <a:fontRef idx="minor">
-              <a:schemeClr val="dk1"/>
-            </a:fontRef>
-          </p:style>
-          <p:txBody>
-            <a:bodyPr rtlCol="0" anchor="ctr"/>
-            <a:lstStyle/>
-            <a:p>
-              <a:pPr algn="ctr"/>
-              <a:endParaRPr lang="en-SG" sz="1200">
-                <a:solidFill>
-                  <a:srgbClr val="0070C0"/>
-                </a:solidFill>
-              </a:endParaRPr>
-            </a:p>
-          </p:txBody>
-        </p:sp>
-        <p:cxnSp>
-          <p:nvCxnSpPr>
-            <p:cNvPr id="72" name="Straight Arrow Connector 71">
-              <a:extLst>
-                <a:ext uri="{FF2B5EF4-FFF2-40B4-BE49-F238E27FC236}">
-                  <a16:creationId xmlns:a16="http://schemas.microsoft.com/office/drawing/2014/main" id="{1F3514E1-C1B4-48F4-A46F-C5326B117503}"/>
-                </a:ext>
-              </a:extLst>
-            </p:cNvPr>
-            <p:cNvCxnSpPr>
-              <a:cxnSpLocks/>
-            </p:cNvCxnSpPr>
-            <p:nvPr/>
-          </p:nvCxnSpPr>
-          <p:spPr>
-            <a:xfrm>
-              <a:off x="1768580" y="862264"/>
-              <a:ext cx="3268370" cy="0"/>
-            </a:xfrm>
-            <a:prstGeom prst="straightConnector1">
-              <a:avLst/>
-            </a:prstGeom>
-            <a:ln w="19050">
-              <a:solidFill>
-                <a:srgbClr val="0070C0"/>
-              </a:solidFill>
-              <a:prstDash val="sysDash"/>
-              <a:headEnd type="arrow" w="med" len="med"/>
-              <a:tailEnd type="none" w="med" len="med"/>
-            </a:ln>
-          </p:spPr>
-          <p:style>
-            <a:lnRef idx="1">
-              <a:schemeClr val="accent1"/>
-            </a:lnRef>
-            <a:fillRef idx="0">
-              <a:schemeClr val="accent1"/>
-            </a:fillRef>
-            <a:effectRef idx="0">
-              <a:schemeClr val="accent1"/>
-            </a:effectRef>
-            <a:fontRef idx="minor">
-              <a:schemeClr val="tx1"/>
-            </a:fontRef>
-          </p:style>
-        </p:cxnSp>
-        <p:sp>
-          <p:nvSpPr>
-            <p:cNvPr id="73" name="TextBox 72">
-              <a:extLst>
-                <a:ext uri="{FF2B5EF4-FFF2-40B4-BE49-F238E27FC236}">
-                  <a16:creationId xmlns:a16="http://schemas.microsoft.com/office/drawing/2014/main" id="{4B50F793-932E-40F7-9818-95FBB1A8ECD0}"/>
-                </a:ext>
-              </a:extLst>
-            </p:cNvPr>
-            <p:cNvSpPr txBox="1">
-              <a:spLocks/>
-            </p:cNvSpPr>
-            <p:nvPr/>
-          </p:nvSpPr>
-          <p:spPr>
-            <a:xfrm>
-              <a:off x="2707563" y="764833"/>
-              <a:ext cx="504321" cy="85528"/>
-            </a:xfrm>
-            <a:prstGeom prst="rect">
-              <a:avLst/>
-            </a:prstGeom>
-            <a:noFill/>
-          </p:spPr>
-          <p:txBody>
-            <a:bodyPr wrap="square" lIns="0" tIns="0" rIns="0" bIns="0" rtlCol="0">
-              <a:spAutoFit/>
-            </a:bodyPr>
-            <a:lstStyle>
-              <a:defPPr>
-                <a:defRPr lang="en-US"/>
-              </a:defPPr>
-              <a:lvl1pPr algn="r">
-                <a:defRPr sz="1400">
-                  <a:solidFill>
-                    <a:srgbClr val="0070C0"/>
-                  </a:solidFill>
-                </a:defRPr>
-              </a:lvl1pPr>
-            </a:lstStyle>
-            <a:p>
-              <a:pPr algn="ctr"/>
-              <a:r>
-                <a:rPr lang="en-US" sz="1200" dirty="0" err="1">
-                  <a:solidFill>
-                    <a:srgbClr val="00B050"/>
-                  </a:solidFill>
-                </a:rPr>
-                <a:t>filteredCards</a:t>
-              </a:r>
-              <a:endParaRPr lang="en-US" sz="1200" dirty="0">
-                <a:solidFill>
-                  <a:srgbClr val="00B050"/>
-                </a:solidFill>
-              </a:endParaRPr>
-            </a:p>
-          </p:txBody>
-        </p:sp>
-        <p:cxnSp>
-          <p:nvCxnSpPr>
-            <p:cNvPr id="74" name="Straight Arrow Connector 73">
-              <a:extLst>
-                <a:ext uri="{FF2B5EF4-FFF2-40B4-BE49-F238E27FC236}">
-                  <a16:creationId xmlns:a16="http://schemas.microsoft.com/office/drawing/2014/main" id="{52C723E0-8DC2-45EC-8B7D-1DD80406398E}"/>
-                </a:ext>
-              </a:extLst>
-            </p:cNvPr>
-            <p:cNvCxnSpPr>
-              <a:cxnSpLocks/>
-            </p:cNvCxnSpPr>
-            <p:nvPr/>
-          </p:nvCxnSpPr>
-          <p:spPr>
-            <a:xfrm>
-              <a:off x="1778899" y="1137874"/>
-              <a:ext cx="3258050" cy="0"/>
-            </a:xfrm>
-            <a:prstGeom prst="straightConnector1">
-              <a:avLst/>
-            </a:prstGeom>
-            <a:ln w="19050">
-              <a:solidFill>
-                <a:srgbClr val="0070C0"/>
-              </a:solidFill>
-              <a:prstDash val="sysDash"/>
-              <a:headEnd type="arrow" w="med" len="med"/>
-              <a:tailEnd type="none" w="med" len="med"/>
-            </a:ln>
-          </p:spPr>
-          <p:style>
-            <a:lnRef idx="1">
-              <a:schemeClr val="accent1"/>
-            </a:lnRef>
-            <a:fillRef idx="0">
-              <a:schemeClr val="accent1"/>
-            </a:fillRef>
-            <a:effectRef idx="0">
-              <a:schemeClr val="accent1"/>
-            </a:effectRef>
-            <a:fontRef idx="minor">
-              <a:schemeClr val="tx1"/>
-            </a:fontRef>
-          </p:style>
-        </p:cxnSp>
-        <p:sp>
-          <p:nvSpPr>
-            <p:cNvPr id="75" name="TextBox 74">
-              <a:extLst>
-                <a:ext uri="{FF2B5EF4-FFF2-40B4-BE49-F238E27FC236}">
-                  <a16:creationId xmlns:a16="http://schemas.microsoft.com/office/drawing/2014/main" id="{4AE67DB1-7FA2-4797-93D3-37F0FC7C52EE}"/>
-                </a:ext>
-              </a:extLst>
-            </p:cNvPr>
-            <p:cNvSpPr txBox="1">
-              <a:spLocks/>
-            </p:cNvSpPr>
-            <p:nvPr/>
-          </p:nvSpPr>
-          <p:spPr>
-            <a:xfrm>
-              <a:off x="2717882" y="1040443"/>
-              <a:ext cx="504321" cy="171056"/>
-            </a:xfrm>
-            <a:prstGeom prst="rect">
-              <a:avLst/>
-            </a:prstGeom>
-            <a:noFill/>
-          </p:spPr>
-          <p:txBody>
-            <a:bodyPr wrap="square" lIns="0" tIns="0" rIns="0" bIns="0" rtlCol="0">
-              <a:spAutoFit/>
-            </a:bodyPr>
-            <a:lstStyle>
-              <a:defPPr>
-                <a:defRPr lang="en-US"/>
-              </a:defPPr>
-              <a:lvl1pPr algn="r">
-                <a:defRPr sz="1400">
-                  <a:solidFill>
-                    <a:srgbClr val="0070C0"/>
-                  </a:solidFill>
-                </a:defRPr>
-              </a:lvl1pPr>
-            </a:lstStyle>
-            <a:p>
-              <a:pPr algn="ctr"/>
-              <a:r>
-                <a:rPr lang="en-US" sz="1200" dirty="0" err="1">
-                  <a:solidFill>
-                    <a:srgbClr val="00B050"/>
-                  </a:solidFill>
-                </a:rPr>
-                <a:t>selectedProperty</a:t>
-              </a:r>
-              <a:endParaRPr lang="en-US" sz="1200" dirty="0"/>
-            </a:p>
-          </p:txBody>
-        </p:sp>
-        <p:sp>
-          <p:nvSpPr>
-            <p:cNvPr id="76" name="TextBox 75">
-              <a:extLst>
-                <a:ext uri="{FF2B5EF4-FFF2-40B4-BE49-F238E27FC236}">
-                  <a16:creationId xmlns:a16="http://schemas.microsoft.com/office/drawing/2014/main" id="{2B0C71D8-9AE9-436A-9D6A-4E8CE4CA9EDC}"/>
-                </a:ext>
-              </a:extLst>
-            </p:cNvPr>
-            <p:cNvSpPr txBox="1">
-              <a:spLocks/>
-            </p:cNvSpPr>
-            <p:nvPr/>
-          </p:nvSpPr>
-          <p:spPr>
-            <a:xfrm>
-              <a:off x="1609274" y="1205655"/>
-              <a:ext cx="1251966" cy="171056"/>
-            </a:xfrm>
-            <a:prstGeom prst="rect">
-              <a:avLst/>
-            </a:prstGeom>
-            <a:noFill/>
-          </p:spPr>
-          <p:txBody>
-            <a:bodyPr wrap="square" lIns="0" tIns="0" rIns="0" bIns="0" rtlCol="0">
-              <a:spAutoFit/>
-            </a:bodyPr>
-            <a:lstStyle>
-              <a:defPPr>
-                <a:defRPr lang="en-US"/>
-              </a:defPPr>
-              <a:lvl1pPr algn="r">
-                <a:defRPr sz="1400">
-                  <a:solidFill>
-                    <a:srgbClr val="0070C0"/>
-                  </a:solidFill>
-                </a:defRPr>
-              </a:lvl1pPr>
-            </a:lstStyle>
-            <a:p>
-              <a:pPr algn="ctr"/>
-              <a:r>
-                <a:rPr lang="en-US" sz="1200" dirty="0" err="1">
-                  <a:solidFill>
-                    <a:srgbClr val="00B050"/>
-                  </a:solidFill>
-                </a:rPr>
-                <a:t>CardListPanel</a:t>
-              </a:r>
-              <a:endParaRPr lang="en-US" sz="1200" dirty="0">
-                <a:solidFill>
-                  <a:srgbClr val="00B050"/>
-                </a:solidFill>
-              </a:endParaRPr>
-            </a:p>
-            <a:p>
-              <a:pPr algn="ctr"/>
-              <a:r>
-                <a:rPr lang="en-US" sz="1200" dirty="0">
-                  <a:solidFill>
-                    <a:srgbClr val="00B050"/>
-                  </a:solidFill>
-                </a:rPr>
-                <a:t>(</a:t>
-              </a:r>
-              <a:r>
-                <a:rPr lang="en-US" sz="1200" dirty="0" err="1">
-                  <a:solidFill>
-                    <a:srgbClr val="00B050"/>
-                  </a:solidFill>
-                </a:rPr>
-                <a:t>filteredCards</a:t>
-              </a:r>
-              <a:r>
-                <a:rPr lang="en-US" sz="1200" dirty="0">
-                  <a:solidFill>
-                    <a:srgbClr val="00B050"/>
-                  </a:solidFill>
-                </a:rPr>
-                <a:t>, </a:t>
-              </a:r>
-              <a:r>
-                <a:rPr lang="en-US" sz="1200" dirty="0" err="1">
-                  <a:solidFill>
-                    <a:srgbClr val="00B050"/>
-                  </a:solidFill>
-                </a:rPr>
-                <a:t>selectedProperty</a:t>
-              </a:r>
-              <a:r>
-                <a:rPr lang="en-US" sz="1200" dirty="0">
-                  <a:solidFill>
-                    <a:srgbClr val="00B050"/>
-                  </a:solidFill>
-                </a:rPr>
-                <a:t>)</a:t>
-              </a:r>
-              <a:endParaRPr lang="en-US" sz="1200" dirty="0"/>
-            </a:p>
-          </p:txBody>
-        </p:sp>
-        <p:cxnSp>
-          <p:nvCxnSpPr>
-            <p:cNvPr id="84" name="Straight Arrow Connector 83">
-              <a:extLst>
-                <a:ext uri="{FF2B5EF4-FFF2-40B4-BE49-F238E27FC236}">
-                  <a16:creationId xmlns:a16="http://schemas.microsoft.com/office/drawing/2014/main" id="{B42F784F-F843-4C67-98C7-5FF20C7E4579}"/>
-                </a:ext>
-              </a:extLst>
-            </p:cNvPr>
-            <p:cNvCxnSpPr>
-              <a:cxnSpLocks/>
-            </p:cNvCxnSpPr>
-            <p:nvPr/>
-          </p:nvCxnSpPr>
-          <p:spPr>
-            <a:xfrm>
-              <a:off x="1773765" y="1573365"/>
-              <a:ext cx="1161232" cy="0"/>
-            </a:xfrm>
-            <a:prstGeom prst="straightConnector1">
-              <a:avLst/>
-            </a:prstGeom>
-            <a:ln w="19050">
-              <a:solidFill>
-                <a:srgbClr val="00B050"/>
-              </a:solidFill>
-              <a:prstDash val="sysDash"/>
-              <a:headEnd type="arrow" w="med" len="med"/>
-              <a:tailEnd type="none" w="med" len="med"/>
-            </a:ln>
-          </p:spPr>
-          <p:style>
-            <a:lnRef idx="1">
-              <a:schemeClr val="accent1"/>
-            </a:lnRef>
-            <a:fillRef idx="0">
-              <a:schemeClr val="accent1"/>
-            </a:fillRef>
-            <a:effectRef idx="0">
-              <a:schemeClr val="accent1"/>
-            </a:effectRef>
-            <a:fontRef idx="minor">
-              <a:schemeClr val="tx1"/>
-            </a:fontRef>
-          </p:style>
-        </p:cxnSp>
-        <p:sp>
-          <p:nvSpPr>
-            <p:cNvPr id="85" name="TextBox 84">
-              <a:extLst>
-                <a:ext uri="{FF2B5EF4-FFF2-40B4-BE49-F238E27FC236}">
-                  <a16:creationId xmlns:a16="http://schemas.microsoft.com/office/drawing/2014/main" id="{B7BBD60F-11A8-40A0-B451-1FEA3002EE23}"/>
-                </a:ext>
-              </a:extLst>
-            </p:cNvPr>
-            <p:cNvSpPr txBox="1">
-              <a:spLocks/>
-            </p:cNvSpPr>
-            <p:nvPr/>
-          </p:nvSpPr>
-          <p:spPr>
-            <a:xfrm>
-              <a:off x="2034665" y="1466897"/>
-              <a:ext cx="504321" cy="85528"/>
-            </a:xfrm>
-            <a:prstGeom prst="rect">
-              <a:avLst/>
-            </a:prstGeom>
-            <a:noFill/>
-          </p:spPr>
-          <p:txBody>
-            <a:bodyPr wrap="square" lIns="0" tIns="0" rIns="0" bIns="0" rtlCol="0">
-              <a:spAutoFit/>
-            </a:bodyPr>
-            <a:lstStyle>
-              <a:defPPr>
-                <a:defRPr lang="en-US"/>
-              </a:defPPr>
-              <a:lvl1pPr algn="r">
-                <a:defRPr sz="1400">
-                  <a:solidFill>
-                    <a:srgbClr val="0070C0"/>
-                  </a:solidFill>
-                </a:defRPr>
-              </a:lvl1pPr>
-            </a:lstStyle>
-            <a:p>
-              <a:pPr algn="ctr"/>
-              <a:r>
-                <a:rPr lang="en-US" sz="1200" dirty="0" err="1">
-                  <a:solidFill>
-                    <a:srgbClr val="00B050"/>
-                  </a:solidFill>
-                </a:rPr>
-                <a:t>lp</a:t>
-              </a:r>
-              <a:endParaRPr lang="en-US" sz="1200" dirty="0"/>
-            </a:p>
-          </p:txBody>
-        </p:sp>
-        <p:cxnSp>
-          <p:nvCxnSpPr>
-            <p:cNvPr id="86" name="Straight Arrow Connector 85">
-              <a:extLst>
-                <a:ext uri="{FF2B5EF4-FFF2-40B4-BE49-F238E27FC236}">
-                  <a16:creationId xmlns:a16="http://schemas.microsoft.com/office/drawing/2014/main" id="{BC9771FB-D297-4A84-AF17-BC0862E241CD}"/>
-                </a:ext>
-              </a:extLst>
-            </p:cNvPr>
-            <p:cNvCxnSpPr>
-              <a:cxnSpLocks/>
-            </p:cNvCxnSpPr>
-            <p:nvPr/>
-          </p:nvCxnSpPr>
-          <p:spPr>
-            <a:xfrm>
-              <a:off x="1768580" y="1805350"/>
-              <a:ext cx="1480598" cy="0"/>
-            </a:xfrm>
-            <a:prstGeom prst="straightConnector1">
-              <a:avLst/>
-            </a:prstGeom>
-            <a:ln w="19050">
-              <a:solidFill>
-                <a:srgbClr val="00B050"/>
-              </a:solidFill>
-              <a:tailEnd type="arrow"/>
-            </a:ln>
-          </p:spPr>
-          <p:style>
-            <a:lnRef idx="1">
-              <a:schemeClr val="accent1"/>
-            </a:lnRef>
-            <a:fillRef idx="0">
-              <a:schemeClr val="accent1"/>
-            </a:fillRef>
-            <a:effectRef idx="0">
-              <a:schemeClr val="accent1"/>
-            </a:effectRef>
-            <a:fontRef idx="minor">
-              <a:schemeClr val="tx1"/>
-            </a:fontRef>
-          </p:style>
-        </p:cxnSp>
-        <p:sp>
-          <p:nvSpPr>
-            <p:cNvPr id="87" name="TextBox 86">
-              <a:extLst>
-                <a:ext uri="{FF2B5EF4-FFF2-40B4-BE49-F238E27FC236}">
-                  <a16:creationId xmlns:a16="http://schemas.microsoft.com/office/drawing/2014/main" id="{60280BC2-B9E7-4A04-90D4-25BC4F182F6B}"/>
-                </a:ext>
-              </a:extLst>
-            </p:cNvPr>
-            <p:cNvSpPr txBox="1">
-              <a:spLocks/>
-            </p:cNvSpPr>
-            <p:nvPr/>
-          </p:nvSpPr>
-          <p:spPr>
-            <a:xfrm>
-              <a:off x="1902285" y="1693025"/>
-              <a:ext cx="1251966" cy="171056"/>
-            </a:xfrm>
-            <a:prstGeom prst="rect">
-              <a:avLst/>
-            </a:prstGeom>
-            <a:noFill/>
-          </p:spPr>
-          <p:txBody>
-            <a:bodyPr wrap="square" lIns="0" tIns="0" rIns="0" bIns="0" rtlCol="0">
-              <a:spAutoFit/>
-            </a:bodyPr>
-            <a:lstStyle>
-              <a:defPPr>
-                <a:defRPr lang="en-US"/>
-              </a:defPPr>
-              <a:lvl1pPr algn="r">
-                <a:defRPr sz="1400">
-                  <a:solidFill>
-                    <a:srgbClr val="0070C0"/>
-                  </a:solidFill>
-                </a:defRPr>
-              </a:lvl1pPr>
-            </a:lstStyle>
-            <a:p>
-              <a:pPr algn="ctr"/>
-              <a:r>
-                <a:rPr lang="en-US" sz="1200" dirty="0" err="1">
-                  <a:solidFill>
-                    <a:srgbClr val="00B050"/>
-                  </a:solidFill>
-                </a:rPr>
-                <a:t>CardMainScreen</a:t>
-              </a:r>
-              <a:r>
-                <a:rPr lang="en-US" sz="1200" dirty="0">
-                  <a:solidFill>
-                    <a:srgbClr val="00B050"/>
-                  </a:solidFill>
-                </a:rPr>
-                <a:t>(</a:t>
-              </a:r>
-              <a:r>
-                <a:rPr lang="en-US" sz="1200" dirty="0" err="1">
-                  <a:solidFill>
-                    <a:srgbClr val="00B050"/>
-                  </a:solidFill>
-                </a:rPr>
-                <a:t>lp</a:t>
-              </a:r>
-              <a:r>
-                <a:rPr lang="en-US" sz="1200" dirty="0">
-                  <a:solidFill>
-                    <a:srgbClr val="00B050"/>
-                  </a:solidFill>
-                </a:rPr>
-                <a:t>, </a:t>
-              </a:r>
-              <a:r>
-                <a:rPr lang="en-US" sz="1200" dirty="0" err="1">
-                  <a:solidFill>
-                    <a:srgbClr val="00B050"/>
-                  </a:solidFill>
-                </a:rPr>
-                <a:t>browserPanel</a:t>
-              </a:r>
-              <a:r>
-                <a:rPr lang="en-US" sz="1200" dirty="0">
-                  <a:solidFill>
-                    <a:srgbClr val="00B050"/>
-                  </a:solidFill>
-                </a:rPr>
-                <a:t>)</a:t>
-              </a:r>
-              <a:endParaRPr lang="en-US" sz="1200" dirty="0"/>
-            </a:p>
-          </p:txBody>
-        </p:sp>
-        <p:sp>
-          <p:nvSpPr>
-            <p:cNvPr id="89" name="Rectangle 88">
-              <a:extLst>
-                <a:ext uri="{FF2B5EF4-FFF2-40B4-BE49-F238E27FC236}">
-                  <a16:creationId xmlns:a16="http://schemas.microsoft.com/office/drawing/2014/main" id="{D21BB4B4-5F55-4FB5-A418-1AA3F0ADE9BD}"/>
-                </a:ext>
-              </a:extLst>
-            </p:cNvPr>
-            <p:cNvSpPr>
-              <a:spLocks/>
-            </p:cNvSpPr>
-            <p:nvPr/>
-          </p:nvSpPr>
-          <p:spPr>
-            <a:xfrm>
-              <a:off x="3488125" y="1915020"/>
-              <a:ext cx="55873" cy="83718"/>
-            </a:xfrm>
-            <a:prstGeom prst="rect">
-              <a:avLst/>
-            </a:prstGeom>
-            <a:solidFill>
-              <a:srgbClr val="00B050"/>
-            </a:solidFill>
-            <a:ln>
-              <a:solidFill>
-                <a:srgbClr val="00B050"/>
-              </a:solidFill>
-            </a:ln>
-            <a:effectLst/>
-          </p:spPr>
-          <p:style>
-            <a:lnRef idx="1">
-              <a:schemeClr val="accent3"/>
-            </a:lnRef>
-            <a:fillRef idx="2">
-              <a:schemeClr val="accent3"/>
-            </a:fillRef>
-            <a:effectRef idx="1">
-              <a:schemeClr val="accent3"/>
-            </a:effectRef>
-            <a:fontRef idx="minor">
-              <a:schemeClr val="dk1"/>
-            </a:fontRef>
-          </p:style>
-          <p:txBody>
-            <a:bodyPr rtlCol="0" anchor="ctr"/>
-            <a:lstStyle/>
-            <a:p>
-              <a:pPr algn="ctr"/>
-              <a:endParaRPr lang="en-SG" sz="1200">
-                <a:solidFill>
-                  <a:srgbClr val="0070C0"/>
-                </a:solidFill>
-              </a:endParaRPr>
-            </a:p>
-          </p:txBody>
-        </p:sp>
-        <p:cxnSp>
-          <p:nvCxnSpPr>
-            <p:cNvPr id="90" name="Straight Arrow Connector 89">
-              <a:extLst>
-                <a:ext uri="{FF2B5EF4-FFF2-40B4-BE49-F238E27FC236}">
-                  <a16:creationId xmlns:a16="http://schemas.microsoft.com/office/drawing/2014/main" id="{88D4B32C-4458-4F53-98CB-496BBB0B4E28}"/>
-                </a:ext>
-              </a:extLst>
-            </p:cNvPr>
-            <p:cNvCxnSpPr>
-              <a:cxnSpLocks/>
-            </p:cNvCxnSpPr>
-            <p:nvPr/>
-          </p:nvCxnSpPr>
-          <p:spPr>
-            <a:xfrm flipV="1">
-              <a:off x="1773475" y="1998738"/>
-              <a:ext cx="1718668" cy="3201"/>
-            </a:xfrm>
-            <a:prstGeom prst="straightConnector1">
-              <a:avLst/>
-            </a:prstGeom>
-            <a:ln w="19050">
-              <a:solidFill>
-                <a:srgbClr val="00B050"/>
-              </a:solidFill>
-              <a:prstDash val="sysDash"/>
-              <a:headEnd type="arrow" w="med" len="med"/>
-              <a:tailEnd type="none" w="med" len="med"/>
-            </a:ln>
-          </p:spPr>
-          <p:style>
-            <a:lnRef idx="1">
-              <a:schemeClr val="accent1"/>
-            </a:lnRef>
-            <a:fillRef idx="0">
-              <a:schemeClr val="accent1"/>
-            </a:fillRef>
-            <a:effectRef idx="0">
-              <a:schemeClr val="accent1"/>
-            </a:effectRef>
-            <a:fontRef idx="minor">
-              <a:schemeClr val="tx1"/>
-            </a:fontRef>
-          </p:style>
-        </p:cxnSp>
-        <p:sp>
-          <p:nvSpPr>
-            <p:cNvPr id="91" name="TextBox 90">
-              <a:extLst>
-                <a:ext uri="{FF2B5EF4-FFF2-40B4-BE49-F238E27FC236}">
-                  <a16:creationId xmlns:a16="http://schemas.microsoft.com/office/drawing/2014/main" id="{44EAFC30-231E-4E6B-AAB8-30F0ACC69195}"/>
-                </a:ext>
-              </a:extLst>
-            </p:cNvPr>
-            <p:cNvSpPr txBox="1">
-              <a:spLocks/>
-            </p:cNvSpPr>
-            <p:nvPr/>
-          </p:nvSpPr>
-          <p:spPr>
-            <a:xfrm>
-              <a:off x="2233055" y="1884290"/>
-              <a:ext cx="504321" cy="85528"/>
-            </a:xfrm>
-            <a:prstGeom prst="rect">
-              <a:avLst/>
-            </a:prstGeom>
-            <a:noFill/>
-          </p:spPr>
-          <p:txBody>
-            <a:bodyPr wrap="square" lIns="0" tIns="0" rIns="0" bIns="0" rtlCol="0">
-              <a:spAutoFit/>
-            </a:bodyPr>
-            <a:lstStyle>
-              <a:defPPr>
-                <a:defRPr lang="en-US"/>
-              </a:defPPr>
-              <a:lvl1pPr algn="r">
-                <a:defRPr sz="1400">
-                  <a:solidFill>
-                    <a:srgbClr val="0070C0"/>
-                  </a:solidFill>
-                </a:defRPr>
-              </a:lvl1pPr>
-            </a:lstStyle>
-            <a:p>
-              <a:pPr algn="ctr"/>
-              <a:r>
-                <a:rPr lang="en-US" sz="1200" dirty="0" err="1">
-                  <a:solidFill>
-                    <a:srgbClr val="00B050"/>
-                  </a:solidFill>
-                </a:rPr>
-                <a:t>ms</a:t>
-              </a:r>
-              <a:endParaRPr lang="en-US" sz="1200" dirty="0"/>
-            </a:p>
-          </p:txBody>
-        </p:sp>
-        <p:cxnSp>
-          <p:nvCxnSpPr>
-            <p:cNvPr id="99" name="Straight Connector 98">
-              <a:extLst>
-                <a:ext uri="{FF2B5EF4-FFF2-40B4-BE49-F238E27FC236}">
-                  <a16:creationId xmlns:a16="http://schemas.microsoft.com/office/drawing/2014/main" id="{1A54F032-F176-4025-A499-5B9EBA83BF26}"/>
-                </a:ext>
-              </a:extLst>
-            </p:cNvPr>
-            <p:cNvCxnSpPr>
-              <a:cxnSpLocks/>
-            </p:cNvCxnSpPr>
-            <p:nvPr/>
-          </p:nvCxnSpPr>
-          <p:spPr>
-            <a:xfrm>
-              <a:off x="3521696" y="2006791"/>
-              <a:ext cx="0" cy="487760"/>
-            </a:xfrm>
-            <a:prstGeom prst="line">
-              <a:avLst/>
-            </a:prstGeom>
-            <a:ln w="19050">
-              <a:solidFill>
-                <a:srgbClr val="00B050">
-                  <a:alpha val="25000"/>
-                </a:srgbClr>
-              </a:solidFill>
-              <a:prstDash val="sysDash"/>
-            </a:ln>
-            <a:effectLst/>
-          </p:spPr>
-          <p:style>
-            <a:lnRef idx="1">
-              <a:schemeClr val="accent1"/>
-            </a:lnRef>
-            <a:fillRef idx="2">
-              <a:schemeClr val="accent1"/>
-            </a:fillRef>
-            <a:effectRef idx="1">
-              <a:schemeClr val="accent1"/>
-            </a:effectRef>
-            <a:fontRef idx="minor">
-              <a:schemeClr val="dk1"/>
-            </a:fontRef>
-          </p:style>
-        </p:cxnSp>
-        <p:cxnSp>
-          <p:nvCxnSpPr>
-            <p:cNvPr id="100" name="Straight Arrow Connector 99">
-              <a:extLst>
-                <a:ext uri="{FF2B5EF4-FFF2-40B4-BE49-F238E27FC236}">
-                  <a16:creationId xmlns:a16="http://schemas.microsoft.com/office/drawing/2014/main" id="{502BCBEE-7A18-4B83-8FE5-22C04DD4802B}"/>
-                </a:ext>
-              </a:extLst>
-            </p:cNvPr>
-            <p:cNvCxnSpPr>
-              <a:cxnSpLocks/>
-            </p:cNvCxnSpPr>
-            <p:nvPr/>
-          </p:nvCxnSpPr>
-          <p:spPr>
-            <a:xfrm>
-              <a:off x="1080905" y="688308"/>
-              <a:ext cx="640572" cy="0"/>
-            </a:xfrm>
-            <a:prstGeom prst="straightConnector1">
-              <a:avLst/>
-            </a:prstGeom>
-            <a:ln w="19050">
-              <a:solidFill>
-                <a:srgbClr val="00B050"/>
-              </a:solidFill>
-              <a:tailEnd type="arrow"/>
-            </a:ln>
-          </p:spPr>
-          <p:style>
-            <a:lnRef idx="1">
-              <a:schemeClr val="accent1"/>
-            </a:lnRef>
-            <a:fillRef idx="0">
-              <a:schemeClr val="accent1"/>
-            </a:fillRef>
-            <a:effectRef idx="0">
-              <a:schemeClr val="accent1"/>
-            </a:effectRef>
-            <a:fontRef idx="minor">
-              <a:schemeClr val="tx1"/>
-            </a:fontRef>
-          </p:style>
-        </p:cxnSp>
-        <p:sp>
-          <p:nvSpPr>
-            <p:cNvPr id="101" name="TextBox 100">
-              <a:extLst>
-                <a:ext uri="{FF2B5EF4-FFF2-40B4-BE49-F238E27FC236}">
-                  <a16:creationId xmlns:a16="http://schemas.microsoft.com/office/drawing/2014/main" id="{91772803-49B2-44B8-8E9A-0D1140F7A646}"/>
-                </a:ext>
-              </a:extLst>
-            </p:cNvPr>
-            <p:cNvSpPr txBox="1">
-              <a:spLocks/>
-            </p:cNvSpPr>
-            <p:nvPr/>
-          </p:nvSpPr>
-          <p:spPr>
-            <a:xfrm>
-              <a:off x="1039404" y="595809"/>
-              <a:ext cx="696291" cy="73259"/>
-            </a:xfrm>
-            <a:prstGeom prst="rect">
-              <a:avLst/>
-            </a:prstGeom>
-            <a:noFill/>
-          </p:spPr>
-          <p:txBody>
-            <a:bodyPr wrap="square" lIns="0" tIns="0" rIns="0" bIns="0" rtlCol="0">
-              <a:spAutoFit/>
-            </a:bodyPr>
-            <a:lstStyle/>
-            <a:p>
-              <a:pPr algn="r"/>
-              <a:r>
-                <a:rPr lang="en-US" sz="1200" dirty="0" err="1">
-                  <a:solidFill>
-                    <a:srgbClr val="00B050"/>
-                  </a:solidFill>
-                </a:rPr>
-                <a:t>handleStartTestSession</a:t>
-              </a:r>
-              <a:r>
-                <a:rPr lang="en-US" sz="1200" dirty="0">
-                  <a:solidFill>
-                    <a:srgbClr val="00B050"/>
-                  </a:solidFill>
-                </a:rPr>
-                <a:t>()</a:t>
-              </a:r>
-            </a:p>
-          </p:txBody>
-        </p:sp>
-        <p:sp>
-          <p:nvSpPr>
-            <p:cNvPr id="104" name="Rectangle 103">
-              <a:extLst>
-                <a:ext uri="{FF2B5EF4-FFF2-40B4-BE49-F238E27FC236}">
-                  <a16:creationId xmlns:a16="http://schemas.microsoft.com/office/drawing/2014/main" id="{92A663CA-BE0A-4CC4-8DC4-433722F64FD3}"/>
-                </a:ext>
-              </a:extLst>
-            </p:cNvPr>
-            <p:cNvSpPr>
-              <a:spLocks/>
-            </p:cNvSpPr>
-            <p:nvPr/>
-          </p:nvSpPr>
-          <p:spPr>
-            <a:xfrm>
-              <a:off x="5036950" y="1012695"/>
-              <a:ext cx="71156" cy="121600"/>
-            </a:xfrm>
-            <a:prstGeom prst="rect">
-              <a:avLst/>
-            </a:prstGeom>
-            <a:solidFill>
-              <a:srgbClr val="0070C0"/>
-            </a:solidFill>
-            <a:ln>
-              <a:solidFill>
-                <a:srgbClr val="0070C0"/>
-              </a:solidFill>
-            </a:ln>
-            <a:effectLst/>
-          </p:spPr>
-          <p:style>
-            <a:lnRef idx="1">
-              <a:schemeClr val="accent3"/>
-            </a:lnRef>
-            <a:fillRef idx="2">
-              <a:schemeClr val="accent3"/>
-            </a:fillRef>
-            <a:effectRef idx="1">
-              <a:schemeClr val="accent3"/>
-            </a:effectRef>
-            <a:fontRef idx="minor">
-              <a:schemeClr val="dk1"/>
-            </a:fontRef>
-          </p:style>
-          <p:txBody>
-            <a:bodyPr rtlCol="0" anchor="ctr"/>
-            <a:lstStyle/>
-            <a:p>
-              <a:pPr algn="ctr"/>
-              <a:endParaRPr lang="en-SG" sz="1200"/>
-            </a:p>
-          </p:txBody>
-        </p:sp>
-        <p:sp>
-          <p:nvSpPr>
-            <p:cNvPr id="117" name="Rectangle 62">
-              <a:extLst>
-                <a:ext uri="{FF2B5EF4-FFF2-40B4-BE49-F238E27FC236}">
-                  <a16:creationId xmlns:a16="http://schemas.microsoft.com/office/drawing/2014/main" id="{E7C31959-C80D-40A4-AFD4-A921B927DF7A}"/>
-                </a:ext>
-              </a:extLst>
-            </p:cNvPr>
-            <p:cNvSpPr/>
-            <p:nvPr/>
-          </p:nvSpPr>
-          <p:spPr>
-            <a:xfrm>
-              <a:off x="3721111" y="290048"/>
-              <a:ext cx="1005214" cy="212937"/>
-            </a:xfrm>
-            <a:prstGeom prst="rect">
-              <a:avLst/>
-            </a:prstGeom>
-            <a:solidFill>
-              <a:srgbClr val="00B050"/>
-            </a:solidFill>
-            <a:ln w="19050">
-              <a:solidFill>
-                <a:srgbClr val="00B050"/>
-              </a:solidFill>
-            </a:ln>
-            <a:effectLst/>
-          </p:spPr>
-          <p:style>
-            <a:lnRef idx="1">
-              <a:schemeClr val="accent2"/>
-            </a:lnRef>
-            <a:fillRef idx="2">
-              <a:schemeClr val="accent2"/>
-            </a:fillRef>
-            <a:effectRef idx="1">
-              <a:schemeClr val="accent2"/>
-            </a:effectRef>
-            <a:fontRef idx="minor">
-              <a:schemeClr val="dk1"/>
-            </a:fontRef>
-          </p:style>
-          <p:txBody>
-            <a:bodyPr rtlCol="0" anchor="ctr"/>
-            <a:lstStyle/>
-            <a:p>
-              <a:pPr algn="ctr"/>
-              <a:r>
-                <a:rPr lang="en-US" sz="1200" dirty="0" err="1">
-                  <a:solidFill>
-                    <a:schemeClr val="bg1"/>
-                  </a:solidFill>
-                </a:rPr>
-                <a:t>fullScreenPlaceholder:StackPane</a:t>
-              </a:r>
-              <a:endParaRPr lang="en-SG" sz="1200" dirty="0">
-                <a:solidFill>
-                  <a:schemeClr val="bg1"/>
-                </a:solidFill>
-              </a:endParaRPr>
-            </a:p>
-          </p:txBody>
-        </p:sp>
-        <p:cxnSp>
-          <p:nvCxnSpPr>
-            <p:cNvPr id="118" name="Straight Connector 117">
-              <a:extLst>
-                <a:ext uri="{FF2B5EF4-FFF2-40B4-BE49-F238E27FC236}">
-                  <a16:creationId xmlns:a16="http://schemas.microsoft.com/office/drawing/2014/main" id="{639B52B7-BC28-4DF3-834D-86B3122F2BA9}"/>
-                </a:ext>
-              </a:extLst>
-            </p:cNvPr>
-            <p:cNvCxnSpPr>
-              <a:cxnSpLocks/>
-            </p:cNvCxnSpPr>
-            <p:nvPr/>
-          </p:nvCxnSpPr>
-          <p:spPr>
-            <a:xfrm>
-              <a:off x="4223718" y="493328"/>
-              <a:ext cx="0" cy="2001222"/>
-            </a:xfrm>
-            <a:prstGeom prst="line">
-              <a:avLst/>
-            </a:prstGeom>
-            <a:ln w="19050">
-              <a:solidFill>
-                <a:srgbClr val="00B050">
-                  <a:alpha val="25000"/>
-                </a:srgbClr>
-              </a:solidFill>
-              <a:prstDash val="sysDash"/>
-            </a:ln>
-            <a:effectLst/>
-          </p:spPr>
-          <p:style>
-            <a:lnRef idx="1">
-              <a:schemeClr val="accent1"/>
-            </a:lnRef>
-            <a:fillRef idx="2">
-              <a:schemeClr val="accent1"/>
-            </a:fillRef>
-            <a:effectRef idx="1">
-              <a:schemeClr val="accent1"/>
-            </a:effectRef>
-            <a:fontRef idx="minor">
-              <a:schemeClr val="dk1"/>
-            </a:fontRef>
-          </p:style>
-        </p:cxnSp>
-        <p:cxnSp>
-          <p:nvCxnSpPr>
-            <p:cNvPr id="119" name="Straight Arrow Connector 118">
-              <a:extLst>
-                <a:ext uri="{FF2B5EF4-FFF2-40B4-BE49-F238E27FC236}">
-                  <a16:creationId xmlns:a16="http://schemas.microsoft.com/office/drawing/2014/main" id="{C812E116-511B-4DF8-9D2B-5868B6EB4FF5}"/>
-                </a:ext>
-              </a:extLst>
-            </p:cNvPr>
-            <p:cNvCxnSpPr>
-              <a:cxnSpLocks/>
-            </p:cNvCxnSpPr>
-            <p:nvPr/>
-          </p:nvCxnSpPr>
-          <p:spPr>
-            <a:xfrm>
-              <a:off x="1741071" y="2168748"/>
-              <a:ext cx="2445479" cy="0"/>
-            </a:xfrm>
-            <a:prstGeom prst="straightConnector1">
-              <a:avLst/>
-            </a:prstGeom>
-            <a:ln w="19050">
-              <a:solidFill>
-                <a:srgbClr val="00B050"/>
-              </a:solidFill>
-              <a:tailEnd type="arrow"/>
-            </a:ln>
-          </p:spPr>
-          <p:style>
-            <a:lnRef idx="1">
-              <a:schemeClr val="accent1"/>
-            </a:lnRef>
-            <a:fillRef idx="0">
-              <a:schemeClr val="accent1"/>
-            </a:fillRef>
-            <a:effectRef idx="0">
-              <a:schemeClr val="accent1"/>
-            </a:effectRef>
-            <a:fontRef idx="minor">
-              <a:schemeClr val="tx1"/>
-            </a:fontRef>
-          </p:style>
-        </p:cxnSp>
-        <p:sp>
-          <p:nvSpPr>
-            <p:cNvPr id="120" name="TextBox 119">
-              <a:extLst>
-                <a:ext uri="{FF2B5EF4-FFF2-40B4-BE49-F238E27FC236}">
-                  <a16:creationId xmlns:a16="http://schemas.microsoft.com/office/drawing/2014/main" id="{441CDA74-E825-4C82-9F98-DAD5F1DCC9B7}"/>
-                </a:ext>
-              </a:extLst>
-            </p:cNvPr>
-            <p:cNvSpPr txBox="1">
-              <a:spLocks/>
-            </p:cNvSpPr>
-            <p:nvPr/>
-          </p:nvSpPr>
-          <p:spPr>
-            <a:xfrm>
-              <a:off x="2729726" y="2081204"/>
-              <a:ext cx="504321" cy="85528"/>
-            </a:xfrm>
-            <a:prstGeom prst="rect">
-              <a:avLst/>
-            </a:prstGeom>
-            <a:noFill/>
-          </p:spPr>
-          <p:txBody>
-            <a:bodyPr wrap="square" lIns="0" tIns="0" rIns="0" bIns="0" rtlCol="0">
-              <a:spAutoFit/>
-            </a:bodyPr>
-            <a:lstStyle>
-              <a:defPPr>
-                <a:defRPr lang="en-US"/>
-              </a:defPPr>
-              <a:lvl1pPr algn="r">
-                <a:defRPr sz="1400">
-                  <a:solidFill>
-                    <a:srgbClr val="0070C0"/>
-                  </a:solidFill>
-                </a:defRPr>
-              </a:lvl1pPr>
-            </a:lstStyle>
-            <a:p>
-              <a:pPr algn="ctr"/>
-              <a:r>
-                <a:rPr lang="en-US" sz="1200" dirty="0" err="1">
-                  <a:solidFill>
-                    <a:srgbClr val="00B050"/>
-                  </a:solidFill>
-                </a:rPr>
-                <a:t>getChildren</a:t>
-              </a:r>
-              <a:r>
-                <a:rPr lang="en-US" sz="1200" dirty="0">
-                  <a:solidFill>
-                    <a:srgbClr val="00B050"/>
-                  </a:solidFill>
-                </a:rPr>
-                <a:t>()</a:t>
-              </a:r>
-              <a:endParaRPr lang="en-US" sz="1200" dirty="0"/>
-            </a:p>
-          </p:txBody>
-        </p:sp>
-        <p:sp>
-          <p:nvSpPr>
-            <p:cNvPr id="126" name="Rectangle 125">
-              <a:extLst>
-                <a:ext uri="{FF2B5EF4-FFF2-40B4-BE49-F238E27FC236}">
-                  <a16:creationId xmlns:a16="http://schemas.microsoft.com/office/drawing/2014/main" id="{C7198EFA-3678-4A17-8F7D-5DC58E7ABCE5}"/>
-                </a:ext>
-              </a:extLst>
-            </p:cNvPr>
-            <p:cNvSpPr>
-              <a:spLocks/>
-            </p:cNvSpPr>
-            <p:nvPr/>
-          </p:nvSpPr>
-          <p:spPr>
-            <a:xfrm>
-              <a:off x="4190884" y="2151103"/>
-              <a:ext cx="51409" cy="112517"/>
-            </a:xfrm>
-            <a:prstGeom prst="rect">
-              <a:avLst/>
-            </a:prstGeom>
-            <a:solidFill>
-              <a:srgbClr val="00B050"/>
-            </a:solidFill>
-            <a:ln>
-              <a:solidFill>
-                <a:srgbClr val="00B050"/>
-              </a:solidFill>
-            </a:ln>
-            <a:effectLst/>
-          </p:spPr>
-          <p:style>
-            <a:lnRef idx="1">
-              <a:schemeClr val="accent3"/>
-            </a:lnRef>
-            <a:fillRef idx="2">
-              <a:schemeClr val="accent3"/>
-            </a:fillRef>
-            <a:effectRef idx="1">
-              <a:schemeClr val="accent3"/>
-            </a:effectRef>
-            <a:fontRef idx="minor">
-              <a:schemeClr val="dk1"/>
-            </a:fontRef>
-          </p:style>
-          <p:txBody>
-            <a:bodyPr rtlCol="0" anchor="ctr"/>
-            <a:lstStyle/>
-            <a:p>
-              <a:pPr algn="ctr"/>
-              <a:endParaRPr lang="en-SG" sz="1200">
-                <a:solidFill>
-                  <a:srgbClr val="0070C0"/>
-                </a:solidFill>
-              </a:endParaRPr>
-            </a:p>
-          </p:txBody>
-        </p:sp>
-        <p:cxnSp>
-          <p:nvCxnSpPr>
-            <p:cNvPr id="128" name="Straight Arrow Connector 127">
-              <a:extLst>
-                <a:ext uri="{FF2B5EF4-FFF2-40B4-BE49-F238E27FC236}">
-                  <a16:creationId xmlns:a16="http://schemas.microsoft.com/office/drawing/2014/main" id="{85415E70-6B9A-4442-8535-E74B5EBF1A42}"/>
-                </a:ext>
-              </a:extLst>
-            </p:cNvPr>
-            <p:cNvCxnSpPr>
-              <a:cxnSpLocks/>
-            </p:cNvCxnSpPr>
-            <p:nvPr/>
-          </p:nvCxnSpPr>
-          <p:spPr>
-            <a:xfrm>
-              <a:off x="1768580" y="2263623"/>
-              <a:ext cx="2417969" cy="0"/>
-            </a:xfrm>
-            <a:prstGeom prst="straightConnector1">
-              <a:avLst/>
-            </a:prstGeom>
-            <a:ln w="19050">
-              <a:solidFill>
-                <a:srgbClr val="00B050"/>
-              </a:solidFill>
-              <a:prstDash val="sysDash"/>
-              <a:headEnd type="arrow" w="med" len="med"/>
-              <a:tailEnd type="none" w="med" len="med"/>
-            </a:ln>
-          </p:spPr>
-          <p:style>
-            <a:lnRef idx="1">
-              <a:schemeClr val="accent1"/>
-            </a:lnRef>
-            <a:fillRef idx="0">
-              <a:schemeClr val="accent1"/>
-            </a:fillRef>
-            <a:effectRef idx="0">
-              <a:schemeClr val="accent1"/>
-            </a:effectRef>
-            <a:fontRef idx="minor">
-              <a:schemeClr val="tx1"/>
-            </a:fontRef>
-          </p:style>
-        </p:cxnSp>
-      </p:grpSp>
-      <p:sp>
-        <p:nvSpPr>
-          <p:cNvPr id="4" name="TextBox 3">
-            <a:extLst>
-              <a:ext uri="{FF2B5EF4-FFF2-40B4-BE49-F238E27FC236}">
-                <a16:creationId xmlns:a16="http://schemas.microsoft.com/office/drawing/2014/main" id="{431562D7-FE44-445E-9655-7841C872E537}"/>
-              </a:ext>
-            </a:extLst>
-          </p:cNvPr>
-          <p:cNvSpPr txBox="1"/>
-          <p:nvPr/>
-        </p:nvSpPr>
-        <p:spPr>
-          <a:xfrm>
-            <a:off x="2659673" y="0"/>
-            <a:ext cx="3005414" cy="369332"/>
-          </a:xfrm>
-          <a:prstGeom prst="rect">
-            <a:avLst/>
-          </a:prstGeom>
-          <a:noFill/>
-        </p:spPr>
-        <p:txBody>
-          <a:bodyPr wrap="square" rtlCol="0">
-            <a:spAutoFit/>
-          </a:bodyPr>
-          <a:lstStyle/>
-          <a:p>
-            <a:r>
-              <a:rPr lang="en-SG" dirty="0"/>
-              <a:t>TO BE UPDATED</a:t>
-            </a:r>
-          </a:p>
-        </p:txBody>
-      </p:sp>
-    </p:spTree>
-    <p:extLst>
-      <p:ext uri="{BB962C8B-B14F-4D97-AF65-F5344CB8AC3E}">
-        <p14:creationId xmlns:p14="http://schemas.microsoft.com/office/powerpoint/2010/main" val="1009718340"/>
       </p:ext>
     </p:extLst>
   </p:cSld>

</xml_diff>

<commit_message>
Update sequence diagrams for execute() to include arguments
</commit_message>
<xml_diff>
--- a/docs/diagrams/TestSessionSequenceDiagram.pptx
+++ b/docs/diagrams/TestSessionSequenceDiagram.pptx
@@ -4129,8 +4129,8 @@
         </p:nvSpPr>
         <p:spPr>
           <a:xfrm>
-            <a:off x="2868705" y="2484071"/>
-            <a:ext cx="855809" cy="215444"/>
+            <a:off x="1881465" y="2484071"/>
+            <a:ext cx="1843050" cy="215444"/>
           </a:xfrm>
           <a:prstGeom prst="rect">
             <a:avLst/>
@@ -4156,7 +4156,7 @@
           <a:p>
             <a:r>
               <a:rPr lang="en-US" dirty="0"/>
-              <a:t>execute()</a:t>
+              <a:t>execute(model, history)</a:t>
             </a:r>
           </a:p>
         </p:txBody>
@@ -7219,8 +7219,8 @@
         </p:nvSpPr>
         <p:spPr>
           <a:xfrm>
-            <a:off x="2868705" y="2484071"/>
-            <a:ext cx="855809" cy="215444"/>
+            <a:off x="1658271" y="2484071"/>
+            <a:ext cx="2066244" cy="215444"/>
           </a:xfrm>
           <a:prstGeom prst="rect">
             <a:avLst/>
@@ -7246,7 +7246,7 @@
           <a:p>
             <a:r>
               <a:rPr lang="en-US" dirty="0"/>
-              <a:t>execute()</a:t>
+              <a:t>execute(model, history)</a:t>
             </a:r>
           </a:p>
         </p:txBody>

</xml_diff>